<commit_message>
changed scale according to Sam's advice to reflect the ring idea more
</commit_message>
<xml_diff>
--- a/documentation/Sonic PI Workshop.pptx
+++ b/documentation/Sonic PI Workshop.pptx
@@ -3839,7 +3839,11 @@
           <a:p>
             <a:r>
               <a:rPr lang="de-DE" dirty="0" smtClean="0"/>
-              <a:t>Mach das Schlagzeug schneller (120)</a:t>
+              <a:t>Mach‘ </a:t>
+            </a:r>
+            <a:r>
+              <a:rPr lang="de-DE" dirty="0" smtClean="0"/>
+              <a:t>das Schlagzeug schneller (120)</a:t>
             </a:r>
           </a:p>
           <a:p>
@@ -5267,12 +5271,52 @@
           <a:lstStyle/>
           <a:p>
             <a:r>
+              <a:rPr lang="de-DE" dirty="0" err="1">
+                <a:solidFill>
+                  <a:schemeClr val="dk1"/>
+                </a:solidFill>
+              </a:rPr>
+              <a:t>play_pattern</a:t>
+            </a:r>
+            <a:r>
               <a:rPr lang="de-DE" dirty="0">
                 <a:solidFill>
                   <a:schemeClr val="dk1"/>
                 </a:solidFill>
               </a:rPr>
-              <a:t>play_pattern scale(:e4, :minor) </a:t>
+              <a:t> </a:t>
+            </a:r>
+            <a:r>
+              <a:rPr lang="de-DE" dirty="0" smtClean="0">
+                <a:solidFill>
+                  <a:schemeClr val="dk1"/>
+                </a:solidFill>
+              </a:rPr>
+              <a:t>(</a:t>
+            </a:r>
+            <a:r>
+              <a:rPr lang="de-DE" dirty="0" err="1" smtClean="0">
+                <a:solidFill>
+                  <a:schemeClr val="dk1"/>
+                </a:solidFill>
+              </a:rPr>
+              <a:t>scale</a:t>
+            </a:r>
+            <a:r>
+              <a:rPr lang="de-DE" dirty="0" smtClean="0">
+                <a:solidFill>
+                  <a:schemeClr val="dk1"/>
+                </a:solidFill>
+              </a:rPr>
+              <a:t> :e4</a:t>
+            </a:r>
+            <a:r>
+              <a:rPr lang="de-DE" dirty="0">
+                <a:solidFill>
+                  <a:schemeClr val="dk1"/>
+                </a:solidFill>
+              </a:rPr>
+              <a:t>, :minor) </a:t>
             </a:r>
             <a:r>
               <a:rPr lang="de-DE" dirty="0">
@@ -5657,12 +5701,36 @@
               <a:t>                </a:t>
             </a:r>
             <a:r>
+              <a:rPr lang="de-DE" dirty="0" smtClean="0">
+                <a:solidFill>
+                  <a:schemeClr val="dk1"/>
+                </a:solidFill>
+              </a:rPr>
+              <a:t>(</a:t>
+            </a:r>
+            <a:r>
+              <a:rPr lang="de-DE" dirty="0" err="1" smtClean="0">
+                <a:solidFill>
+                  <a:schemeClr val="dk1"/>
+                </a:solidFill>
+              </a:rPr>
+              <a:t>scale</a:t>
+            </a:r>
+            <a:r>
+              <a:rPr lang="de-DE" dirty="0" smtClean="0">
+                <a:solidFill>
+                  <a:schemeClr val="dk1"/>
+                </a:solidFill>
+              </a:rPr>
+              <a:t> :e4</a:t>
+            </a:r>
+            <a:r>
               <a:rPr lang="de-DE" dirty="0">
                 <a:solidFill>
                   <a:schemeClr val="dk1"/>
                 </a:solidFill>
               </a:rPr>
-              <a:t>scale(:e4, :minor</a:t>
+              <a:t>, :minor</a:t>
             </a:r>
             <a:r>
               <a:rPr lang="de-DE" dirty="0" smtClean="0">
@@ -9335,11 +9403,7 @@
           <a:p>
             <a:r>
               <a:rPr lang="de-DE" dirty="0" smtClean="0"/>
-              <a:t>Spiele </a:t>
-            </a:r>
-            <a:r>
-              <a:rPr lang="de-DE" dirty="0" smtClean="0"/>
-              <a:t>eine Muster (=Pattern) </a:t>
+              <a:t>Spiele eine Muster (=Pattern) </a:t>
             </a:r>
             <a:r>
               <a:rPr lang="de-DE" dirty="0"/>
@@ -9347,11 +9411,7 @@
             </a:r>
             <a:r>
               <a:rPr lang="de-DE" dirty="0" smtClean="0"/>
-              <a:t>- hier eine </a:t>
-            </a:r>
-            <a:r>
-              <a:rPr lang="de-DE" dirty="0" smtClean="0"/>
-              <a:t>Tonleiter (</a:t>
+              <a:t>- hier eine Tonleiter (</a:t>
             </a:r>
             <a:r>
               <a:rPr lang="de-DE" dirty="0" err="1" smtClean="0"/>
@@ -9429,14 +9489,47 @@
             <p:ph type="body" sz="quarter" idx="17"/>
           </p:nvPr>
         </p:nvSpPr>
-        <p:spPr/>
+        <p:spPr>
+          <a:xfrm>
+            <a:off x="404664" y="1003248"/>
+            <a:ext cx="6048672" cy="584775"/>
+          </a:xfrm>
+        </p:spPr>
         <p:txBody>
           <a:bodyPr/>
           <a:lstStyle/>
           <a:p>
             <a:r>
-              <a:rPr lang="de-DE" smtClean="0"/>
-              <a:t>play_pattern scale(:c4, :major)</a:t>
+              <a:rPr lang="de-DE" dirty="0" err="1" smtClean="0"/>
+              <a:t>play_pattern</a:t>
+            </a:r>
+            <a:r>
+              <a:rPr lang="de-DE" dirty="0" smtClean="0"/>
+              <a:t> </a:t>
+            </a:r>
+            <a:r>
+              <a:rPr lang="de-DE" dirty="0" smtClean="0"/>
+              <a:t>(</a:t>
+            </a:r>
+            <a:r>
+              <a:rPr lang="de-DE" dirty="0" err="1" smtClean="0"/>
+              <a:t>scale</a:t>
+            </a:r>
+            <a:r>
+              <a:rPr lang="de-DE" dirty="0" smtClean="0"/>
+              <a:t> :c4</a:t>
+            </a:r>
+            <a:r>
+              <a:rPr lang="de-DE" dirty="0" smtClean="0"/>
+              <a:t>, :</a:t>
+            </a:r>
+            <a:r>
+              <a:rPr lang="de-DE" dirty="0" err="1" smtClean="0"/>
+              <a:t>major</a:t>
+            </a:r>
+            <a:r>
+              <a:rPr lang="de-DE" dirty="0" smtClean="0"/>
+              <a:t>)</a:t>
             </a:r>
             <a:endParaRPr lang="de-DE" dirty="0"/>
           </a:p>
@@ -9475,20 +9568,49 @@
             <p:ph type="body" sz="quarter" idx="21"/>
           </p:nvPr>
         </p:nvSpPr>
-        <p:spPr/>
+        <p:spPr>
+          <a:xfrm>
+            <a:off x="548680" y="5335749"/>
+            <a:ext cx="6048672" cy="1175706"/>
+          </a:xfrm>
+        </p:spPr>
         <p:txBody>
           <a:bodyPr/>
           <a:lstStyle/>
           <a:p>
             <a:r>
-              <a:rPr lang="de-DE" smtClean="0"/>
-              <a:t>use_bpm 120</a:t>
-            </a:r>
-          </a:p>
-          <a:p>
-            <a:r>
-              <a:rPr lang="de-DE" smtClean="0"/>
-              <a:t>play_pattern scale(:e4, :minor)</a:t>
+              <a:rPr lang="de-DE" dirty="0" err="1" smtClean="0"/>
+              <a:t>use_bpm</a:t>
+            </a:r>
+            <a:r>
+              <a:rPr lang="de-DE" dirty="0" smtClean="0"/>
+              <a:t> 120</a:t>
+            </a:r>
+          </a:p>
+          <a:p>
+            <a:r>
+              <a:rPr lang="de-DE" dirty="0" err="1" smtClean="0"/>
+              <a:t>play_pattern</a:t>
+            </a:r>
+            <a:r>
+              <a:rPr lang="de-DE" dirty="0" smtClean="0"/>
+              <a:t> </a:t>
+            </a:r>
+            <a:r>
+              <a:rPr lang="de-DE" dirty="0" smtClean="0"/>
+              <a:t>(</a:t>
+            </a:r>
+            <a:r>
+              <a:rPr lang="de-DE" dirty="0" err="1" smtClean="0"/>
+              <a:t>scale</a:t>
+            </a:r>
+            <a:r>
+              <a:rPr lang="de-DE" dirty="0" smtClean="0"/>
+              <a:t> :e4</a:t>
+            </a:r>
+            <a:r>
+              <a:rPr lang="de-DE" dirty="0" smtClean="0"/>
+              <a:t>, :minor)</a:t>
             </a:r>
             <a:endParaRPr lang="de-DE" dirty="0"/>
           </a:p>
@@ -9617,7 +9739,12 @@
             <p:ph type="body" sz="quarter" idx="17"/>
           </p:nvPr>
         </p:nvSpPr>
-        <p:spPr/>
+        <p:spPr>
+          <a:xfrm>
+            <a:off x="404664" y="481918"/>
+            <a:ext cx="6048672" cy="2074414"/>
+          </a:xfrm>
+        </p:spPr>
         <p:txBody>
           <a:bodyPr/>
           <a:lstStyle/>
@@ -9636,7 +9763,31 @@
           <a:p>
             <a:r>
               <a:rPr lang="de-DE" dirty="0" smtClean="0"/>
-              <a:t>   play_pattern scale(:e4, :minor)</a:t>
+              <a:t>   </a:t>
+            </a:r>
+            <a:r>
+              <a:rPr lang="de-DE" dirty="0" err="1" smtClean="0"/>
+              <a:t>play_pattern</a:t>
+            </a:r>
+            <a:r>
+              <a:rPr lang="de-DE" dirty="0" smtClean="0"/>
+              <a:t> </a:t>
+            </a:r>
+            <a:r>
+              <a:rPr lang="de-DE" dirty="0" smtClean="0"/>
+              <a:t>(</a:t>
+            </a:r>
+            <a:r>
+              <a:rPr lang="de-DE" dirty="0" err="1" smtClean="0"/>
+              <a:t>scale</a:t>
+            </a:r>
+            <a:r>
+              <a:rPr lang="de-DE" dirty="0" smtClean="0"/>
+              <a:t> :e4</a:t>
+            </a:r>
+            <a:r>
+              <a:rPr lang="de-DE" dirty="0" smtClean="0"/>
+              <a:t>, :minor)</a:t>
             </a:r>
           </a:p>
           <a:p>
@@ -9681,7 +9832,12 @@
             <p:ph type="body" sz="quarter" idx="21"/>
           </p:nvPr>
         </p:nvSpPr>
-        <p:spPr/>
+        <p:spPr>
+          <a:xfrm>
+            <a:off x="408965" y="5170422"/>
+            <a:ext cx="6048672" cy="2591479"/>
+          </a:xfrm>
+        </p:spPr>
         <p:txBody>
           <a:bodyPr/>
           <a:lstStyle/>
@@ -9700,7 +9856,31 @@
           <a:p>
             <a:r>
               <a:rPr lang="de-DE" dirty="0" smtClean="0"/>
-              <a:t>   play_pattern scale(:e4, :minor)</a:t>
+              <a:t>   </a:t>
+            </a:r>
+            <a:r>
+              <a:rPr lang="de-DE" dirty="0" err="1" smtClean="0"/>
+              <a:t>play_pattern</a:t>
+            </a:r>
+            <a:r>
+              <a:rPr lang="de-DE" dirty="0" smtClean="0"/>
+              <a:t> </a:t>
+            </a:r>
+            <a:r>
+              <a:rPr lang="de-DE" dirty="0" smtClean="0"/>
+              <a:t>(</a:t>
+            </a:r>
+            <a:r>
+              <a:rPr lang="de-DE" dirty="0" err="1" smtClean="0"/>
+              <a:t>scale</a:t>
+            </a:r>
+            <a:r>
+              <a:rPr lang="de-DE" dirty="0" smtClean="0"/>
+              <a:t> :e4</a:t>
+            </a:r>
+            <a:r>
+              <a:rPr lang="de-DE" dirty="0" smtClean="0"/>
+              <a:t>, :minor)</a:t>
             </a:r>
           </a:p>
           <a:p>
@@ -10021,12 +10201,20 @@
               <a:t> </a:t>
             </a:r>
             <a:r>
+              <a:rPr lang="de-DE" dirty="0" smtClean="0"/>
+              <a:t>(</a:t>
+            </a:r>
+            <a:r>
               <a:rPr lang="de-DE" dirty="0" err="1" smtClean="0"/>
               <a:t>scale</a:t>
             </a:r>
             <a:r>
               <a:rPr lang="de-DE" dirty="0" smtClean="0"/>
-              <a:t>(:e4, :minor)</a:t>
+              <a:t> :e4</a:t>
+            </a:r>
+            <a:r>
+              <a:rPr lang="de-DE" dirty="0" smtClean="0"/>
+              <a:t>, :minor)</a:t>
             </a:r>
           </a:p>
           <a:p>
@@ -10039,12 +10227,20 @@
               <a:t> </a:t>
             </a:r>
             <a:r>
+              <a:rPr lang="de-DE" dirty="0" smtClean="0"/>
+              <a:t>(</a:t>
+            </a:r>
+            <a:r>
               <a:rPr lang="de-DE" dirty="0" err="1" smtClean="0"/>
               <a:t>scale</a:t>
             </a:r>
             <a:r>
               <a:rPr lang="de-DE" dirty="0" smtClean="0"/>
-              <a:t>(:e4, :minor).</a:t>
+              <a:t> :e4</a:t>
+            </a:r>
+            <a:r>
+              <a:rPr lang="de-DE" dirty="0" smtClean="0"/>
+              <a:t>, :minor).</a:t>
             </a:r>
             <a:r>
               <a:rPr lang="de-DE" b="1" dirty="0" err="1" smtClean="0"/>
@@ -10083,11 +10279,7 @@
             </a:r>
             <a:r>
               <a:rPr lang="de-DE" dirty="0" smtClean="0"/>
-              <a:t> </a:t>
-            </a:r>
-            <a:r>
-              <a:rPr lang="de-DE" dirty="0" smtClean="0"/>
-              <a:t>:saw</a:t>
+              <a:t> :saw</a:t>
             </a:r>
           </a:p>
           <a:p>
@@ -10182,11 +10374,7 @@
             </a:pPr>
             <a:r>
               <a:rPr lang="de-DE" b="0" dirty="0" smtClean="0"/>
-              <a:t>Play </a:t>
-            </a:r>
-            <a:r>
-              <a:rPr lang="de-DE" b="0" dirty="0" smtClean="0"/>
-              <a:t>spielt </a:t>
+              <a:t>Play spielt </a:t>
             </a:r>
             <a:r>
               <a:rPr lang="de-DE" dirty="0" smtClean="0"/>
@@ -10218,23 +10406,7 @@
             </a:r>
             <a:r>
               <a:rPr lang="de-DE" b="0" dirty="0" smtClean="0"/>
-              <a:t> </a:t>
-            </a:r>
-            <a:r>
-              <a:rPr lang="de-DE" b="0" dirty="0" smtClean="0"/>
-              <a:t>ein Muster, </a:t>
-            </a:r>
-            <a:r>
-              <a:rPr lang="de-DE" b="0" dirty="0" smtClean="0"/>
-              <a:t>also </a:t>
-            </a:r>
-            <a:r>
-              <a:rPr lang="de-DE" b="0" dirty="0" smtClean="0"/>
-              <a:t>viele </a:t>
-            </a:r>
-            <a:r>
-              <a:rPr lang="de-DE" b="0" dirty="0" smtClean="0"/>
-              <a:t>)</a:t>
+              <a:t> ein Muster, also viele )</a:t>
             </a:r>
           </a:p>
           <a:p>
@@ -10345,16 +10517,24 @@
           <a:lstStyle/>
           <a:p>
             <a:r>
-              <a:rPr lang="de-DE" sz="2400"/>
-              <a:t>live_loop </a:t>
-            </a:r>
-            <a:r>
-              <a:rPr lang="de-DE" sz="2400" smtClean="0"/>
-              <a:t>:geblubber </a:t>
+              <a:rPr lang="de-DE" sz="2400" dirty="0" err="1"/>
+              <a:t>live_loop</a:t>
+            </a:r>
+            <a:r>
+              <a:rPr lang="de-DE" sz="2400" dirty="0"/>
+              <a:t> </a:t>
             </a:r>
             <a:r>
               <a:rPr lang="de-DE" sz="2400" dirty="0" smtClean="0"/>
-              <a:t>do</a:t>
+              <a:t>:</a:t>
+            </a:r>
+            <a:r>
+              <a:rPr lang="de-DE" sz="2400" dirty="0" err="1" smtClean="0"/>
+              <a:t>geblubber</a:t>
+            </a:r>
+            <a:r>
+              <a:rPr lang="de-DE" sz="2400" dirty="0" smtClean="0"/>
+              <a:t> do</a:t>
             </a:r>
             <a:endParaRPr lang="de-DE" sz="2400" dirty="0"/>
           </a:p>
@@ -10374,7 +10554,7 @@
               <a:t>   </a:t>
             </a:r>
             <a:r>
-              <a:rPr lang="de-DE" sz="2400" b="1" dirty="0" smtClean="0">
+              <a:rPr lang="de-DE" sz="2400" b="1" dirty="0" err="1" smtClean="0">
                 <a:solidFill>
                   <a:srgbClr val="FF0000"/>
                 </a:solidFill>
@@ -10382,8 +10562,36 @@
               <a:t>play</a:t>
             </a:r>
             <a:r>
+              <a:rPr lang="de-DE" sz="2400" dirty="0" err="1" smtClean="0"/>
+              <a:t>_pattern</a:t>
+            </a:r>
+            <a:r>
               <a:rPr lang="de-DE" sz="2400" dirty="0" smtClean="0"/>
-              <a:t>_pattern </a:t>
+              <a:t> </a:t>
+            </a:r>
+            <a:r>
+              <a:rPr lang="de-DE" sz="2400" b="1" dirty="0" smtClean="0">
+                <a:solidFill>
+                  <a:srgbClr val="FF0000"/>
+                </a:solidFill>
+              </a:rPr>
+              <a:t>(</a:t>
+            </a:r>
+            <a:r>
+              <a:rPr lang="de-DE" sz="2400" b="1" dirty="0" err="1" smtClean="0">
+                <a:solidFill>
+                  <a:srgbClr val="FF0000"/>
+                </a:solidFill>
+              </a:rPr>
+              <a:t>scale</a:t>
+            </a:r>
+            <a:r>
+              <a:rPr lang="de-DE" sz="2400" b="1" dirty="0" smtClean="0">
+                <a:solidFill>
+                  <a:srgbClr val="FF0000"/>
+                </a:solidFill>
+              </a:rPr>
+              <a:t> :e4</a:t>
             </a:r>
             <a:r>
               <a:rPr lang="de-DE" sz="2400" b="1" dirty="0">
@@ -10391,7 +10599,7 @@
                   <a:srgbClr val="FF0000"/>
                 </a:solidFill>
               </a:rPr>
-              <a:t>scale(:e4, :minor</a:t>
+              <a:t>, :minor</a:t>
             </a:r>
             <a:r>
               <a:rPr lang="de-DE" sz="2400" b="1" dirty="0" smtClean="0">

</xml_diff>

<commit_message>
added english workshop, prettyfied workshop, small changes on rocky beat
</commit_message>
<xml_diff>
--- a/documentation/Sonic PI Workshop.pptx
+++ b/documentation/Sonic PI Workshop.pptx
@@ -5,10 +5,10 @@
     <p:sldMasterId id="2147483648" r:id="rId1"/>
   </p:sldMasterIdLst>
   <p:notesMasterIdLst>
-    <p:notesMasterId r:id="rId19"/>
+    <p:notesMasterId r:id="rId20"/>
   </p:notesMasterIdLst>
   <p:handoutMasterIdLst>
-    <p:handoutMasterId r:id="rId20"/>
+    <p:handoutMasterId r:id="rId21"/>
   </p:handoutMasterIdLst>
   <p:sldIdLst>
     <p:sldId id="262" r:id="rId2"/>
@@ -25,9 +25,10 @@
     <p:sldId id="266" r:id="rId13"/>
     <p:sldId id="267" r:id="rId14"/>
     <p:sldId id="273" r:id="rId15"/>
-    <p:sldId id="270" r:id="rId16"/>
-    <p:sldId id="272" r:id="rId17"/>
-    <p:sldId id="271" r:id="rId18"/>
+    <p:sldId id="276" r:id="rId16"/>
+    <p:sldId id="270" r:id="rId17"/>
+    <p:sldId id="272" r:id="rId18"/>
+    <p:sldId id="271" r:id="rId19"/>
   </p:sldIdLst>
   <p:sldSz cx="6858000" cy="9144000" type="screen4x3"/>
   <p:notesSz cx="6858000" cy="9144000"/>
@@ -128,7 +129,7 @@
   </p:defaultTextStyle>
   <p:extLst>
     <p:ext uri="{EFAFB233-063F-42B5-8137-9DF3F51BA10A}">
-      <p15:sldGuideLst xmlns:p15="http://schemas.microsoft.com/office/powerpoint/2012/main">
+      <p15:sldGuideLst xmlns="" xmlns:p15="http://schemas.microsoft.com/office/powerpoint/2012/main">
         <p15:guide id="1" orient="horz" pos="2880" userDrawn="1">
           <p15:clr>
             <a:srgbClr val="A4A3A4"/>
@@ -142,7 +143,7 @@
       </p15:sldGuideLst>
     </p:ext>
     <p:ext uri="{2D200454-40CA-4A62-9FC3-DE9A4176ACB9}">
-      <p15:notesGuideLst xmlns:p15="http://schemas.microsoft.com/office/powerpoint/2012/main"/>
+      <p15:notesGuideLst xmlns="" xmlns:p15="http://schemas.microsoft.com/office/powerpoint/2012/main"/>
     </p:ext>
   </p:extLst>
 </p:presentation>
@@ -231,7 +232,7 @@
             <a:fld id="{7FD773D1-FC60-4896-8BCC-9B28FBDAB5FD}" type="datetimeFigureOut">
               <a:rPr lang="de-DE" smtClean="0"/>
               <a:pPr/>
-              <a:t>17.03.2016</a:t>
+              <a:t>23.03.2016</a:t>
             </a:fld>
             <a:endParaRPr lang="de-DE"/>
           </a:p>
@@ -307,7 +308,7 @@
     </p:spTree>
     <p:extLst>
       <p:ext uri="{BB962C8B-B14F-4D97-AF65-F5344CB8AC3E}">
-        <p14:creationId xmlns:p14="http://schemas.microsoft.com/office/powerpoint/2010/main" val="2388778202"/>
+        <p14:creationId xmlns="" xmlns:p14="http://schemas.microsoft.com/office/powerpoint/2010/main" val="2388778202"/>
       </p:ext>
     </p:extLst>
   </p:cSld>
@@ -398,7 +399,7 @@
             <a:fld id="{72145D81-8E55-40FC-9585-CFDCFEF92FEB}" type="datetimeFigureOut">
               <a:rPr lang="de-DE" smtClean="0"/>
               <a:pPr/>
-              <a:t>17.03.2016</a:t>
+              <a:t>23.03.2016</a:t>
             </a:fld>
             <a:endParaRPr lang="de-DE"/>
           </a:p>
@@ -567,7 +568,7 @@
     </p:spTree>
     <p:extLst>
       <p:ext uri="{BB962C8B-B14F-4D97-AF65-F5344CB8AC3E}">
-        <p14:creationId xmlns:p14="http://schemas.microsoft.com/office/powerpoint/2010/main" val="1984578866"/>
+        <p14:creationId xmlns="" xmlns:p14="http://schemas.microsoft.com/office/powerpoint/2010/main" val="1984578866"/>
       </p:ext>
     </p:extLst>
   </p:cSld>
@@ -733,7 +734,7 @@
             <a:fld id="{D6E72435-FA90-4640-AFCA-E6A02F5F1494}" type="slidenum">
               <a:rPr lang="de-DE" smtClean="0"/>
               <a:pPr/>
-              <a:t>16</a:t>
+              <a:t>17</a:t>
             </a:fld>
             <a:endParaRPr lang="de-DE"/>
           </a:p>
@@ -742,7 +743,7 @@
     </p:spTree>
     <p:extLst>
       <p:ext uri="{BB962C8B-B14F-4D97-AF65-F5344CB8AC3E}">
-        <p14:creationId xmlns:p14="http://schemas.microsoft.com/office/powerpoint/2010/main" val="4054934049"/>
+        <p14:creationId xmlns="" xmlns:p14="http://schemas.microsoft.com/office/powerpoint/2010/main" val="4054934049"/>
       </p:ext>
     </p:extLst>
   </p:cSld>
@@ -818,7 +819,7 @@
             <a:fld id="{D6E72435-FA90-4640-AFCA-E6A02F5F1494}" type="slidenum">
               <a:rPr lang="de-DE" smtClean="0"/>
               <a:pPr/>
-              <a:t>17</a:t>
+              <a:t>18</a:t>
             </a:fld>
             <a:endParaRPr lang="de-DE"/>
           </a:p>
@@ -827,7 +828,7 @@
     </p:spTree>
     <p:extLst>
       <p:ext uri="{BB962C8B-B14F-4D97-AF65-F5344CB8AC3E}">
-        <p14:creationId xmlns:p14="http://schemas.microsoft.com/office/powerpoint/2010/main" val="762545407"/>
+        <p14:creationId xmlns="" xmlns:p14="http://schemas.microsoft.com/office/powerpoint/2010/main" val="762545407"/>
       </p:ext>
     </p:extLst>
   </p:cSld>
@@ -1485,7 +1486,7 @@
     </p:spTree>
     <p:extLst>
       <p:ext uri="{BB962C8B-B14F-4D97-AF65-F5344CB8AC3E}">
-        <p14:creationId xmlns:p14="http://schemas.microsoft.com/office/powerpoint/2010/main" val="3388351758"/>
+        <p14:creationId xmlns="" xmlns:p14="http://schemas.microsoft.com/office/powerpoint/2010/main" val="3388351758"/>
       </p:ext>
     </p:extLst>
   </p:cSld>
@@ -1820,7 +1821,7 @@
     </p:spTree>
     <p:extLst>
       <p:ext uri="{BB962C8B-B14F-4D97-AF65-F5344CB8AC3E}">
-        <p14:creationId xmlns:p14="http://schemas.microsoft.com/office/powerpoint/2010/main" val="1756338724"/>
+        <p14:creationId xmlns="" xmlns:p14="http://schemas.microsoft.com/office/powerpoint/2010/main" val="1756338724"/>
       </p:ext>
     </p:extLst>
   </p:cSld>
@@ -2155,7 +2156,7 @@
     </p:spTree>
     <p:extLst>
       <p:ext uri="{BB962C8B-B14F-4D97-AF65-F5344CB8AC3E}">
-        <p14:creationId xmlns:p14="http://schemas.microsoft.com/office/powerpoint/2010/main" val="720233445"/>
+        <p14:creationId xmlns="" xmlns:p14="http://schemas.microsoft.com/office/powerpoint/2010/main" val="720233445"/>
       </p:ext>
     </p:extLst>
   </p:cSld>
@@ -2487,7 +2488,7 @@
     </p:spTree>
     <p:extLst>
       <p:ext uri="{BB962C8B-B14F-4D97-AF65-F5344CB8AC3E}">
-        <p14:creationId xmlns:p14="http://schemas.microsoft.com/office/powerpoint/2010/main" val="1448331384"/>
+        <p14:creationId xmlns="" xmlns:p14="http://schemas.microsoft.com/office/powerpoint/2010/main" val="1448331384"/>
       </p:ext>
     </p:extLst>
   </p:cSld>
@@ -2638,7 +2639,7 @@
             <a:fld id="{421FAFA7-FD27-4797-86F0-797A053F7FF1}" type="datetimeFigureOut">
               <a:rPr lang="de-DE" smtClean="0"/>
               <a:pPr/>
-              <a:t>17.03.2016</a:t>
+              <a:t>23.03.2016</a:t>
             </a:fld>
             <a:endParaRPr lang="de-DE"/>
           </a:p>
@@ -3464,12 +3465,12 @@
       </p:grpSpPr>
       <p:sp>
         <p:nvSpPr>
-          <p:cNvPr id="2" name="Textplatzhalter 1"/>
-          <p:cNvSpPr>
-            <a:spLocks noGrp="1"/>
-          </p:cNvSpPr>
-          <p:nvPr>
-            <p:ph type="body" sz="quarter" idx="15"/>
+          <p:cNvPr id="4" name="Textplatzhalter 3"/>
+          <p:cNvSpPr>
+            <a:spLocks noGrp="1"/>
+          </p:cNvSpPr>
+          <p:nvPr>
+            <p:ph type="body" sz="quarter" idx="19"/>
           </p:nvPr>
         </p:nvSpPr>
         <p:spPr/>
@@ -3483,12 +3484,12 @@
       </p:sp>
       <p:sp>
         <p:nvSpPr>
-          <p:cNvPr id="3" name="Textplatzhalter 2"/>
-          <p:cNvSpPr>
-            <a:spLocks noGrp="1"/>
-          </p:cNvSpPr>
-          <p:nvPr>
-            <p:ph type="body" sz="quarter" idx="18"/>
+          <p:cNvPr id="6" name="Textplatzhalter 5"/>
+          <p:cNvSpPr>
+            <a:spLocks noGrp="1"/>
+          </p:cNvSpPr>
+          <p:nvPr>
+            <p:ph type="body" sz="quarter" idx="20"/>
           </p:nvPr>
         </p:nvSpPr>
         <p:spPr/>
@@ -3496,18 +3497,22 @@
           <a:bodyPr/>
           <a:lstStyle/>
           <a:p>
-            <a:endParaRPr lang="de-DE"/>
-          </a:p>
-        </p:txBody>
-      </p:sp>
-      <p:sp>
-        <p:nvSpPr>
-          <p:cNvPr id="4" name="Textplatzhalter 3"/>
-          <p:cNvSpPr>
-            <a:spLocks noGrp="1"/>
-          </p:cNvSpPr>
-          <p:nvPr>
-            <p:ph type="body" sz="quarter" idx="19"/>
+            <a:r>
+              <a:rPr lang="de-DE" dirty="0" smtClean="0"/>
+              <a:t>Venwende den Buffer 0 in Sonic Pi</a:t>
+            </a:r>
+            <a:endParaRPr lang="de-DE" dirty="0"/>
+          </a:p>
+        </p:txBody>
+      </p:sp>
+      <p:sp>
+        <p:nvSpPr>
+          <p:cNvPr id="7" name="Textplatzhalter 6"/>
+          <p:cNvSpPr>
+            <a:spLocks noGrp="1"/>
+          </p:cNvSpPr>
+          <p:nvPr>
+            <p:ph type="body" sz="quarter" idx="21"/>
           </p:nvPr>
         </p:nvSpPr>
         <p:spPr/>
@@ -3515,28 +3520,9 @@
           <a:bodyPr/>
           <a:lstStyle/>
           <a:p>
-            <a:endParaRPr lang="de-DE"/>
-          </a:p>
-        </p:txBody>
-      </p:sp>
-      <p:sp>
-        <p:nvSpPr>
-          <p:cNvPr id="5" name="Textplatzhalter 4"/>
-          <p:cNvSpPr>
-            <a:spLocks noGrp="1"/>
-          </p:cNvSpPr>
-          <p:nvPr>
-            <p:ph type="body" sz="quarter" idx="17"/>
-          </p:nvPr>
-        </p:nvSpPr>
-        <p:spPr/>
-        <p:txBody>
-          <a:bodyPr/>
-          <a:lstStyle/>
-          <a:p>
-            <a:r>
-              <a:rPr lang="de-DE" dirty="0" smtClean="0"/>
-              <a:t>BUFFER 0</a:t>
+            <a:r>
+              <a:rPr lang="de-DE" dirty="0" smtClean="0"/>
+              <a:t>Buffer 0</a:t>
             </a:r>
             <a:endParaRPr lang="de-DE" dirty="0"/>
           </a:p>
@@ -3544,46 +3530,168 @@
       </p:sp>
       <p:sp>
         <p:nvSpPr>
-          <p:cNvPr id="6" name="Textplatzhalter 5"/>
-          <p:cNvSpPr>
-            <a:spLocks noGrp="1"/>
-          </p:cNvSpPr>
-          <p:nvPr>
-            <p:ph type="body" sz="quarter" idx="20"/>
-          </p:nvPr>
-        </p:nvSpPr>
-        <p:spPr/>
-        <p:txBody>
-          <a:bodyPr/>
-          <a:lstStyle/>
-          <a:p>
-            <a:endParaRPr lang="de-DE"/>
-          </a:p>
-        </p:txBody>
-      </p:sp>
-      <p:sp>
-        <p:nvSpPr>
-          <p:cNvPr id="7" name="Textplatzhalter 6"/>
-          <p:cNvSpPr>
-            <a:spLocks noGrp="1"/>
-          </p:cNvSpPr>
-          <p:nvPr>
-            <p:ph type="body" sz="quarter" idx="21"/>
-          </p:nvPr>
-        </p:nvSpPr>
-        <p:spPr/>
-        <p:txBody>
-          <a:bodyPr/>
-          <a:lstStyle/>
-          <a:p>
-            <a:endParaRPr lang="de-DE"/>
+          <p:cNvPr id="9" name="Rectangle 8"/>
+          <p:cNvSpPr/>
+          <p:nvPr/>
+        </p:nvSpPr>
+        <p:spPr>
+          <a:xfrm>
+            <a:off x="0" y="467544"/>
+            <a:ext cx="6858000" cy="3672408"/>
+          </a:xfrm>
+          <a:prstGeom prst="rect">
+            <a:avLst/>
+          </a:prstGeom>
+          <a:solidFill>
+            <a:schemeClr val="bg1"/>
+          </a:solidFill>
+          <a:ln>
+            <a:solidFill>
+              <a:schemeClr val="bg1"/>
+            </a:solidFill>
+          </a:ln>
+        </p:spPr>
+        <p:style>
+          <a:lnRef idx="2">
+            <a:schemeClr val="accent1">
+              <a:shade val="50000"/>
+            </a:schemeClr>
+          </a:lnRef>
+          <a:fillRef idx="1">
+            <a:schemeClr val="accent1"/>
+          </a:fillRef>
+          <a:effectRef idx="0">
+            <a:schemeClr val="accent1"/>
+          </a:effectRef>
+          <a:fontRef idx="minor">
+            <a:schemeClr val="lt1"/>
+          </a:fontRef>
+        </p:style>
+        <p:txBody>
+          <a:bodyPr rtlCol="0" anchor="ctr"/>
+          <a:lstStyle/>
+          <a:p>
+            <a:endParaRPr lang="en-US" dirty="0" smtClean="0">
+              <a:solidFill>
+                <a:schemeClr val="tx1"/>
+              </a:solidFill>
+            </a:endParaRPr>
+          </a:p>
+        </p:txBody>
+      </p:sp>
+      <p:pic>
+        <p:nvPicPr>
+          <p:cNvPr id="1026" name="Picture 2"/>
+          <p:cNvPicPr>
+            <a:picLocks noChangeAspect="1" noChangeArrowheads="1"/>
+          </p:cNvPicPr>
+          <p:nvPr/>
+        </p:nvPicPr>
+        <p:blipFill>
+          <a:blip r:embed="rId2" cstate="print"/>
+          <a:srcRect/>
+          <a:stretch>
+            <a:fillRect/>
+          </a:stretch>
+        </p:blipFill>
+        <p:spPr bwMode="auto">
+          <a:xfrm>
+            <a:off x="908720" y="539552"/>
+            <a:ext cx="5117368" cy="1800200"/>
+          </a:xfrm>
+          <a:prstGeom prst="rect">
+            <a:avLst/>
+          </a:prstGeom>
+          <a:noFill/>
+          <a:ln w="9525">
+            <a:noFill/>
+            <a:miter lim="800000"/>
+            <a:headEnd/>
+            <a:tailEnd/>
+          </a:ln>
+        </p:spPr>
+      </p:pic>
+      <p:pic>
+        <p:nvPicPr>
+          <p:cNvPr id="1029" name="Picture 5"/>
+          <p:cNvPicPr>
+            <a:picLocks noChangeAspect="1" noChangeArrowheads="1"/>
+          </p:cNvPicPr>
+          <p:nvPr/>
+        </p:nvPicPr>
+        <p:blipFill>
+          <a:blip r:embed="rId3" cstate="print"/>
+          <a:srcRect/>
+          <a:stretch>
+            <a:fillRect/>
+          </a:stretch>
+        </p:blipFill>
+        <p:spPr bwMode="auto">
+          <a:xfrm>
+            <a:off x="871208" y="2267744"/>
+            <a:ext cx="1770689" cy="1440160"/>
+          </a:xfrm>
+          <a:prstGeom prst="rect">
+            <a:avLst/>
+          </a:prstGeom>
+          <a:noFill/>
+          <a:ln w="9525">
+            <a:noFill/>
+            <a:miter lim="800000"/>
+            <a:headEnd/>
+            <a:tailEnd/>
+          </a:ln>
+        </p:spPr>
+      </p:pic>
+      <p:sp>
+        <p:nvSpPr>
+          <p:cNvPr id="13" name="TextBox 12"/>
+          <p:cNvSpPr txBox="1"/>
+          <p:nvPr/>
+        </p:nvSpPr>
+        <p:spPr>
+          <a:xfrm>
+            <a:off x="2420888" y="2843808"/>
+            <a:ext cx="3387466" cy="815608"/>
+          </a:xfrm>
+          <a:prstGeom prst="rect">
+            <a:avLst/>
+          </a:prstGeom>
+          <a:noFill/>
+        </p:spPr>
+        <p:txBody>
+          <a:bodyPr wrap="none" rtlCol="0">
+            <a:spAutoFit/>
+          </a:bodyPr>
+          <a:lstStyle/>
+          <a:p>
+            <a:pPr algn="r"/>
+            <a:r>
+              <a:rPr lang="de-DE" dirty="0" smtClean="0"/>
+              <a:t>Ein Sonic Pi Workshop</a:t>
+            </a:r>
+          </a:p>
+          <a:p>
+            <a:pPr algn="r"/>
+            <a:r>
+              <a:rPr lang="de-DE" dirty="0" smtClean="0"/>
+              <a:t>für Kinder</a:t>
+            </a:r>
+          </a:p>
+          <a:p>
+            <a:pPr algn="r"/>
+            <a:r>
+              <a:rPr lang="de-DE" sz="1100" dirty="0" smtClean="0"/>
+              <a:t>von Stefan Höhn, Irene Höppner und Matthias Malstädt</a:t>
+            </a:r>
+            <a:endParaRPr lang="de-DE" sz="1100" dirty="0"/>
           </a:p>
         </p:txBody>
       </p:sp>
     </p:spTree>
     <p:extLst>
       <p:ext uri="{BB962C8B-B14F-4D97-AF65-F5344CB8AC3E}">
-        <p14:creationId xmlns:p14="http://schemas.microsoft.com/office/powerpoint/2010/main" val="1464364472"/>
+        <p14:creationId xmlns="" xmlns:p14="http://schemas.microsoft.com/office/powerpoint/2010/main" val="1464364472"/>
       </p:ext>
     </p:extLst>
   </p:cSld>
@@ -3632,7 +3740,11 @@
           <a:bodyPr/>
           <a:lstStyle/>
           <a:p>
-            <a:endParaRPr lang="de-DE"/>
+            <a:r>
+              <a:rPr lang="de-DE" dirty="0" smtClean="0"/>
+              <a:t>Verwende Buffer 4</a:t>
+            </a:r>
+            <a:endParaRPr lang="de-DE" dirty="0"/>
           </a:p>
         </p:txBody>
       </p:sp>
@@ -3738,7 +3850,7 @@
     </p:spTree>
     <p:extLst>
       <p:ext uri="{BB962C8B-B14F-4D97-AF65-F5344CB8AC3E}">
-        <p14:creationId xmlns:p14="http://schemas.microsoft.com/office/powerpoint/2010/main" val="3690587624"/>
+        <p14:creationId xmlns="" xmlns:p14="http://schemas.microsoft.com/office/powerpoint/2010/main" val="3690587624"/>
       </p:ext>
     </p:extLst>
   </p:cSld>
@@ -3820,7 +3932,7 @@
               <a:t>Füge ein weiteres sample </a:t>
             </a:r>
             <a:r>
-              <a:rPr lang="de-DE" dirty="0" err="1" smtClean="0"/>
+              <a:rPr lang="de-DE" i="1" dirty="0" err="1" smtClean="0"/>
               <a:t>sn_zome</a:t>
             </a:r>
             <a:r>
@@ -3828,22 +3940,22 @@
               <a:t> mit </a:t>
             </a:r>
             <a:r>
-              <a:rPr lang="de-DE" dirty="0" err="1" smtClean="0"/>
+              <a:rPr lang="de-DE" i="1" dirty="0" err="1" smtClean="0"/>
               <a:t>sleep</a:t>
             </a:r>
             <a:r>
-              <a:rPr lang="de-DE" dirty="0" smtClean="0"/>
-              <a:t> 1 hinzu</a:t>
-            </a:r>
-          </a:p>
-          <a:p>
-            <a:r>
-              <a:rPr lang="de-DE" dirty="0" smtClean="0"/>
-              <a:t>Mach‘ </a:t>
-            </a:r>
-            <a:r>
-              <a:rPr lang="de-DE" dirty="0" smtClean="0"/>
-              <a:t>das Schlagzeug schneller (120)</a:t>
+              <a:rPr lang="de-DE" i="1" dirty="0" smtClean="0"/>
+              <a:t> 1 </a:t>
+            </a:r>
+            <a:r>
+              <a:rPr lang="de-DE" dirty="0" smtClean="0"/>
+              <a:t>hinzu</a:t>
+            </a:r>
+          </a:p>
+          <a:p>
+            <a:r>
+              <a:rPr lang="de-DE" dirty="0" smtClean="0"/>
+              <a:t>Mach‘ das Schlagzeug schneller (120)</a:t>
             </a:r>
           </a:p>
           <a:p>
@@ -3976,7 +4088,7 @@
     </p:spTree>
     <p:extLst>
       <p:ext uri="{BB962C8B-B14F-4D97-AF65-F5344CB8AC3E}">
-        <p14:creationId xmlns:p14="http://schemas.microsoft.com/office/powerpoint/2010/main" val="3397233553"/>
+        <p14:creationId xmlns="" xmlns:p14="http://schemas.microsoft.com/office/powerpoint/2010/main" val="3397233553"/>
       </p:ext>
     </p:extLst>
   </p:cSld>
@@ -4025,7 +4137,11 @@
           <a:bodyPr/>
           <a:lstStyle/>
           <a:p>
-            <a:endParaRPr lang="de-DE"/>
+            <a:r>
+              <a:rPr lang="de-DE" dirty="0" smtClean="0"/>
+              <a:t>Verwende Buffer 5</a:t>
+            </a:r>
+            <a:endParaRPr lang="de-DE" dirty="0"/>
           </a:p>
         </p:txBody>
       </p:sp>
@@ -4131,7 +4247,7 @@
     </p:spTree>
     <p:extLst>
       <p:ext uri="{BB962C8B-B14F-4D97-AF65-F5344CB8AC3E}">
-        <p14:creationId xmlns:p14="http://schemas.microsoft.com/office/powerpoint/2010/main" val="4265769765"/>
+        <p14:creationId xmlns="" xmlns:p14="http://schemas.microsoft.com/office/powerpoint/2010/main" val="4265769765"/>
       </p:ext>
     </p:extLst>
   </p:cSld>
@@ -4201,7 +4317,7 @@
         <p:spPr>
           <a:xfrm>
             <a:off x="404664" y="3275856"/>
-            <a:ext cx="6453336" cy="646331"/>
+            <a:ext cx="6453336" cy="978729"/>
           </a:xfrm>
         </p:spPr>
         <p:txBody>
@@ -4210,14 +4326,25 @@
           <a:p>
             <a:r>
               <a:rPr lang="de-DE" dirty="0" smtClean="0"/>
-              <a:t>Danach kopiere das Schlagzeug (Buffer 4)  und Melodie in einen </a:t>
-            </a:r>
-            <a:br>
-              <a:rPr lang="de-DE" dirty="0" smtClean="0"/>
-            </a:br>
-            <a:r>
-              <a:rPr lang="de-DE" dirty="0" smtClean="0"/>
-              <a:t>Puffer zusammen</a:t>
+              <a:t>Probiere aus.</a:t>
+            </a:r>
+          </a:p>
+          <a:p>
+            <a:r>
+              <a:rPr lang="de-DE" dirty="0" smtClean="0"/>
+              <a:t>Danach </a:t>
+            </a:r>
+            <a:r>
+              <a:rPr lang="de-DE" dirty="0" smtClean="0"/>
+              <a:t>kopiere das Schlagzeug (Buffer 4)  und Melodie in </a:t>
+            </a:r>
+            <a:r>
+              <a:rPr lang="de-DE" dirty="0" smtClean="0"/>
+              <a:t>Buffer 5 </a:t>
+            </a:r>
+            <a:r>
+              <a:rPr lang="de-DE" dirty="0" smtClean="0"/>
+              <a:t>zusammen</a:t>
             </a:r>
           </a:p>
         </p:txBody>
@@ -4234,8 +4361,8 @@
         </p:nvSpPr>
         <p:spPr>
           <a:xfrm>
-            <a:off x="404664" y="7803068"/>
-            <a:ext cx="6453336" cy="1064907"/>
+            <a:off x="404664" y="8244408"/>
+            <a:ext cx="6453336" cy="701731"/>
           </a:xfrm>
         </p:spPr>
         <p:txBody>
@@ -4243,43 +4370,12 @@
           <a:lstStyle/>
           <a:p>
             <a:r>
-              <a:rPr lang="de-DE" sz="2000" dirty="0"/>
-              <a:t>Experimentiere</a:t>
-            </a:r>
-            <a:endParaRPr lang="de-DE" dirty="0" smtClean="0"/>
-          </a:p>
-          <a:p>
-            <a:r>
-              <a:rPr lang="de-DE" dirty="0" err="1" smtClean="0"/>
+              <a:rPr lang="de-DE" dirty="0" smtClean="0"/>
               <a:t>use_bpm</a:t>
             </a:r>
             <a:r>
               <a:rPr lang="de-DE" dirty="0" smtClean="0"/>
-              <a:t>		</a:t>
-            </a:r>
-            <a:r>
-              <a:rPr lang="de-DE" dirty="0" err="1" smtClean="0"/>
-              <a:t>use_synth</a:t>
-            </a:r>
-            <a:r>
-              <a:rPr lang="de-DE" dirty="0" smtClean="0"/>
-              <a:t> :</a:t>
-            </a:r>
-            <a:r>
-              <a:rPr lang="de-DE" dirty="0" err="1" smtClean="0"/>
-              <a:t>hollow</a:t>
-            </a:r>
-            <a:r>
-              <a:rPr lang="de-DE" dirty="0" smtClean="0"/>
-              <a:t>		,</a:t>
-            </a:r>
-            <a:r>
-              <a:rPr lang="de-DE" dirty="0" err="1" smtClean="0"/>
-              <a:t>amp</a:t>
-            </a:r>
-            <a:r>
-              <a:rPr lang="de-DE" dirty="0" smtClean="0"/>
-              <a:t>: 5</a:t>
+              <a:t>		use_synth :hollow		,amp: 5</a:t>
             </a:r>
           </a:p>
           <a:p>
@@ -4496,7 +4592,7 @@
     </p:spTree>
     <p:extLst>
       <p:ext uri="{BB962C8B-B14F-4D97-AF65-F5344CB8AC3E}">
-        <p14:creationId xmlns:p14="http://schemas.microsoft.com/office/powerpoint/2010/main" val="174545010"/>
+        <p14:creationId xmlns="" xmlns:p14="http://schemas.microsoft.com/office/powerpoint/2010/main" val="174545010"/>
       </p:ext>
     </p:extLst>
   </p:cSld>
@@ -4640,8 +4736,8 @@
         </p:nvSpPr>
         <p:spPr>
           <a:xfrm>
-            <a:off x="404664" y="116853"/>
-            <a:ext cx="6048672" cy="2357568"/>
+            <a:off x="404664" y="178407"/>
+            <a:ext cx="6048672" cy="2234458"/>
           </a:xfrm>
         </p:spPr>
         <p:txBody>
@@ -4650,7 +4746,7 @@
           <a:p>
             <a:pPr algn="l"/>
             <a:r>
-              <a:rPr lang="de-DE" dirty="0" smtClean="0"/>
+              <a:rPr lang="de-DE" sz="2400" dirty="0" smtClean="0"/>
               <a:t>Weitere Ideen</a:t>
             </a:r>
           </a:p>
@@ -4660,7 +4756,7 @@
               <a:buChar char="-"/>
             </a:pPr>
             <a:r>
-              <a:rPr lang="de-DE" dirty="0" smtClean="0"/>
+              <a:rPr lang="de-DE" sz="2400" dirty="0" smtClean="0"/>
               <a:t>Mehr Schlagzeug</a:t>
             </a:r>
           </a:p>
@@ -4670,8 +4766,12 @@
               <a:buChar char="-"/>
             </a:pPr>
             <a:r>
-              <a:rPr lang="de-DE" dirty="0" smtClean="0"/>
-              <a:t>Mehr Melodie</a:t>
+              <a:rPr lang="de-DE" sz="2400" dirty="0" smtClean="0"/>
+              <a:t>Mehr </a:t>
+            </a:r>
+            <a:r>
+              <a:rPr lang="de-DE" sz="2400" dirty="0" smtClean="0"/>
+              <a:t>Melodie</a:t>
             </a:r>
           </a:p>
           <a:p>
@@ -4680,7 +4780,18 @@
               <a:buChar char="-"/>
             </a:pPr>
             <a:r>
-              <a:rPr lang="de-DE" dirty="0" smtClean="0"/>
+              <a:rPr lang="de-DE" sz="2400" dirty="0" smtClean="0"/>
+              <a:t>Effekte</a:t>
+            </a:r>
+            <a:endParaRPr lang="de-DE" sz="2400" dirty="0" smtClean="0"/>
+          </a:p>
+          <a:p>
+            <a:pPr marL="114275" indent="-457200" algn="l">
+              <a:buFontTx/>
+              <a:buChar char="-"/>
+            </a:pPr>
+            <a:r>
+              <a:rPr lang="de-DE" sz="2400" dirty="0" smtClean="0"/>
               <a:t>Variablen</a:t>
             </a:r>
           </a:p>
@@ -4721,8 +4832,8 @@
         </p:nvSpPr>
         <p:spPr>
           <a:xfrm>
-            <a:off x="404664" y="4702009"/>
-            <a:ext cx="6048672" cy="3120854"/>
+            <a:off x="404664" y="5080573"/>
+            <a:ext cx="6048672" cy="2363724"/>
           </a:xfrm>
         </p:spPr>
         <p:txBody>
@@ -4731,74 +4842,74 @@
           <a:p>
             <a:pPr algn="l"/>
             <a:r>
-              <a:rPr lang="de-DE" sz="2400" dirty="0" smtClean="0"/>
+              <a:rPr lang="de-DE" sz="1800" dirty="0" smtClean="0"/>
               <a:t>a = 30</a:t>
             </a:r>
           </a:p>
           <a:p>
             <a:pPr algn="l"/>
             <a:r>
-              <a:rPr lang="de-DE" sz="2400" dirty="0" err="1" smtClean="0"/>
+              <a:rPr lang="de-DE" sz="1800" dirty="0" err="1" smtClean="0"/>
               <a:t>if</a:t>
             </a:r>
             <a:r>
-              <a:rPr lang="de-DE" sz="2400" dirty="0" smtClean="0"/>
+              <a:rPr lang="de-DE" sz="1800" dirty="0" smtClean="0"/>
               <a:t> a &lt; 100</a:t>
             </a:r>
           </a:p>
           <a:p>
             <a:pPr algn="l"/>
             <a:r>
-              <a:rPr lang="de-DE" sz="2400" dirty="0"/>
+              <a:rPr lang="de-DE" sz="1800" dirty="0"/>
               <a:t> </a:t>
             </a:r>
             <a:r>
-              <a:rPr lang="de-DE" sz="2400" dirty="0" smtClean="0"/>
+              <a:rPr lang="de-DE" sz="1800" dirty="0" smtClean="0"/>
               <a:t>  a = a +1</a:t>
             </a:r>
           </a:p>
           <a:p>
             <a:pPr algn="l"/>
             <a:r>
-              <a:rPr lang="de-DE" sz="2400" dirty="0"/>
+              <a:rPr lang="de-DE" sz="1800" dirty="0"/>
               <a:t> </a:t>
             </a:r>
             <a:r>
-              <a:rPr lang="de-DE" sz="2400" dirty="0" smtClean="0"/>
+              <a:rPr lang="de-DE" sz="1800" dirty="0" smtClean="0"/>
               <a:t>  </a:t>
             </a:r>
             <a:r>
-              <a:rPr lang="de-DE" sz="2400" dirty="0" err="1" smtClean="0"/>
+              <a:rPr lang="de-DE" sz="1800" dirty="0" err="1" smtClean="0"/>
               <a:t>play</a:t>
             </a:r>
             <a:r>
-              <a:rPr lang="de-DE" sz="2400" dirty="0" smtClean="0"/>
+              <a:rPr lang="de-DE" sz="1800" dirty="0" smtClean="0"/>
               <a:t> a</a:t>
             </a:r>
           </a:p>
           <a:p>
             <a:pPr algn="l"/>
             <a:r>
-              <a:rPr lang="de-DE" sz="2400" dirty="0" err="1" smtClean="0"/>
+              <a:rPr lang="de-DE" sz="1800" dirty="0" err="1" smtClean="0"/>
               <a:t>else</a:t>
             </a:r>
-            <a:endParaRPr lang="de-DE" sz="2400" dirty="0" smtClean="0"/>
+            <a:endParaRPr lang="de-DE" sz="1800" dirty="0" smtClean="0"/>
           </a:p>
           <a:p>
             <a:pPr algn="l"/>
             <a:r>
-              <a:rPr lang="de-DE" sz="2400" dirty="0"/>
+              <a:rPr lang="de-DE" sz="1800" dirty="0"/>
               <a:t> </a:t>
             </a:r>
             <a:r>
-              <a:rPr lang="de-DE" sz="2400" dirty="0" smtClean="0"/>
+              <a:rPr lang="de-DE" sz="1800" dirty="0" smtClean="0"/>
               <a:t>  a = 30</a:t>
             </a:r>
           </a:p>
           <a:p>
             <a:pPr algn="l"/>
             <a:r>
-              <a:rPr lang="de-DE" sz="2400" dirty="0" smtClean="0"/>
+              <a:rPr lang="de-DE" sz="1800" dirty="0" smtClean="0"/>
               <a:t>end  </a:t>
             </a:r>
           </a:p>
@@ -4807,7 +4918,7 @@
     </p:spTree>
     <p:extLst>
       <p:ext uri="{BB962C8B-B14F-4D97-AF65-F5344CB8AC3E}">
-        <p14:creationId xmlns:p14="http://schemas.microsoft.com/office/powerpoint/2010/main" val="1805105135"/>
+        <p14:creationId xmlns="" xmlns:p14="http://schemas.microsoft.com/office/powerpoint/2010/main" val="1805105135"/>
       </p:ext>
     </p:extLst>
   </p:cSld>
@@ -4843,141 +4954,86 @@
       </p:grpSpPr>
       <p:sp>
         <p:nvSpPr>
-          <p:cNvPr id="8" name="Rectangle 7"/>
-          <p:cNvSpPr/>
-          <p:nvPr/>
-        </p:nvSpPr>
-        <p:spPr>
-          <a:xfrm>
-            <a:off x="-16260" y="585864"/>
-            <a:ext cx="6858000" cy="8532440"/>
-          </a:xfrm>
-          <a:prstGeom prst="rect">
-            <a:avLst/>
-          </a:prstGeom>
-          <a:solidFill>
-            <a:schemeClr val="bg1"/>
-          </a:solidFill>
-          <a:ln>
-            <a:solidFill>
-              <a:schemeClr val="bg1"/>
-            </a:solidFill>
-          </a:ln>
-        </p:spPr>
-        <p:style>
-          <a:lnRef idx="2">
-            <a:schemeClr val="accent1">
-              <a:shade val="50000"/>
-            </a:schemeClr>
-          </a:lnRef>
-          <a:fillRef idx="1">
-            <a:schemeClr val="accent1"/>
-          </a:fillRef>
-          <a:effectRef idx="0">
-            <a:schemeClr val="accent1"/>
-          </a:effectRef>
-          <a:fontRef idx="minor">
-            <a:schemeClr val="lt1"/>
-          </a:fontRef>
-        </p:style>
-        <p:txBody>
-          <a:bodyPr rtlCol="0" anchor="ctr"/>
-          <a:lstStyle/>
-          <a:p>
-            <a:endParaRPr lang="en-US" dirty="0" smtClean="0">
-              <a:solidFill>
-                <a:schemeClr val="tx1"/>
-              </a:solidFill>
-            </a:endParaRPr>
-          </a:p>
-        </p:txBody>
-      </p:sp>
-      <p:sp>
-        <p:nvSpPr>
-          <p:cNvPr id="9" name="TextBox 8"/>
-          <p:cNvSpPr txBox="1"/>
-          <p:nvPr/>
-        </p:nvSpPr>
-        <p:spPr>
-          <a:xfrm>
-            <a:off x="2448218" y="179512"/>
-            <a:ext cx="1961563" cy="584775"/>
-          </a:xfrm>
-          <a:prstGeom prst="rect">
-            <a:avLst/>
-          </a:prstGeom>
-          <a:noFill/>
-        </p:spPr>
-        <p:txBody>
-          <a:bodyPr wrap="none" rtlCol="0">
-            <a:spAutoFit/>
-          </a:bodyPr>
-          <a:lstStyle/>
-          <a:p>
-            <a:r>
-              <a:rPr lang="de-DE" sz="3200" dirty="0" smtClean="0">
-                <a:solidFill>
-                  <a:schemeClr val="accent6"/>
-                </a:solidFill>
-              </a:rPr>
-              <a:t>Spickzettel</a:t>
-            </a:r>
-            <a:endParaRPr lang="de-DE" sz="3200" dirty="0">
-              <a:solidFill>
-                <a:schemeClr val="accent6"/>
-              </a:solidFill>
-            </a:endParaRPr>
-          </a:p>
-        </p:txBody>
-      </p:sp>
-      <p:sp>
-        <p:nvSpPr>
-          <p:cNvPr id="4" name="Rectangle 3"/>
-          <p:cNvSpPr/>
-          <p:nvPr/>
-        </p:nvSpPr>
-        <p:spPr>
-          <a:xfrm>
-            <a:off x="476672" y="1835696"/>
-            <a:ext cx="3933109" cy="369332"/>
-          </a:xfrm>
-          <a:prstGeom prst="rect">
-            <a:avLst/>
-          </a:prstGeom>
-        </p:spPr>
-        <p:style>
-          <a:lnRef idx="1">
-            <a:schemeClr val="accent6"/>
-          </a:lnRef>
-          <a:fillRef idx="2">
-            <a:schemeClr val="accent6"/>
-          </a:fillRef>
-          <a:effectRef idx="1">
-            <a:schemeClr val="accent6"/>
-          </a:effectRef>
-          <a:fontRef idx="minor">
-            <a:schemeClr val="dk1"/>
-          </a:fontRef>
-        </p:style>
-        <p:txBody>
-          <a:bodyPr wrap="square" rtlCol="0">
-            <a:spAutoFit/>
-          </a:bodyPr>
-          <a:lstStyle/>
-          <a:p>
+          <p:cNvPr id="14" name="Text Placeholder 13"/>
+          <p:cNvSpPr>
+            <a:spLocks noGrp="1"/>
+          </p:cNvSpPr>
+          <p:nvPr>
+            <p:ph type="body" sz="quarter" idx="15"/>
+          </p:nvPr>
+        </p:nvSpPr>
+        <p:spPr/>
+        <p:txBody>
+          <a:bodyPr/>
+          <a:lstStyle/>
+          <a:p>
+            <a:r>
+              <a:rPr lang="de-DE" dirty="0" smtClean="0"/>
+              <a:t>So kann man Effekte verwenden</a:t>
+            </a:r>
+            <a:endParaRPr lang="de-DE" dirty="0"/>
+          </a:p>
+        </p:txBody>
+      </p:sp>
+      <p:sp>
+        <p:nvSpPr>
+          <p:cNvPr id="15" name="Text Placeholder 14"/>
+          <p:cNvSpPr>
+            <a:spLocks noGrp="1"/>
+          </p:cNvSpPr>
+          <p:nvPr>
+            <p:ph type="body" sz="quarter" idx="18"/>
+          </p:nvPr>
+        </p:nvSpPr>
+        <p:spPr>
+          <a:xfrm>
+            <a:off x="404664" y="3203848"/>
+            <a:ext cx="6453336" cy="1311128"/>
+          </a:xfrm>
+        </p:spPr>
+        <p:txBody>
+          <a:bodyPr/>
+          <a:lstStyle/>
+          <a:p>
+            <a:pPr>
+              <a:buFontTx/>
+              <a:buChar char="-"/>
+            </a:pPr>
+            <a:r>
+              <a:rPr lang="de-DE" dirty="0" smtClean="0"/>
+              <a:t>Fx </a:t>
+            </a:r>
             <a:r>
               <a:rPr lang="de-DE" dirty="0"/>
-              <a:t>play :c4  </a:t>
-            </a:r>
-            <a:r>
-              <a:rPr lang="de-DE" dirty="0" smtClean="0">
-                <a:sym typeface="Wingdings" pitchFamily="2" charset="2"/>
-              </a:rPr>
-              <a:t>   Tonleiter  = </a:t>
-            </a:r>
-            <a:r>
-              <a:rPr lang="de-DE" dirty="0" err="1" smtClean="0"/>
-              <a:t>c,d,e,f,g,a,b,c</a:t>
+              <a:t>steht für „Effects“ = Effekte. </a:t>
+            </a:r>
+            <a:r>
+              <a:rPr lang="de-DE" dirty="0"/>
+              <a:t>Jeder Effekt kann auch „Parameter“ haben: Hier die Größe des Raums für den Hall</a:t>
+            </a:r>
+          </a:p>
+          <a:p>
+            <a:pPr>
+              <a:buFontTx/>
+              <a:buChar char="-"/>
+            </a:pPr>
+            <a:r>
+              <a:rPr lang="de-DE" dirty="0"/>
+              <a:t>Probiere andere Effekte aus (siehe Fx in der Hilfe</a:t>
+            </a:r>
+            <a:r>
+              <a:rPr lang="de-DE" dirty="0" smtClean="0"/>
+              <a:t>)</a:t>
+            </a:r>
+          </a:p>
+          <a:p>
+            <a:pPr>
+              <a:buFontTx/>
+              <a:buChar char="-"/>
+            </a:pPr>
+            <a:r>
+              <a:rPr lang="de-DE" dirty="0" smtClean="0"/>
+              <a:t>Verwende play und choose mit Geschwindigkeit 300</a:t>
             </a:r>
             <a:endParaRPr lang="de-DE" dirty="0"/>
           </a:p>
@@ -4985,781 +5041,155 @@
       </p:sp>
       <p:sp>
         <p:nvSpPr>
-          <p:cNvPr id="5" name="Rectangle 4"/>
-          <p:cNvSpPr/>
-          <p:nvPr/>
-        </p:nvSpPr>
-        <p:spPr>
-          <a:xfrm>
-            <a:off x="4221088" y="1259632"/>
-            <a:ext cx="849913" cy="369332"/>
-          </a:xfrm>
-          <a:prstGeom prst="rect">
-            <a:avLst/>
-          </a:prstGeom>
-        </p:spPr>
-        <p:style>
-          <a:lnRef idx="1">
-            <a:schemeClr val="accent6"/>
-          </a:lnRef>
-          <a:fillRef idx="2">
-            <a:schemeClr val="accent6"/>
-          </a:fillRef>
-          <a:effectRef idx="1">
-            <a:schemeClr val="accent6"/>
-          </a:effectRef>
-          <a:fontRef idx="minor">
-            <a:schemeClr val="dk1"/>
-          </a:fontRef>
-        </p:style>
-        <p:txBody>
-          <a:bodyPr wrap="square" rtlCol="0">
-            <a:spAutoFit/>
-          </a:bodyPr>
-          <a:lstStyle/>
-          <a:p>
-            <a:r>
-              <a:rPr lang="de-DE" dirty="0">
-                <a:solidFill>
-                  <a:schemeClr val="dk1"/>
-                </a:solidFill>
-              </a:rPr>
-              <a:t>sleep 1</a:t>
-            </a:r>
-          </a:p>
-        </p:txBody>
-      </p:sp>
-      <p:sp>
-        <p:nvSpPr>
-          <p:cNvPr id="6" name="Rectangle 5"/>
-          <p:cNvSpPr/>
-          <p:nvPr/>
-        </p:nvSpPr>
-        <p:spPr>
-          <a:xfrm>
-            <a:off x="3140968" y="2555776"/>
-            <a:ext cx="2501582" cy="369332"/>
-          </a:xfrm>
-          <a:prstGeom prst="rect">
-            <a:avLst/>
-          </a:prstGeom>
-        </p:spPr>
-        <p:style>
-          <a:lnRef idx="1">
-            <a:schemeClr val="accent6"/>
-          </a:lnRef>
-          <a:fillRef idx="2">
-            <a:schemeClr val="accent6"/>
-          </a:fillRef>
-          <a:effectRef idx="1">
-            <a:schemeClr val="accent6"/>
-          </a:effectRef>
-          <a:fontRef idx="minor">
-            <a:schemeClr val="dk1"/>
-          </a:fontRef>
-        </p:style>
-        <p:txBody>
-          <a:bodyPr wrap="square" rtlCol="0">
-            <a:spAutoFit/>
-          </a:bodyPr>
-          <a:lstStyle/>
-          <a:p>
-            <a:r>
-              <a:rPr lang="de-DE" dirty="0">
-                <a:solidFill>
-                  <a:schemeClr val="dk1"/>
-                </a:solidFill>
-              </a:rPr>
-              <a:t>play_chord [:c4, :e4, :g4]</a:t>
-            </a:r>
-          </a:p>
-        </p:txBody>
-      </p:sp>
-      <p:sp>
-        <p:nvSpPr>
-          <p:cNvPr id="7" name="Rectangle 6"/>
-          <p:cNvSpPr/>
-          <p:nvPr/>
-        </p:nvSpPr>
-        <p:spPr>
-          <a:xfrm>
-            <a:off x="980728" y="3275856"/>
-            <a:ext cx="4942763" cy="369332"/>
-          </a:xfrm>
-          <a:prstGeom prst="rect">
-            <a:avLst/>
-          </a:prstGeom>
-        </p:spPr>
-        <p:style>
-          <a:lnRef idx="1">
-            <a:schemeClr val="accent6"/>
-          </a:lnRef>
-          <a:fillRef idx="2">
-            <a:schemeClr val="accent6"/>
-          </a:fillRef>
-          <a:effectRef idx="1">
-            <a:schemeClr val="accent6"/>
-          </a:effectRef>
-          <a:fontRef idx="minor">
-            <a:schemeClr val="dk1"/>
-          </a:fontRef>
-        </p:style>
-        <p:txBody>
-          <a:bodyPr wrap="square" rtlCol="0">
-            <a:spAutoFit/>
-          </a:bodyPr>
-          <a:lstStyle/>
-          <a:p>
-            <a:r>
-              <a:rPr lang="en-US" dirty="0" err="1">
-                <a:solidFill>
-                  <a:schemeClr val="dk1"/>
-                </a:solidFill>
-              </a:rPr>
-              <a:t>play_chord</a:t>
-            </a:r>
-            <a:r>
-              <a:rPr lang="en-US" dirty="0">
-                <a:solidFill>
-                  <a:schemeClr val="dk1"/>
-                </a:solidFill>
-              </a:rPr>
-              <a:t> chord(:e4, :major)     </a:t>
-            </a:r>
-            <a:r>
-              <a:rPr lang="en-US" dirty="0">
-                <a:solidFill>
-                  <a:schemeClr val="dk1"/>
-                </a:solidFill>
-                <a:sym typeface="Wingdings" pitchFamily="2" charset="2"/>
-              </a:rPr>
-              <a:t> major, minor… </a:t>
-            </a:r>
-            <a:endParaRPr lang="en-US" dirty="0">
-              <a:solidFill>
-                <a:schemeClr val="dk1"/>
-              </a:solidFill>
-            </a:endParaRPr>
-          </a:p>
-        </p:txBody>
-      </p:sp>
-      <p:sp>
-        <p:nvSpPr>
-          <p:cNvPr id="10" name="Rectangle 9"/>
-          <p:cNvSpPr/>
-          <p:nvPr/>
-        </p:nvSpPr>
-        <p:spPr>
-          <a:xfrm>
-            <a:off x="1628800" y="971600"/>
-            <a:ext cx="856838" cy="369332"/>
-          </a:xfrm>
-          <a:prstGeom prst="rect">
-            <a:avLst/>
-          </a:prstGeom>
-        </p:spPr>
-        <p:style>
-          <a:lnRef idx="1">
-            <a:schemeClr val="accent6"/>
-          </a:lnRef>
-          <a:fillRef idx="2">
-            <a:schemeClr val="accent6"/>
-          </a:fillRef>
-          <a:effectRef idx="1">
-            <a:schemeClr val="accent6"/>
-          </a:effectRef>
-          <a:fontRef idx="minor">
-            <a:schemeClr val="dk1"/>
-          </a:fontRef>
-        </p:style>
-        <p:txBody>
-          <a:bodyPr wrap="square" rtlCol="0">
-            <a:spAutoFit/>
-          </a:bodyPr>
-          <a:lstStyle/>
-          <a:p>
-            <a:r>
-              <a:rPr lang="de-DE" dirty="0">
-                <a:solidFill>
-                  <a:schemeClr val="dk1"/>
-                </a:solidFill>
-              </a:rPr>
-              <a:t>play 60</a:t>
-            </a:r>
-          </a:p>
-        </p:txBody>
-      </p:sp>
-      <p:sp>
-        <p:nvSpPr>
-          <p:cNvPr id="11" name="Rectangle 10"/>
-          <p:cNvSpPr/>
-          <p:nvPr/>
-        </p:nvSpPr>
-        <p:spPr>
-          <a:xfrm>
-            <a:off x="548680" y="5652120"/>
-            <a:ext cx="1459054" cy="369332"/>
-          </a:xfrm>
-          <a:prstGeom prst="rect">
-            <a:avLst/>
-          </a:prstGeom>
-        </p:spPr>
-        <p:style>
-          <a:lnRef idx="1">
-            <a:schemeClr val="accent6"/>
-          </a:lnRef>
-          <a:fillRef idx="2">
-            <a:schemeClr val="accent6"/>
-          </a:fillRef>
-          <a:effectRef idx="1">
-            <a:schemeClr val="accent6"/>
-          </a:effectRef>
-          <a:fontRef idx="minor">
-            <a:schemeClr val="dk1"/>
-          </a:fontRef>
-        </p:style>
-        <p:txBody>
-          <a:bodyPr wrap="square" rtlCol="0">
-            <a:spAutoFit/>
-          </a:bodyPr>
-          <a:lstStyle/>
-          <a:p>
-            <a:r>
-              <a:rPr lang="de-DE" dirty="0">
-                <a:solidFill>
-                  <a:schemeClr val="dk1"/>
-                </a:solidFill>
-              </a:rPr>
-              <a:t>use_bpm 600</a:t>
-            </a:r>
-          </a:p>
-        </p:txBody>
-      </p:sp>
-      <p:sp>
-        <p:nvSpPr>
-          <p:cNvPr id="12" name="Rectangle 11"/>
-          <p:cNvSpPr/>
-          <p:nvPr/>
-        </p:nvSpPr>
-        <p:spPr>
-          <a:xfrm>
-            <a:off x="260648" y="4139952"/>
-            <a:ext cx="4764125" cy="369332"/>
-          </a:xfrm>
-          <a:prstGeom prst="rect">
-            <a:avLst/>
-          </a:prstGeom>
-        </p:spPr>
-        <p:style>
-          <a:lnRef idx="1">
-            <a:schemeClr val="accent6"/>
-          </a:lnRef>
-          <a:fillRef idx="2">
-            <a:schemeClr val="accent6"/>
-          </a:fillRef>
-          <a:effectRef idx="1">
-            <a:schemeClr val="accent6"/>
-          </a:effectRef>
-          <a:fontRef idx="minor">
-            <a:schemeClr val="dk1"/>
-          </a:fontRef>
-        </p:style>
-        <p:txBody>
-          <a:bodyPr wrap="square" rtlCol="0">
-            <a:spAutoFit/>
-          </a:bodyPr>
-          <a:lstStyle/>
-          <a:p>
-            <a:r>
-              <a:rPr lang="de-DE" dirty="0" err="1">
-                <a:solidFill>
-                  <a:schemeClr val="dk1"/>
-                </a:solidFill>
-              </a:rPr>
+          <p:cNvPr id="16" name="Text Placeholder 15"/>
+          <p:cNvSpPr>
+            <a:spLocks noGrp="1"/>
+          </p:cNvSpPr>
+          <p:nvPr>
+            <p:ph type="body" sz="quarter" idx="17"/>
+          </p:nvPr>
+        </p:nvSpPr>
+        <p:spPr>
+          <a:xfrm>
+            <a:off x="404664" y="511529"/>
+            <a:ext cx="6048672" cy="2234458"/>
+          </a:xfrm>
+        </p:spPr>
+        <p:txBody>
+          <a:bodyPr/>
+          <a:lstStyle/>
+          <a:p>
+            <a:pPr algn="l"/>
+            <a:r>
+              <a:rPr lang="en-US" sz="2400" dirty="0" err="1"/>
+              <a:t>live_loop</a:t>
+            </a:r>
+            <a:r>
+              <a:rPr lang="en-US" sz="2400" dirty="0"/>
+              <a:t> :</a:t>
+            </a:r>
+            <a:r>
+              <a:rPr lang="en-US" sz="2400" dirty="0" err="1"/>
+              <a:t>mitHall</a:t>
+            </a:r>
+            <a:r>
+              <a:rPr lang="en-US" sz="2400" dirty="0"/>
+              <a:t> do</a:t>
+            </a:r>
+          </a:p>
+          <a:p>
+            <a:pPr algn="l"/>
+            <a:r>
+              <a:rPr lang="en-US" sz="2400" dirty="0"/>
+              <a:t>  </a:t>
+            </a:r>
+            <a:r>
+              <a:rPr lang="en-US" sz="2400" dirty="0" err="1"/>
+              <a:t>with_fx</a:t>
+            </a:r>
+            <a:r>
+              <a:rPr lang="en-US" sz="2400" dirty="0"/>
+              <a:t> :reverb, room: 0.9 do</a:t>
+            </a:r>
+          </a:p>
+          <a:p>
+            <a:pPr algn="l"/>
+            <a:r>
+              <a:rPr lang="en-US" sz="2400" dirty="0"/>
+              <a:t>    </a:t>
+            </a:r>
+            <a:r>
+              <a:rPr lang="en-US" sz="2400" dirty="0" err="1"/>
               <a:t>play_pattern</a:t>
             </a:r>
             <a:r>
-              <a:rPr lang="de-DE" dirty="0">
-                <a:solidFill>
-                  <a:schemeClr val="dk1"/>
-                </a:solidFill>
-              </a:rPr>
-              <a:t> </a:t>
-            </a:r>
-            <a:r>
-              <a:rPr lang="de-DE" dirty="0" smtClean="0">
-                <a:solidFill>
-                  <a:schemeClr val="dk1"/>
-                </a:solidFill>
-              </a:rPr>
-              <a:t>(</a:t>
-            </a:r>
-            <a:r>
-              <a:rPr lang="de-DE" dirty="0" err="1" smtClean="0">
-                <a:solidFill>
-                  <a:schemeClr val="dk1"/>
-                </a:solidFill>
-              </a:rPr>
-              <a:t>scale</a:t>
-            </a:r>
-            <a:r>
-              <a:rPr lang="de-DE" dirty="0" smtClean="0">
-                <a:solidFill>
-                  <a:schemeClr val="dk1"/>
-                </a:solidFill>
-              </a:rPr>
-              <a:t> :e4</a:t>
-            </a:r>
-            <a:r>
-              <a:rPr lang="de-DE" dirty="0">
-                <a:solidFill>
-                  <a:schemeClr val="dk1"/>
-                </a:solidFill>
-              </a:rPr>
-              <a:t>, :minor) </a:t>
-            </a:r>
-            <a:r>
-              <a:rPr lang="de-DE" dirty="0">
-                <a:solidFill>
-                  <a:schemeClr val="dk1"/>
-                </a:solidFill>
-                <a:sym typeface="Wingdings" pitchFamily="2" charset="2"/>
-              </a:rPr>
-              <a:t> </a:t>
-            </a:r>
-            <a:r>
-              <a:rPr lang="de-DE" dirty="0" smtClean="0">
-                <a:solidFill>
-                  <a:schemeClr val="dk1"/>
-                </a:solidFill>
-                <a:sym typeface="Wingdings" pitchFamily="2" charset="2"/>
-              </a:rPr>
-              <a:t>.</a:t>
-            </a:r>
-            <a:r>
-              <a:rPr lang="de-DE" dirty="0" err="1" smtClean="0">
-                <a:solidFill>
-                  <a:schemeClr val="dk1"/>
-                </a:solidFill>
-              </a:rPr>
-              <a:t>reverse</a:t>
-            </a:r>
-            <a:endParaRPr lang="de-DE" dirty="0">
-              <a:solidFill>
-                <a:schemeClr val="dk1"/>
-              </a:solidFill>
-            </a:endParaRPr>
-          </a:p>
-        </p:txBody>
-      </p:sp>
-      <p:sp>
-        <p:nvSpPr>
-          <p:cNvPr id="13" name="Rectangle 12"/>
-          <p:cNvSpPr/>
-          <p:nvPr/>
-        </p:nvSpPr>
-        <p:spPr>
-          <a:xfrm>
-            <a:off x="4646044" y="6304202"/>
-            <a:ext cx="1440160" cy="923330"/>
-          </a:xfrm>
-          <a:prstGeom prst="rect">
-            <a:avLst/>
-          </a:prstGeom>
-        </p:spPr>
-        <p:style>
-          <a:lnRef idx="1">
-            <a:schemeClr val="accent6"/>
-          </a:lnRef>
-          <a:fillRef idx="2">
-            <a:schemeClr val="accent6"/>
-          </a:fillRef>
-          <a:effectRef idx="1">
-            <a:schemeClr val="accent6"/>
-          </a:effectRef>
-          <a:fontRef idx="minor">
-            <a:schemeClr val="dk1"/>
-          </a:fontRef>
-        </p:style>
-        <p:txBody>
-          <a:bodyPr wrap="square" rtlCol="0">
-            <a:spAutoFit/>
-          </a:bodyPr>
-          <a:lstStyle/>
-          <a:p>
-            <a:r>
-              <a:rPr lang="de-DE" dirty="0">
-                <a:solidFill>
-                  <a:schemeClr val="dk1"/>
-                </a:solidFill>
-              </a:rPr>
-              <a:t>2.times do</a:t>
-            </a:r>
-          </a:p>
-          <a:p>
-            <a:r>
-              <a:rPr lang="de-DE" dirty="0">
-                <a:solidFill>
-                  <a:schemeClr val="dk1"/>
-                </a:solidFill>
-              </a:rPr>
-              <a:t>   ...</a:t>
-            </a:r>
-          </a:p>
-          <a:p>
-            <a:r>
-              <a:rPr lang="de-DE" dirty="0">
-                <a:solidFill>
-                  <a:schemeClr val="dk1"/>
-                </a:solidFill>
-              </a:rPr>
+              <a:rPr lang="en-US" sz="2400" dirty="0"/>
+              <a:t> (scale :e4, :minor)</a:t>
+            </a:r>
+          </a:p>
+          <a:p>
+            <a:pPr algn="l"/>
+            <a:r>
+              <a:rPr lang="en-US" sz="2400" dirty="0"/>
+              <a:t>  end</a:t>
+            </a:r>
+          </a:p>
+          <a:p>
+            <a:pPr algn="l"/>
+            <a:r>
+              <a:rPr lang="en-US" sz="2400" dirty="0"/>
               <a:t>end</a:t>
             </a:r>
-          </a:p>
-        </p:txBody>
-      </p:sp>
-      <p:sp>
-        <p:nvSpPr>
-          <p:cNvPr id="14" name="Rectangle 13"/>
-          <p:cNvSpPr/>
-          <p:nvPr/>
-        </p:nvSpPr>
-        <p:spPr>
-          <a:xfrm>
-            <a:off x="332656" y="6660232"/>
-            <a:ext cx="3429000" cy="923330"/>
-          </a:xfrm>
-          <a:prstGeom prst="rect">
-            <a:avLst/>
-          </a:prstGeom>
-        </p:spPr>
-        <p:style>
-          <a:lnRef idx="1">
-            <a:schemeClr val="accent6"/>
-          </a:lnRef>
-          <a:fillRef idx="2">
-            <a:schemeClr val="accent6"/>
-          </a:fillRef>
-          <a:effectRef idx="1">
-            <a:schemeClr val="accent6"/>
-          </a:effectRef>
-          <a:fontRef idx="minor">
-            <a:schemeClr val="dk1"/>
-          </a:fontRef>
-        </p:style>
-        <p:txBody>
-          <a:bodyPr wrap="square" rtlCol="0">
-            <a:spAutoFit/>
-          </a:bodyPr>
-          <a:lstStyle/>
-          <a:p>
-            <a:r>
-              <a:rPr lang="de-DE" dirty="0">
-                <a:solidFill>
-                  <a:schemeClr val="dk1"/>
-                </a:solidFill>
-              </a:rPr>
-              <a:t>live_loop :meineEndlosschleife do</a:t>
-            </a:r>
-          </a:p>
-          <a:p>
-            <a:r>
-              <a:rPr lang="de-DE" dirty="0">
-                <a:solidFill>
-                  <a:schemeClr val="dk1"/>
-                </a:solidFill>
-              </a:rPr>
-              <a:t>   ...</a:t>
-            </a:r>
-          </a:p>
-          <a:p>
-            <a:r>
-              <a:rPr lang="de-DE" dirty="0">
-                <a:solidFill>
-                  <a:schemeClr val="dk1"/>
-                </a:solidFill>
-              </a:rPr>
-              <a:t>end</a:t>
-            </a:r>
-          </a:p>
-        </p:txBody>
-      </p:sp>
-      <p:sp>
-        <p:nvSpPr>
-          <p:cNvPr id="15" name="Rectangle 14"/>
-          <p:cNvSpPr/>
-          <p:nvPr/>
-        </p:nvSpPr>
-        <p:spPr>
-          <a:xfrm>
-            <a:off x="2852936" y="8172400"/>
-            <a:ext cx="3397084" cy="369332"/>
-          </a:xfrm>
-          <a:prstGeom prst="rect">
-            <a:avLst/>
-          </a:prstGeom>
-        </p:spPr>
-        <p:style>
-          <a:lnRef idx="1">
-            <a:schemeClr val="accent6"/>
-          </a:lnRef>
-          <a:fillRef idx="2">
-            <a:schemeClr val="accent6"/>
-          </a:fillRef>
-          <a:effectRef idx="1">
-            <a:schemeClr val="accent6"/>
-          </a:effectRef>
-          <a:fontRef idx="minor">
-            <a:schemeClr val="dk1"/>
-          </a:fontRef>
-        </p:style>
-        <p:txBody>
-          <a:bodyPr wrap="square" rtlCol="0">
-            <a:spAutoFit/>
-          </a:bodyPr>
-          <a:lstStyle/>
-          <a:p>
-            <a:r>
-              <a:rPr lang="de-DE" dirty="0">
-                <a:solidFill>
-                  <a:schemeClr val="dk1"/>
-                </a:solidFill>
-              </a:rPr>
-              <a:t>sample :bd_haus </a:t>
-            </a:r>
-            <a:r>
-              <a:rPr lang="de-DE" dirty="0">
-                <a:solidFill>
-                  <a:schemeClr val="dk1"/>
-                </a:solidFill>
-                <a:sym typeface="Wingdings" pitchFamily="2" charset="2"/>
-              </a:rPr>
-              <a:t> </a:t>
-            </a:r>
-            <a:r>
-              <a:rPr lang="de-DE" dirty="0">
-                <a:solidFill>
-                  <a:schemeClr val="dk1"/>
-                </a:solidFill>
-              </a:rPr>
-              <a:t>:guit_em9 ... </a:t>
-            </a:r>
-            <a:r>
-              <a:rPr lang="de-DE" dirty="0">
-                <a:solidFill>
-                  <a:schemeClr val="dk1"/>
-                </a:solidFill>
-                <a:sym typeface="Wingdings" pitchFamily="2" charset="2"/>
-              </a:rPr>
-              <a:t> </a:t>
-            </a:r>
-            <a:endParaRPr lang="de-DE" dirty="0">
-              <a:solidFill>
-                <a:schemeClr val="dk1"/>
-              </a:solidFill>
-            </a:endParaRPr>
-          </a:p>
-        </p:txBody>
-      </p:sp>
-      <p:sp>
-        <p:nvSpPr>
-          <p:cNvPr id="16" name="Rectangle 15"/>
-          <p:cNvSpPr/>
-          <p:nvPr/>
-        </p:nvSpPr>
-        <p:spPr>
-          <a:xfrm>
-            <a:off x="2602940" y="5546485"/>
-            <a:ext cx="3994412" cy="369332"/>
-          </a:xfrm>
-          <a:prstGeom prst="rect">
-            <a:avLst/>
-          </a:prstGeom>
-        </p:spPr>
-        <p:style>
-          <a:lnRef idx="1">
-            <a:schemeClr val="accent6"/>
-          </a:lnRef>
-          <a:fillRef idx="2">
-            <a:schemeClr val="accent6"/>
-          </a:fillRef>
-          <a:effectRef idx="1">
-            <a:schemeClr val="accent6"/>
-          </a:effectRef>
-          <a:fontRef idx="minor">
-            <a:schemeClr val="dk1"/>
-          </a:fontRef>
-        </p:style>
-        <p:txBody>
-          <a:bodyPr wrap="square" rtlCol="0">
-            <a:spAutoFit/>
-          </a:bodyPr>
-          <a:lstStyle/>
-          <a:p>
-            <a:r>
-              <a:rPr lang="de-DE" dirty="0">
-                <a:solidFill>
-                  <a:schemeClr val="dk1"/>
-                </a:solidFill>
-              </a:rPr>
-              <a:t>use_synth :hollow </a:t>
-            </a:r>
-            <a:r>
-              <a:rPr lang="de-DE" dirty="0">
-                <a:solidFill>
-                  <a:schemeClr val="dk1"/>
-                </a:solidFill>
-                <a:sym typeface="Wingdings" pitchFamily="2" charset="2"/>
-              </a:rPr>
-              <a:t> saw, </a:t>
-            </a:r>
-            <a:r>
-              <a:rPr lang="de-DE" dirty="0" err="1" smtClean="0">
-                <a:solidFill>
-                  <a:schemeClr val="dk1"/>
-                </a:solidFill>
-                <a:sym typeface="Wingdings" pitchFamily="2" charset="2"/>
-              </a:rPr>
-              <a:t>hoover</a:t>
-            </a:r>
-            <a:r>
-              <a:rPr lang="de-DE" dirty="0" smtClean="0">
-                <a:sym typeface="Wingdings" pitchFamily="2" charset="2"/>
-              </a:rPr>
-              <a:t>, piano</a:t>
-            </a:r>
-            <a:r>
-              <a:rPr lang="de-DE" dirty="0" smtClean="0">
-                <a:solidFill>
-                  <a:schemeClr val="dk1"/>
-                </a:solidFill>
-                <a:sym typeface="Wingdings" pitchFamily="2" charset="2"/>
-              </a:rPr>
-              <a:t> </a:t>
-            </a:r>
-            <a:endParaRPr lang="de-DE" dirty="0">
-              <a:solidFill>
-                <a:schemeClr val="dk1"/>
-              </a:solidFill>
-            </a:endParaRPr>
-          </a:p>
-        </p:txBody>
-      </p:sp>
-      <p:sp>
-        <p:nvSpPr>
-          <p:cNvPr id="17" name="Rectangle 16"/>
-          <p:cNvSpPr/>
-          <p:nvPr/>
-        </p:nvSpPr>
-        <p:spPr>
-          <a:xfrm>
-            <a:off x="260648" y="4738082"/>
-            <a:ext cx="4764125" cy="369332"/>
-          </a:xfrm>
-          <a:prstGeom prst="rect">
-            <a:avLst/>
-          </a:prstGeom>
-        </p:spPr>
-        <p:style>
-          <a:lnRef idx="1">
-            <a:schemeClr val="accent6"/>
-          </a:lnRef>
-          <a:fillRef idx="2">
-            <a:schemeClr val="accent6"/>
-          </a:fillRef>
-          <a:effectRef idx="1">
-            <a:schemeClr val="accent6"/>
-          </a:effectRef>
-          <a:fontRef idx="minor">
-            <a:schemeClr val="dk1"/>
-          </a:fontRef>
-        </p:style>
-        <p:txBody>
-          <a:bodyPr wrap="square" rtlCol="0">
-            <a:spAutoFit/>
-          </a:bodyPr>
-          <a:lstStyle/>
-          <a:p>
-            <a:r>
-              <a:rPr lang="de-DE" dirty="0" err="1"/>
-              <a:t>p</a:t>
-            </a:r>
-            <a:r>
-              <a:rPr lang="de-DE" dirty="0" err="1" smtClean="0">
-                <a:solidFill>
-                  <a:schemeClr val="dk1"/>
-                </a:solidFill>
-              </a:rPr>
-              <a:t>lay</a:t>
-            </a:r>
-            <a:r>
-              <a:rPr lang="de-DE" dirty="0" smtClean="0">
-                <a:solidFill>
-                  <a:schemeClr val="dk1"/>
-                </a:solidFill>
-              </a:rPr>
-              <a:t>                </a:t>
-            </a:r>
-            <a:r>
-              <a:rPr lang="de-DE" dirty="0" smtClean="0">
-                <a:solidFill>
-                  <a:schemeClr val="dk1"/>
-                </a:solidFill>
-              </a:rPr>
-              <a:t>(</a:t>
-            </a:r>
-            <a:r>
-              <a:rPr lang="de-DE" dirty="0" err="1" smtClean="0">
-                <a:solidFill>
-                  <a:schemeClr val="dk1"/>
-                </a:solidFill>
-              </a:rPr>
-              <a:t>scale</a:t>
-            </a:r>
-            <a:r>
-              <a:rPr lang="de-DE" dirty="0" smtClean="0">
-                <a:solidFill>
-                  <a:schemeClr val="dk1"/>
-                </a:solidFill>
-              </a:rPr>
-              <a:t> :e4</a:t>
-            </a:r>
-            <a:r>
-              <a:rPr lang="de-DE" dirty="0">
-                <a:solidFill>
-                  <a:schemeClr val="dk1"/>
-                </a:solidFill>
-              </a:rPr>
-              <a:t>, :minor</a:t>
-            </a:r>
-            <a:r>
-              <a:rPr lang="de-DE" dirty="0" smtClean="0">
-                <a:solidFill>
-                  <a:schemeClr val="dk1"/>
-                </a:solidFill>
-              </a:rPr>
-              <a:t>).</a:t>
-            </a:r>
-            <a:r>
-              <a:rPr lang="de-DE" dirty="0" err="1" smtClean="0">
-                <a:solidFill>
-                  <a:schemeClr val="dk1"/>
-                </a:solidFill>
-              </a:rPr>
-              <a:t>choose</a:t>
-            </a:r>
-            <a:endParaRPr lang="de-DE" dirty="0">
-              <a:solidFill>
-                <a:schemeClr val="dk1"/>
-              </a:solidFill>
-            </a:endParaRPr>
+            <a:endParaRPr lang="de-DE" sz="2400" dirty="0" smtClean="0"/>
+          </a:p>
+        </p:txBody>
+      </p:sp>
+      <p:sp>
+        <p:nvSpPr>
+          <p:cNvPr id="10" name="Text Placeholder 9"/>
+          <p:cNvSpPr>
+            <a:spLocks noGrp="1"/>
+          </p:cNvSpPr>
+          <p:nvPr>
+            <p:ph type="body" sz="quarter" idx="20"/>
+          </p:nvPr>
+        </p:nvSpPr>
+        <p:spPr>
+          <a:xfrm>
+            <a:off x="0" y="7956376"/>
+            <a:ext cx="6858000" cy="261610"/>
+          </a:xfrm>
+        </p:spPr>
+        <p:txBody>
+          <a:bodyPr/>
+          <a:lstStyle/>
+          <a:p>
+            <a:endParaRPr lang="de-DE" dirty="0"/>
+          </a:p>
+        </p:txBody>
+      </p:sp>
+      <p:sp>
+        <p:nvSpPr>
+          <p:cNvPr id="8" name="Text Placeholder 7"/>
+          <p:cNvSpPr>
+            <a:spLocks noGrp="1"/>
+          </p:cNvSpPr>
+          <p:nvPr>
+            <p:ph type="body" sz="quarter" idx="21"/>
+          </p:nvPr>
+        </p:nvSpPr>
+        <p:spPr/>
+        <p:txBody>
+          <a:bodyPr/>
+          <a:lstStyle/>
+          <a:p>
+            <a:endParaRPr lang="de-DE"/>
+          </a:p>
+        </p:txBody>
+      </p:sp>
+      <p:sp>
+        <p:nvSpPr>
+          <p:cNvPr id="9" name="Text Placeholder 8"/>
+          <p:cNvSpPr>
+            <a:spLocks noGrp="1"/>
+          </p:cNvSpPr>
+          <p:nvPr>
+            <p:ph type="body" sz="quarter" idx="19"/>
+          </p:nvPr>
+        </p:nvSpPr>
+        <p:spPr/>
+        <p:txBody>
+          <a:bodyPr/>
+          <a:lstStyle/>
+          <a:p>
+            <a:endParaRPr lang="de-DE"/>
           </a:p>
         </p:txBody>
       </p:sp>
     </p:spTree>
     <p:extLst>
       <p:ext uri="{BB962C8B-B14F-4D97-AF65-F5344CB8AC3E}">
-        <p14:creationId xmlns:p14="http://schemas.microsoft.com/office/powerpoint/2010/main" val="2498599068"/>
+        <p14:creationId xmlns:p14="http://schemas.microsoft.com/office/powerpoint/2010/main" xmlns="" val="174545010"/>
       </p:ext>
     </p:extLst>
   </p:cSld>
@@ -5801,8 +5231,952 @@
         </p:nvSpPr>
         <p:spPr>
           <a:xfrm>
+            <a:off x="-16260" y="585864"/>
+            <a:ext cx="6858000" cy="8532440"/>
+          </a:xfrm>
+          <a:prstGeom prst="rect">
+            <a:avLst/>
+          </a:prstGeom>
+          <a:solidFill>
+            <a:schemeClr val="bg1"/>
+          </a:solidFill>
+          <a:ln>
+            <a:solidFill>
+              <a:schemeClr val="bg1"/>
+            </a:solidFill>
+          </a:ln>
+        </p:spPr>
+        <p:style>
+          <a:lnRef idx="2">
+            <a:schemeClr val="accent1">
+              <a:shade val="50000"/>
+            </a:schemeClr>
+          </a:lnRef>
+          <a:fillRef idx="1">
+            <a:schemeClr val="accent1"/>
+          </a:fillRef>
+          <a:effectRef idx="0">
+            <a:schemeClr val="accent1"/>
+          </a:effectRef>
+          <a:fontRef idx="minor">
+            <a:schemeClr val="lt1"/>
+          </a:fontRef>
+        </p:style>
+        <p:txBody>
+          <a:bodyPr rtlCol="0" anchor="ctr"/>
+          <a:lstStyle/>
+          <a:p>
+            <a:endParaRPr lang="en-US" dirty="0" smtClean="0">
+              <a:solidFill>
+                <a:schemeClr val="tx1"/>
+              </a:solidFill>
+            </a:endParaRPr>
+          </a:p>
+        </p:txBody>
+      </p:sp>
+      <p:sp>
+        <p:nvSpPr>
+          <p:cNvPr id="9" name="TextBox 8"/>
+          <p:cNvSpPr txBox="1"/>
+          <p:nvPr/>
+        </p:nvSpPr>
+        <p:spPr>
+          <a:xfrm>
+            <a:off x="2448218" y="179512"/>
+            <a:ext cx="1961563" cy="584775"/>
+          </a:xfrm>
+          <a:prstGeom prst="rect">
+            <a:avLst/>
+          </a:prstGeom>
+          <a:noFill/>
+        </p:spPr>
+        <p:txBody>
+          <a:bodyPr wrap="none" rtlCol="0">
+            <a:spAutoFit/>
+          </a:bodyPr>
+          <a:lstStyle/>
+          <a:p>
+            <a:r>
+              <a:rPr lang="de-DE" sz="3200" dirty="0" smtClean="0">
+                <a:solidFill>
+                  <a:schemeClr val="accent6"/>
+                </a:solidFill>
+              </a:rPr>
+              <a:t>Spickzettel</a:t>
+            </a:r>
+            <a:endParaRPr lang="de-DE" sz="3200" dirty="0">
+              <a:solidFill>
+                <a:schemeClr val="accent6"/>
+              </a:solidFill>
+            </a:endParaRPr>
+          </a:p>
+        </p:txBody>
+      </p:sp>
+      <p:sp>
+        <p:nvSpPr>
+          <p:cNvPr id="4" name="Rectangle 3"/>
+          <p:cNvSpPr/>
+          <p:nvPr/>
+        </p:nvSpPr>
+        <p:spPr>
+          <a:xfrm>
+            <a:off x="476672" y="1835696"/>
+            <a:ext cx="3933109" cy="369332"/>
+          </a:xfrm>
+          <a:prstGeom prst="rect">
+            <a:avLst/>
+          </a:prstGeom>
+        </p:spPr>
+        <p:style>
+          <a:lnRef idx="1">
+            <a:schemeClr val="accent6"/>
+          </a:lnRef>
+          <a:fillRef idx="2">
+            <a:schemeClr val="accent6"/>
+          </a:fillRef>
+          <a:effectRef idx="1">
+            <a:schemeClr val="accent6"/>
+          </a:effectRef>
+          <a:fontRef idx="minor">
+            <a:schemeClr val="dk1"/>
+          </a:fontRef>
+        </p:style>
+        <p:txBody>
+          <a:bodyPr wrap="square" rtlCol="0">
+            <a:spAutoFit/>
+          </a:bodyPr>
+          <a:lstStyle/>
+          <a:p>
+            <a:r>
+              <a:rPr lang="de-DE" dirty="0"/>
+              <a:t>play :c4  </a:t>
+            </a:r>
+            <a:r>
+              <a:rPr lang="de-DE" dirty="0" smtClean="0">
+                <a:sym typeface="Wingdings" pitchFamily="2" charset="2"/>
+              </a:rPr>
+              <a:t>   Tonleiter  = </a:t>
+            </a:r>
+            <a:r>
+              <a:rPr lang="de-DE" dirty="0" err="1" smtClean="0"/>
+              <a:t>c,d,e,f,g,a,b,c</a:t>
+            </a:r>
+            <a:endParaRPr lang="de-DE" dirty="0"/>
+          </a:p>
+        </p:txBody>
+      </p:sp>
+      <p:sp>
+        <p:nvSpPr>
+          <p:cNvPr id="5" name="Rectangle 4"/>
+          <p:cNvSpPr/>
+          <p:nvPr/>
+        </p:nvSpPr>
+        <p:spPr>
+          <a:xfrm>
+            <a:off x="4221088" y="1259632"/>
+            <a:ext cx="849913" cy="369332"/>
+          </a:xfrm>
+          <a:prstGeom prst="rect">
+            <a:avLst/>
+          </a:prstGeom>
+        </p:spPr>
+        <p:style>
+          <a:lnRef idx="1">
+            <a:schemeClr val="accent6"/>
+          </a:lnRef>
+          <a:fillRef idx="2">
+            <a:schemeClr val="accent6"/>
+          </a:fillRef>
+          <a:effectRef idx="1">
+            <a:schemeClr val="accent6"/>
+          </a:effectRef>
+          <a:fontRef idx="minor">
+            <a:schemeClr val="dk1"/>
+          </a:fontRef>
+        </p:style>
+        <p:txBody>
+          <a:bodyPr wrap="square" rtlCol="0">
+            <a:spAutoFit/>
+          </a:bodyPr>
+          <a:lstStyle/>
+          <a:p>
+            <a:r>
+              <a:rPr lang="de-DE" dirty="0">
+                <a:solidFill>
+                  <a:schemeClr val="dk1"/>
+                </a:solidFill>
+              </a:rPr>
+              <a:t>sleep 1</a:t>
+            </a:r>
+          </a:p>
+        </p:txBody>
+      </p:sp>
+      <p:sp>
+        <p:nvSpPr>
+          <p:cNvPr id="6" name="Rectangle 5"/>
+          <p:cNvSpPr/>
+          <p:nvPr/>
+        </p:nvSpPr>
+        <p:spPr>
+          <a:xfrm>
+            <a:off x="3140968" y="2555776"/>
+            <a:ext cx="2501582" cy="369332"/>
+          </a:xfrm>
+          <a:prstGeom prst="rect">
+            <a:avLst/>
+          </a:prstGeom>
+        </p:spPr>
+        <p:style>
+          <a:lnRef idx="1">
+            <a:schemeClr val="accent6"/>
+          </a:lnRef>
+          <a:fillRef idx="2">
+            <a:schemeClr val="accent6"/>
+          </a:fillRef>
+          <a:effectRef idx="1">
+            <a:schemeClr val="accent6"/>
+          </a:effectRef>
+          <a:fontRef idx="minor">
+            <a:schemeClr val="dk1"/>
+          </a:fontRef>
+        </p:style>
+        <p:txBody>
+          <a:bodyPr wrap="square" rtlCol="0">
+            <a:spAutoFit/>
+          </a:bodyPr>
+          <a:lstStyle/>
+          <a:p>
+            <a:r>
+              <a:rPr lang="de-DE" dirty="0">
+                <a:solidFill>
+                  <a:schemeClr val="dk1"/>
+                </a:solidFill>
+              </a:rPr>
+              <a:t>play_chord [:c4, :e4, :g4]</a:t>
+            </a:r>
+          </a:p>
+        </p:txBody>
+      </p:sp>
+      <p:sp>
+        <p:nvSpPr>
+          <p:cNvPr id="7" name="Rectangle 6"/>
+          <p:cNvSpPr/>
+          <p:nvPr/>
+        </p:nvSpPr>
+        <p:spPr>
+          <a:xfrm>
+            <a:off x="980728" y="3275856"/>
+            <a:ext cx="4942763" cy="369332"/>
+          </a:xfrm>
+          <a:prstGeom prst="rect">
+            <a:avLst/>
+          </a:prstGeom>
+        </p:spPr>
+        <p:style>
+          <a:lnRef idx="1">
+            <a:schemeClr val="accent6"/>
+          </a:lnRef>
+          <a:fillRef idx="2">
+            <a:schemeClr val="accent6"/>
+          </a:fillRef>
+          <a:effectRef idx="1">
+            <a:schemeClr val="accent6"/>
+          </a:effectRef>
+          <a:fontRef idx="minor">
+            <a:schemeClr val="dk1"/>
+          </a:fontRef>
+        </p:style>
+        <p:txBody>
+          <a:bodyPr wrap="square" rtlCol="0">
+            <a:spAutoFit/>
+          </a:bodyPr>
+          <a:lstStyle/>
+          <a:p>
+            <a:r>
+              <a:rPr lang="en-US" dirty="0" err="1">
+                <a:solidFill>
+                  <a:schemeClr val="dk1"/>
+                </a:solidFill>
+              </a:rPr>
+              <a:t>play_chord</a:t>
+            </a:r>
+            <a:r>
+              <a:rPr lang="en-US" dirty="0">
+                <a:solidFill>
+                  <a:schemeClr val="dk1"/>
+                </a:solidFill>
+              </a:rPr>
+              <a:t> chord(:e4, :major)     </a:t>
+            </a:r>
+            <a:r>
+              <a:rPr lang="en-US" dirty="0">
+                <a:solidFill>
+                  <a:schemeClr val="dk1"/>
+                </a:solidFill>
+                <a:sym typeface="Wingdings" pitchFamily="2" charset="2"/>
+              </a:rPr>
+              <a:t> major, minor… </a:t>
+            </a:r>
+            <a:endParaRPr lang="en-US" dirty="0">
+              <a:solidFill>
+                <a:schemeClr val="dk1"/>
+              </a:solidFill>
+            </a:endParaRPr>
+          </a:p>
+        </p:txBody>
+      </p:sp>
+      <p:sp>
+        <p:nvSpPr>
+          <p:cNvPr id="10" name="Rectangle 9"/>
+          <p:cNvSpPr/>
+          <p:nvPr/>
+        </p:nvSpPr>
+        <p:spPr>
+          <a:xfrm>
+            <a:off x="1628800" y="971600"/>
+            <a:ext cx="856838" cy="369332"/>
+          </a:xfrm>
+          <a:prstGeom prst="rect">
+            <a:avLst/>
+          </a:prstGeom>
+        </p:spPr>
+        <p:style>
+          <a:lnRef idx="1">
+            <a:schemeClr val="accent6"/>
+          </a:lnRef>
+          <a:fillRef idx="2">
+            <a:schemeClr val="accent6"/>
+          </a:fillRef>
+          <a:effectRef idx="1">
+            <a:schemeClr val="accent6"/>
+          </a:effectRef>
+          <a:fontRef idx="minor">
+            <a:schemeClr val="dk1"/>
+          </a:fontRef>
+        </p:style>
+        <p:txBody>
+          <a:bodyPr wrap="square" rtlCol="0">
+            <a:spAutoFit/>
+          </a:bodyPr>
+          <a:lstStyle/>
+          <a:p>
+            <a:r>
+              <a:rPr lang="de-DE" dirty="0">
+                <a:solidFill>
+                  <a:schemeClr val="dk1"/>
+                </a:solidFill>
+              </a:rPr>
+              <a:t>play 60</a:t>
+            </a:r>
+          </a:p>
+        </p:txBody>
+      </p:sp>
+      <p:sp>
+        <p:nvSpPr>
+          <p:cNvPr id="11" name="Rectangle 10"/>
+          <p:cNvSpPr/>
+          <p:nvPr/>
+        </p:nvSpPr>
+        <p:spPr>
+          <a:xfrm>
+            <a:off x="548680" y="5652120"/>
+            <a:ext cx="1459054" cy="369332"/>
+          </a:xfrm>
+          <a:prstGeom prst="rect">
+            <a:avLst/>
+          </a:prstGeom>
+        </p:spPr>
+        <p:style>
+          <a:lnRef idx="1">
+            <a:schemeClr val="accent6"/>
+          </a:lnRef>
+          <a:fillRef idx="2">
+            <a:schemeClr val="accent6"/>
+          </a:fillRef>
+          <a:effectRef idx="1">
+            <a:schemeClr val="accent6"/>
+          </a:effectRef>
+          <a:fontRef idx="minor">
+            <a:schemeClr val="dk1"/>
+          </a:fontRef>
+        </p:style>
+        <p:txBody>
+          <a:bodyPr wrap="square" rtlCol="0">
+            <a:spAutoFit/>
+          </a:bodyPr>
+          <a:lstStyle/>
+          <a:p>
+            <a:r>
+              <a:rPr lang="de-DE" dirty="0">
+                <a:solidFill>
+                  <a:schemeClr val="dk1"/>
+                </a:solidFill>
+              </a:rPr>
+              <a:t>use_bpm 600</a:t>
+            </a:r>
+          </a:p>
+        </p:txBody>
+      </p:sp>
+      <p:sp>
+        <p:nvSpPr>
+          <p:cNvPr id="12" name="Rectangle 11"/>
+          <p:cNvSpPr/>
+          <p:nvPr/>
+        </p:nvSpPr>
+        <p:spPr>
+          <a:xfrm>
+            <a:off x="260648" y="4139952"/>
+            <a:ext cx="4764125" cy="369332"/>
+          </a:xfrm>
+          <a:prstGeom prst="rect">
+            <a:avLst/>
+          </a:prstGeom>
+        </p:spPr>
+        <p:style>
+          <a:lnRef idx="1">
+            <a:schemeClr val="accent6"/>
+          </a:lnRef>
+          <a:fillRef idx="2">
+            <a:schemeClr val="accent6"/>
+          </a:fillRef>
+          <a:effectRef idx="1">
+            <a:schemeClr val="accent6"/>
+          </a:effectRef>
+          <a:fontRef idx="minor">
+            <a:schemeClr val="dk1"/>
+          </a:fontRef>
+        </p:style>
+        <p:txBody>
+          <a:bodyPr wrap="square" rtlCol="0">
+            <a:spAutoFit/>
+          </a:bodyPr>
+          <a:lstStyle/>
+          <a:p>
+            <a:r>
+              <a:rPr lang="de-DE" dirty="0" err="1">
+                <a:solidFill>
+                  <a:schemeClr val="dk1"/>
+                </a:solidFill>
+              </a:rPr>
+              <a:t>play_pattern</a:t>
+            </a:r>
+            <a:r>
+              <a:rPr lang="de-DE" dirty="0">
+                <a:solidFill>
+                  <a:schemeClr val="dk1"/>
+                </a:solidFill>
+              </a:rPr>
+              <a:t> </a:t>
+            </a:r>
+            <a:r>
+              <a:rPr lang="de-DE" dirty="0" smtClean="0">
+                <a:solidFill>
+                  <a:schemeClr val="dk1"/>
+                </a:solidFill>
+              </a:rPr>
+              <a:t>(</a:t>
+            </a:r>
+            <a:r>
+              <a:rPr lang="de-DE" dirty="0" err="1" smtClean="0">
+                <a:solidFill>
+                  <a:schemeClr val="dk1"/>
+                </a:solidFill>
+              </a:rPr>
+              <a:t>scale</a:t>
+            </a:r>
+            <a:r>
+              <a:rPr lang="de-DE" dirty="0" smtClean="0">
+                <a:solidFill>
+                  <a:schemeClr val="dk1"/>
+                </a:solidFill>
+              </a:rPr>
+              <a:t> :e4</a:t>
+            </a:r>
+            <a:r>
+              <a:rPr lang="de-DE" dirty="0">
+                <a:solidFill>
+                  <a:schemeClr val="dk1"/>
+                </a:solidFill>
+              </a:rPr>
+              <a:t>, :minor) </a:t>
+            </a:r>
+            <a:r>
+              <a:rPr lang="de-DE" dirty="0">
+                <a:solidFill>
+                  <a:schemeClr val="dk1"/>
+                </a:solidFill>
+                <a:sym typeface="Wingdings" pitchFamily="2" charset="2"/>
+              </a:rPr>
+              <a:t> </a:t>
+            </a:r>
+            <a:r>
+              <a:rPr lang="de-DE" dirty="0" smtClean="0">
+                <a:solidFill>
+                  <a:schemeClr val="dk1"/>
+                </a:solidFill>
+                <a:sym typeface="Wingdings" pitchFamily="2" charset="2"/>
+              </a:rPr>
+              <a:t>.</a:t>
+            </a:r>
+            <a:r>
+              <a:rPr lang="de-DE" dirty="0" err="1" smtClean="0">
+                <a:solidFill>
+                  <a:schemeClr val="dk1"/>
+                </a:solidFill>
+              </a:rPr>
+              <a:t>reverse</a:t>
+            </a:r>
+            <a:endParaRPr lang="de-DE" dirty="0">
+              <a:solidFill>
+                <a:schemeClr val="dk1"/>
+              </a:solidFill>
+            </a:endParaRPr>
+          </a:p>
+        </p:txBody>
+      </p:sp>
+      <p:sp>
+        <p:nvSpPr>
+          <p:cNvPr id="13" name="Rectangle 12"/>
+          <p:cNvSpPr/>
+          <p:nvPr/>
+        </p:nvSpPr>
+        <p:spPr>
+          <a:xfrm>
+            <a:off x="4646044" y="6304202"/>
+            <a:ext cx="1440160" cy="923330"/>
+          </a:xfrm>
+          <a:prstGeom prst="rect">
+            <a:avLst/>
+          </a:prstGeom>
+        </p:spPr>
+        <p:style>
+          <a:lnRef idx="1">
+            <a:schemeClr val="accent6"/>
+          </a:lnRef>
+          <a:fillRef idx="2">
+            <a:schemeClr val="accent6"/>
+          </a:fillRef>
+          <a:effectRef idx="1">
+            <a:schemeClr val="accent6"/>
+          </a:effectRef>
+          <a:fontRef idx="minor">
+            <a:schemeClr val="dk1"/>
+          </a:fontRef>
+        </p:style>
+        <p:txBody>
+          <a:bodyPr wrap="square" rtlCol="0">
+            <a:spAutoFit/>
+          </a:bodyPr>
+          <a:lstStyle/>
+          <a:p>
+            <a:r>
+              <a:rPr lang="de-DE" dirty="0">
+                <a:solidFill>
+                  <a:schemeClr val="dk1"/>
+                </a:solidFill>
+              </a:rPr>
+              <a:t>2.times do</a:t>
+            </a:r>
+          </a:p>
+          <a:p>
+            <a:r>
+              <a:rPr lang="de-DE" dirty="0">
+                <a:solidFill>
+                  <a:schemeClr val="dk1"/>
+                </a:solidFill>
+              </a:rPr>
+              <a:t>   ...</a:t>
+            </a:r>
+          </a:p>
+          <a:p>
+            <a:r>
+              <a:rPr lang="de-DE" dirty="0">
+                <a:solidFill>
+                  <a:schemeClr val="dk1"/>
+                </a:solidFill>
+              </a:rPr>
+              <a:t>end</a:t>
+            </a:r>
+          </a:p>
+        </p:txBody>
+      </p:sp>
+      <p:sp>
+        <p:nvSpPr>
+          <p:cNvPr id="14" name="Rectangle 13"/>
+          <p:cNvSpPr/>
+          <p:nvPr/>
+        </p:nvSpPr>
+        <p:spPr>
+          <a:xfrm>
+            <a:off x="332656" y="6660232"/>
+            <a:ext cx="3429000" cy="923330"/>
+          </a:xfrm>
+          <a:prstGeom prst="rect">
+            <a:avLst/>
+          </a:prstGeom>
+        </p:spPr>
+        <p:style>
+          <a:lnRef idx="1">
+            <a:schemeClr val="accent6"/>
+          </a:lnRef>
+          <a:fillRef idx="2">
+            <a:schemeClr val="accent6"/>
+          </a:fillRef>
+          <a:effectRef idx="1">
+            <a:schemeClr val="accent6"/>
+          </a:effectRef>
+          <a:fontRef idx="minor">
+            <a:schemeClr val="dk1"/>
+          </a:fontRef>
+        </p:style>
+        <p:txBody>
+          <a:bodyPr wrap="square" rtlCol="0">
+            <a:spAutoFit/>
+          </a:bodyPr>
+          <a:lstStyle/>
+          <a:p>
+            <a:r>
+              <a:rPr lang="de-DE" dirty="0">
+                <a:solidFill>
+                  <a:schemeClr val="dk1"/>
+                </a:solidFill>
+              </a:rPr>
+              <a:t>live_loop :meineEndlosschleife do</a:t>
+            </a:r>
+          </a:p>
+          <a:p>
+            <a:r>
+              <a:rPr lang="de-DE" dirty="0">
+                <a:solidFill>
+                  <a:schemeClr val="dk1"/>
+                </a:solidFill>
+              </a:rPr>
+              <a:t>   ...</a:t>
+            </a:r>
+          </a:p>
+          <a:p>
+            <a:r>
+              <a:rPr lang="de-DE" dirty="0">
+                <a:solidFill>
+                  <a:schemeClr val="dk1"/>
+                </a:solidFill>
+              </a:rPr>
+              <a:t>end</a:t>
+            </a:r>
+          </a:p>
+        </p:txBody>
+      </p:sp>
+      <p:sp>
+        <p:nvSpPr>
+          <p:cNvPr id="15" name="Rectangle 14"/>
+          <p:cNvSpPr/>
+          <p:nvPr/>
+        </p:nvSpPr>
+        <p:spPr>
+          <a:xfrm>
+            <a:off x="2852936" y="8172400"/>
+            <a:ext cx="3397084" cy="369332"/>
+          </a:xfrm>
+          <a:prstGeom prst="rect">
+            <a:avLst/>
+          </a:prstGeom>
+        </p:spPr>
+        <p:style>
+          <a:lnRef idx="1">
+            <a:schemeClr val="accent6"/>
+          </a:lnRef>
+          <a:fillRef idx="2">
+            <a:schemeClr val="accent6"/>
+          </a:fillRef>
+          <a:effectRef idx="1">
+            <a:schemeClr val="accent6"/>
+          </a:effectRef>
+          <a:fontRef idx="minor">
+            <a:schemeClr val="dk1"/>
+          </a:fontRef>
+        </p:style>
+        <p:txBody>
+          <a:bodyPr wrap="square" rtlCol="0">
+            <a:spAutoFit/>
+          </a:bodyPr>
+          <a:lstStyle/>
+          <a:p>
+            <a:r>
+              <a:rPr lang="de-DE" dirty="0">
+                <a:solidFill>
+                  <a:schemeClr val="dk1"/>
+                </a:solidFill>
+              </a:rPr>
+              <a:t>sample :bd_haus </a:t>
+            </a:r>
+            <a:r>
+              <a:rPr lang="de-DE" dirty="0">
+                <a:solidFill>
+                  <a:schemeClr val="dk1"/>
+                </a:solidFill>
+                <a:sym typeface="Wingdings" pitchFamily="2" charset="2"/>
+              </a:rPr>
+              <a:t> </a:t>
+            </a:r>
+            <a:r>
+              <a:rPr lang="de-DE" dirty="0">
+                <a:solidFill>
+                  <a:schemeClr val="dk1"/>
+                </a:solidFill>
+              </a:rPr>
+              <a:t>:guit_em9 ... </a:t>
+            </a:r>
+            <a:r>
+              <a:rPr lang="de-DE" dirty="0">
+                <a:solidFill>
+                  <a:schemeClr val="dk1"/>
+                </a:solidFill>
+                <a:sym typeface="Wingdings" pitchFamily="2" charset="2"/>
+              </a:rPr>
+              <a:t> </a:t>
+            </a:r>
+            <a:endParaRPr lang="de-DE" dirty="0">
+              <a:solidFill>
+                <a:schemeClr val="dk1"/>
+              </a:solidFill>
+            </a:endParaRPr>
+          </a:p>
+        </p:txBody>
+      </p:sp>
+      <p:sp>
+        <p:nvSpPr>
+          <p:cNvPr id="16" name="Rectangle 15"/>
+          <p:cNvSpPr/>
+          <p:nvPr/>
+        </p:nvSpPr>
+        <p:spPr>
+          <a:xfrm>
+            <a:off x="2602940" y="5546485"/>
+            <a:ext cx="3994412" cy="369332"/>
+          </a:xfrm>
+          <a:prstGeom prst="rect">
+            <a:avLst/>
+          </a:prstGeom>
+        </p:spPr>
+        <p:style>
+          <a:lnRef idx="1">
+            <a:schemeClr val="accent6"/>
+          </a:lnRef>
+          <a:fillRef idx="2">
+            <a:schemeClr val="accent6"/>
+          </a:fillRef>
+          <a:effectRef idx="1">
+            <a:schemeClr val="accent6"/>
+          </a:effectRef>
+          <a:fontRef idx="minor">
+            <a:schemeClr val="dk1"/>
+          </a:fontRef>
+        </p:style>
+        <p:txBody>
+          <a:bodyPr wrap="square" rtlCol="0">
+            <a:spAutoFit/>
+          </a:bodyPr>
+          <a:lstStyle/>
+          <a:p>
+            <a:r>
+              <a:rPr lang="de-DE" dirty="0">
+                <a:solidFill>
+                  <a:schemeClr val="dk1"/>
+                </a:solidFill>
+              </a:rPr>
+              <a:t>use_synth :hollow </a:t>
+            </a:r>
+            <a:r>
+              <a:rPr lang="de-DE" dirty="0">
+                <a:solidFill>
+                  <a:schemeClr val="dk1"/>
+                </a:solidFill>
+                <a:sym typeface="Wingdings" pitchFamily="2" charset="2"/>
+              </a:rPr>
+              <a:t> saw, </a:t>
+            </a:r>
+            <a:r>
+              <a:rPr lang="de-DE" dirty="0" err="1" smtClean="0">
+                <a:solidFill>
+                  <a:schemeClr val="dk1"/>
+                </a:solidFill>
+                <a:sym typeface="Wingdings" pitchFamily="2" charset="2"/>
+              </a:rPr>
+              <a:t>hoover</a:t>
+            </a:r>
+            <a:r>
+              <a:rPr lang="de-DE" dirty="0" smtClean="0">
+                <a:sym typeface="Wingdings" pitchFamily="2" charset="2"/>
+              </a:rPr>
+              <a:t>, piano</a:t>
+            </a:r>
+            <a:r>
+              <a:rPr lang="de-DE" dirty="0" smtClean="0">
+                <a:solidFill>
+                  <a:schemeClr val="dk1"/>
+                </a:solidFill>
+                <a:sym typeface="Wingdings" pitchFamily="2" charset="2"/>
+              </a:rPr>
+              <a:t> </a:t>
+            </a:r>
+            <a:endParaRPr lang="de-DE" dirty="0">
+              <a:solidFill>
+                <a:schemeClr val="dk1"/>
+              </a:solidFill>
+            </a:endParaRPr>
+          </a:p>
+        </p:txBody>
+      </p:sp>
+      <p:sp>
+        <p:nvSpPr>
+          <p:cNvPr id="17" name="Rectangle 16"/>
+          <p:cNvSpPr/>
+          <p:nvPr/>
+        </p:nvSpPr>
+        <p:spPr>
+          <a:xfrm>
+            <a:off x="260648" y="4738082"/>
+            <a:ext cx="4764125" cy="369332"/>
+          </a:xfrm>
+          <a:prstGeom prst="rect">
+            <a:avLst/>
+          </a:prstGeom>
+        </p:spPr>
+        <p:style>
+          <a:lnRef idx="1">
+            <a:schemeClr val="accent6"/>
+          </a:lnRef>
+          <a:fillRef idx="2">
+            <a:schemeClr val="accent6"/>
+          </a:fillRef>
+          <a:effectRef idx="1">
+            <a:schemeClr val="accent6"/>
+          </a:effectRef>
+          <a:fontRef idx="minor">
+            <a:schemeClr val="dk1"/>
+          </a:fontRef>
+        </p:style>
+        <p:txBody>
+          <a:bodyPr wrap="square" rtlCol="0">
+            <a:spAutoFit/>
+          </a:bodyPr>
+          <a:lstStyle/>
+          <a:p>
+            <a:r>
+              <a:rPr lang="de-DE" dirty="0" err="1"/>
+              <a:t>p</a:t>
+            </a:r>
+            <a:r>
+              <a:rPr lang="de-DE" dirty="0" err="1" smtClean="0">
+                <a:solidFill>
+                  <a:schemeClr val="dk1"/>
+                </a:solidFill>
+              </a:rPr>
+              <a:t>lay</a:t>
+            </a:r>
+            <a:r>
+              <a:rPr lang="de-DE" dirty="0" smtClean="0">
+                <a:solidFill>
+                  <a:schemeClr val="dk1"/>
+                </a:solidFill>
+              </a:rPr>
+              <a:t>                (</a:t>
+            </a:r>
+            <a:r>
+              <a:rPr lang="de-DE" dirty="0" err="1" smtClean="0">
+                <a:solidFill>
+                  <a:schemeClr val="dk1"/>
+                </a:solidFill>
+              </a:rPr>
+              <a:t>scale</a:t>
+            </a:r>
+            <a:r>
+              <a:rPr lang="de-DE" dirty="0" smtClean="0">
+                <a:solidFill>
+                  <a:schemeClr val="dk1"/>
+                </a:solidFill>
+              </a:rPr>
+              <a:t> :e4</a:t>
+            </a:r>
+            <a:r>
+              <a:rPr lang="de-DE" dirty="0">
+                <a:solidFill>
+                  <a:schemeClr val="dk1"/>
+                </a:solidFill>
+              </a:rPr>
+              <a:t>, :minor</a:t>
+            </a:r>
+            <a:r>
+              <a:rPr lang="de-DE" dirty="0" smtClean="0">
+                <a:solidFill>
+                  <a:schemeClr val="dk1"/>
+                </a:solidFill>
+              </a:rPr>
+              <a:t>).</a:t>
+            </a:r>
+            <a:r>
+              <a:rPr lang="de-DE" dirty="0" err="1" smtClean="0">
+                <a:solidFill>
+                  <a:schemeClr val="dk1"/>
+                </a:solidFill>
+              </a:rPr>
+              <a:t>choose</a:t>
+            </a:r>
+            <a:endParaRPr lang="de-DE" dirty="0">
+              <a:solidFill>
+                <a:schemeClr val="dk1"/>
+              </a:solidFill>
+            </a:endParaRPr>
+          </a:p>
+        </p:txBody>
+      </p:sp>
+    </p:spTree>
+    <p:extLst>
+      <p:ext uri="{BB962C8B-B14F-4D97-AF65-F5344CB8AC3E}">
+        <p14:creationId xmlns="" xmlns:p14="http://schemas.microsoft.com/office/powerpoint/2010/main" val="2498599068"/>
+      </p:ext>
+    </p:extLst>
+  </p:cSld>
+  <p:clrMapOvr>
+    <a:masterClrMapping/>
+  </p:clrMapOvr>
+  <p:timing>
+    <p:tnLst>
+      <p:par>
+        <p:cTn id="1" dur="indefinite" restart="never" nodeType="tmRoot"/>
+      </p:par>
+    </p:tnLst>
+  </p:timing>
+</p:sld>
+</file>
+
+<file path=ppt/slides/slide17.xml><?xml version="1.0" encoding="utf-8"?>
+<p:sld xmlns:a="http://schemas.openxmlformats.org/drawingml/2006/main" xmlns:r="http://schemas.openxmlformats.org/officeDocument/2006/relationships" xmlns:p="http://schemas.openxmlformats.org/presentationml/2006/main">
+  <p:cSld>
+    <p:spTree>
+      <p:nvGrpSpPr>
+        <p:cNvPr id="1" name=""/>
+        <p:cNvGrpSpPr/>
+        <p:nvPr/>
+      </p:nvGrpSpPr>
+      <p:grpSpPr>
+        <a:xfrm>
+          <a:off x="0" y="0"/>
+          <a:ext cx="0" cy="0"/>
+          <a:chOff x="0" y="0"/>
+          <a:chExt cx="0" cy="0"/>
+        </a:xfrm>
+      </p:grpSpPr>
+      <p:sp>
+        <p:nvSpPr>
+          <p:cNvPr id="8" name="Rectangle 7"/>
+          <p:cNvSpPr/>
+          <p:nvPr/>
+        </p:nvSpPr>
+        <p:spPr>
+          <a:xfrm>
             <a:off x="36005" y="1003501"/>
-            <a:ext cx="6858000" cy="8532440"/>
+            <a:ext cx="6858000" cy="7960987"/>
           </a:xfrm>
           <a:prstGeom prst="rect">
             <a:avLst/>
@@ -6661,7 +7035,7 @@
     </p:spTree>
     <p:extLst>
       <p:ext uri="{BB962C8B-B14F-4D97-AF65-F5344CB8AC3E}">
-        <p14:creationId xmlns:p14="http://schemas.microsoft.com/office/powerpoint/2010/main" val="33299266"/>
+        <p14:creationId xmlns="" xmlns:p14="http://schemas.microsoft.com/office/powerpoint/2010/main" val="33299266"/>
       </p:ext>
     </p:extLst>
   </p:cSld>
@@ -6678,7 +7052,7 @@
 </p:sld>
 </file>
 
-<file path=ppt/slides/slide17.xml><?xml version="1.0" encoding="utf-8"?>
+<file path=ppt/slides/slide18.xml><?xml version="1.0" encoding="utf-8"?>
 <p:sld xmlns:a="http://schemas.openxmlformats.org/drawingml/2006/main" xmlns:r="http://schemas.openxmlformats.org/officeDocument/2006/relationships" xmlns:p="http://schemas.openxmlformats.org/presentationml/2006/main">
   <p:cSld>
     <p:spTree>
@@ -8635,7 +9009,7 @@
     </p:spTree>
     <p:extLst>
       <p:ext uri="{BB962C8B-B14F-4D97-AF65-F5344CB8AC3E}">
-        <p14:creationId xmlns:p14="http://schemas.microsoft.com/office/powerpoint/2010/main" val="2498599068"/>
+        <p14:creationId xmlns="" xmlns:p14="http://schemas.microsoft.com/office/powerpoint/2010/main" val="2498599068"/>
       </p:ext>
     </p:extLst>
   </p:cSld>
@@ -8685,7 +9059,7 @@
           <a:lstStyle/>
           <a:p>
             <a:r>
-              <a:rPr lang="de-DE" smtClean="0"/>
+              <a:rPr lang="de-DE" dirty="0" smtClean="0"/>
               <a:t>Spiele und warte</a:t>
             </a:r>
             <a:endParaRPr lang="de-DE" dirty="0"/>
@@ -8795,7 +9169,7 @@
           <a:lstStyle/>
           <a:p>
             <a:r>
-              <a:rPr lang="de-DE" smtClean="0"/>
+              <a:rPr lang="de-DE" dirty="0" smtClean="0"/>
               <a:t>Spiele einen Akkord (Dreiklang)</a:t>
             </a:r>
             <a:endParaRPr lang="de-DE" dirty="0"/>
@@ -8895,7 +9269,11 @@
           <a:bodyPr/>
           <a:lstStyle/>
           <a:p>
-            <a:endParaRPr lang="de-DE"/>
+            <a:r>
+              <a:rPr lang="de-DE" dirty="0" smtClean="0"/>
+              <a:t>Vewernde Buffer 1</a:t>
+            </a:r>
+            <a:endParaRPr lang="de-DE" dirty="0"/>
           </a:p>
         </p:txBody>
       </p:sp>
@@ -9001,7 +9379,7 @@
     </p:spTree>
     <p:extLst>
       <p:ext uri="{BB962C8B-B14F-4D97-AF65-F5344CB8AC3E}">
-        <p14:creationId xmlns:p14="http://schemas.microsoft.com/office/powerpoint/2010/main" val="1490740007"/>
+        <p14:creationId xmlns="" xmlns:p14="http://schemas.microsoft.com/office/powerpoint/2010/main" val="1490740007"/>
       </p:ext>
     </p:extLst>
   </p:cSld>
@@ -9246,7 +9624,11 @@
           <a:bodyPr/>
           <a:lstStyle/>
           <a:p>
-            <a:endParaRPr lang="de-DE"/>
+            <a:r>
+              <a:rPr lang="de-DE" dirty="0" smtClean="0"/>
+              <a:t>Verwende Buffer 2</a:t>
+            </a:r>
+            <a:endParaRPr lang="de-DE" dirty="0"/>
           </a:p>
         </p:txBody>
       </p:sp>
@@ -9352,7 +9734,7 @@
     </p:spTree>
     <p:extLst>
       <p:ext uri="{BB962C8B-B14F-4D97-AF65-F5344CB8AC3E}">
-        <p14:creationId xmlns:p14="http://schemas.microsoft.com/office/powerpoint/2010/main" val="1053451598"/>
+        <p14:creationId xmlns="" xmlns:p14="http://schemas.microsoft.com/office/powerpoint/2010/main" val="1053451598"/>
       </p:ext>
     </p:extLst>
   </p:cSld>
@@ -9403,7 +9785,15 @@
           <a:p>
             <a:r>
               <a:rPr lang="de-DE" dirty="0" smtClean="0"/>
-              <a:t>Spiele eine Muster (=Pattern) </a:t>
+              <a:t>Spiele </a:t>
+            </a:r>
+            <a:r>
+              <a:rPr lang="de-DE" dirty="0" smtClean="0"/>
+              <a:t>ein </a:t>
+            </a:r>
+            <a:r>
+              <a:rPr lang="de-DE" dirty="0" smtClean="0"/>
+              <a:t>Muster (=Pattern) </a:t>
             </a:r>
             <a:r>
               <a:rPr lang="de-DE" dirty="0"/>
@@ -9411,7 +9801,93 @@
             </a:r>
             <a:r>
               <a:rPr lang="de-DE" dirty="0" smtClean="0"/>
-              <a:t>- hier eine Tonleiter (</a:t>
+              <a:t>- hier eine Tonleiter (scale)</a:t>
+            </a:r>
+            <a:endParaRPr lang="de-DE" dirty="0"/>
+          </a:p>
+        </p:txBody>
+      </p:sp>
+      <p:sp>
+        <p:nvSpPr>
+          <p:cNvPr id="15" name="Text Placeholder 14"/>
+          <p:cNvSpPr>
+            <a:spLocks noGrp="1"/>
+          </p:cNvSpPr>
+          <p:nvPr>
+            <p:ph type="body" sz="quarter" idx="18"/>
+          </p:nvPr>
+        </p:nvSpPr>
+        <p:spPr/>
+        <p:txBody>
+          <a:bodyPr/>
+          <a:lstStyle/>
+          <a:p>
+            <a:r>
+              <a:rPr lang="de-DE" smtClean="0"/>
+              <a:t>:major 	:major_pentatonic 	:minor_pentatonic	:minor</a:t>
+            </a:r>
+          </a:p>
+          <a:p>
+            <a:endParaRPr lang="de-DE" dirty="0"/>
+          </a:p>
+        </p:txBody>
+      </p:sp>
+      <p:sp>
+        <p:nvSpPr>
+          <p:cNvPr id="27" name="Text Placeholder 26"/>
+          <p:cNvSpPr>
+            <a:spLocks noGrp="1"/>
+          </p:cNvSpPr>
+          <p:nvPr>
+            <p:ph type="body" sz="quarter" idx="19"/>
+          </p:nvPr>
+        </p:nvSpPr>
+        <p:spPr/>
+        <p:txBody>
+          <a:bodyPr/>
+          <a:lstStyle/>
+          <a:p>
+            <a:r>
+              <a:rPr lang="de-DE" smtClean="0"/>
+              <a:t>50	240	400	100	600</a:t>
+            </a:r>
+          </a:p>
+          <a:p>
+            <a:r>
+              <a:rPr lang="de-DE" smtClean="0"/>
+              <a:t>:major 	:major_pentatonic 	:minor_pentatonic	:minor</a:t>
+            </a:r>
+            <a:endParaRPr lang="de-DE" dirty="0"/>
+          </a:p>
+        </p:txBody>
+      </p:sp>
+      <p:sp>
+        <p:nvSpPr>
+          <p:cNvPr id="16" name="Text Placeholder 15"/>
+          <p:cNvSpPr>
+            <a:spLocks noGrp="1"/>
+          </p:cNvSpPr>
+          <p:nvPr>
+            <p:ph type="body" sz="quarter" idx="17"/>
+          </p:nvPr>
+        </p:nvSpPr>
+        <p:spPr>
+          <a:xfrm>
+            <a:off x="404664" y="1003248"/>
+            <a:ext cx="6048672" cy="584775"/>
+          </a:xfrm>
+        </p:spPr>
+        <p:txBody>
+          <a:bodyPr/>
+          <a:lstStyle/>
+          <a:p>
+            <a:r>
+              <a:rPr lang="de-DE" dirty="0" err="1" smtClean="0"/>
+              <a:t>play_pattern</a:t>
+            </a:r>
+            <a:r>
+              <a:rPr lang="de-DE" dirty="0" smtClean="0"/>
+              <a:t> (</a:t>
             </a:r>
             <a:r>
               <a:rPr lang="de-DE" dirty="0" err="1" smtClean="0"/>
@@ -9419,6 +9895,14 @@
             </a:r>
             <a:r>
               <a:rPr lang="de-DE" dirty="0" smtClean="0"/>
+              <a:t> :c4, :</a:t>
+            </a:r>
+            <a:r>
+              <a:rPr lang="de-DE" dirty="0" err="1" smtClean="0"/>
+              <a:t>major</a:t>
+            </a:r>
+            <a:r>
+              <a:rPr lang="de-DE" dirty="0" smtClean="0"/>
               <a:t>)</a:t>
             </a:r>
             <a:endParaRPr lang="de-DE" dirty="0"/>
@@ -9427,12 +9911,12 @@
       </p:sp>
       <p:sp>
         <p:nvSpPr>
-          <p:cNvPr id="15" name="Text Placeholder 14"/>
-          <p:cNvSpPr>
-            <a:spLocks noGrp="1"/>
-          </p:cNvSpPr>
-          <p:nvPr>
-            <p:ph type="body" sz="quarter" idx="18"/>
+          <p:cNvPr id="30" name="Text Placeholder 29"/>
+          <p:cNvSpPr>
+            <a:spLocks noGrp="1"/>
+          </p:cNvSpPr>
+          <p:nvPr>
+            <p:ph type="body" sz="quarter" idx="20"/>
           </p:nvPr>
         </p:nvSpPr>
         <p:spPr/>
@@ -9442,62 +9926,41 @@
           <a:p>
             <a:r>
               <a:rPr lang="de-DE" smtClean="0"/>
-              <a:t>:major 	:major_pentatonic 	:minor_pentatonic	:minor</a:t>
-            </a:r>
-          </a:p>
-          <a:p>
+              <a:t>Verwende ein andere Geschwindigkeit   b p m = beats per minute = schläge pro minute</a:t>
+            </a:r>
             <a:endParaRPr lang="de-DE" dirty="0"/>
           </a:p>
         </p:txBody>
       </p:sp>
       <p:sp>
         <p:nvSpPr>
-          <p:cNvPr id="27" name="Text Placeholder 26"/>
-          <p:cNvSpPr>
-            <a:spLocks noGrp="1"/>
-          </p:cNvSpPr>
-          <p:nvPr>
-            <p:ph type="body" sz="quarter" idx="19"/>
-          </p:nvPr>
-        </p:nvSpPr>
-        <p:spPr/>
+          <p:cNvPr id="36" name="Text Placeholder 35"/>
+          <p:cNvSpPr>
+            <a:spLocks noGrp="1"/>
+          </p:cNvSpPr>
+          <p:nvPr>
+            <p:ph type="body" sz="quarter" idx="21"/>
+          </p:nvPr>
+        </p:nvSpPr>
+        <p:spPr>
+          <a:xfrm>
+            <a:off x="548680" y="5335749"/>
+            <a:ext cx="6048672" cy="1175706"/>
+          </a:xfrm>
+        </p:spPr>
         <p:txBody>
           <a:bodyPr/>
           <a:lstStyle/>
           <a:p>
             <a:r>
-              <a:rPr lang="de-DE" smtClean="0"/>
-              <a:t>50	240	400	100	600</a:t>
-            </a:r>
-          </a:p>
-          <a:p>
-            <a:r>
-              <a:rPr lang="de-DE" smtClean="0"/>
-              <a:t>:major 	:major_pentatonic 	:minor_pentatonic	:minor</a:t>
-            </a:r>
-            <a:endParaRPr lang="de-DE" dirty="0"/>
-          </a:p>
-        </p:txBody>
-      </p:sp>
-      <p:sp>
-        <p:nvSpPr>
-          <p:cNvPr id="16" name="Text Placeholder 15"/>
-          <p:cNvSpPr>
-            <a:spLocks noGrp="1"/>
-          </p:cNvSpPr>
-          <p:nvPr>
-            <p:ph type="body" sz="quarter" idx="17"/>
-          </p:nvPr>
-        </p:nvSpPr>
-        <p:spPr>
-          <a:xfrm>
-            <a:off x="404664" y="1003248"/>
-            <a:ext cx="6048672" cy="584775"/>
-          </a:xfrm>
-        </p:spPr>
-        <p:txBody>
-          <a:bodyPr/>
-          <a:lstStyle/>
+              <a:rPr lang="de-DE" dirty="0" err="1" smtClean="0"/>
+              <a:t>use_bpm</a:t>
+            </a:r>
+            <a:r>
+              <a:rPr lang="de-DE" dirty="0" smtClean="0"/>
+              <a:t> 120</a:t>
+            </a:r>
+          </a:p>
           <a:p>
             <a:r>
               <a:rPr lang="de-DE" dirty="0" err="1" smtClean="0"/>
@@ -9505,11 +9968,7 @@
             </a:r>
             <a:r>
               <a:rPr lang="de-DE" dirty="0" smtClean="0"/>
-              <a:t> </a:t>
-            </a:r>
-            <a:r>
-              <a:rPr lang="de-DE" dirty="0" smtClean="0"/>
-              <a:t>(</a:t>
+              <a:t> (</a:t>
             </a:r>
             <a:r>
               <a:rPr lang="de-DE" dirty="0" err="1" smtClean="0"/>
@@ -9517,100 +9976,7 @@
             </a:r>
             <a:r>
               <a:rPr lang="de-DE" dirty="0" smtClean="0"/>
-              <a:t> :c4</a:t>
-            </a:r>
-            <a:r>
-              <a:rPr lang="de-DE" dirty="0" smtClean="0"/>
-              <a:t>, :</a:t>
-            </a:r>
-            <a:r>
-              <a:rPr lang="de-DE" dirty="0" err="1" smtClean="0"/>
-              <a:t>major</a:t>
-            </a:r>
-            <a:r>
-              <a:rPr lang="de-DE" dirty="0" smtClean="0"/>
-              <a:t>)</a:t>
-            </a:r>
-            <a:endParaRPr lang="de-DE" dirty="0"/>
-          </a:p>
-        </p:txBody>
-      </p:sp>
-      <p:sp>
-        <p:nvSpPr>
-          <p:cNvPr id="30" name="Text Placeholder 29"/>
-          <p:cNvSpPr>
-            <a:spLocks noGrp="1"/>
-          </p:cNvSpPr>
-          <p:nvPr>
-            <p:ph type="body" sz="quarter" idx="20"/>
-          </p:nvPr>
-        </p:nvSpPr>
-        <p:spPr/>
-        <p:txBody>
-          <a:bodyPr/>
-          <a:lstStyle/>
-          <a:p>
-            <a:r>
-              <a:rPr lang="de-DE" smtClean="0"/>
-              <a:t>Verwende ein andere Geschwindigkeit   b p m = beats per minute = schläge pro minute</a:t>
-            </a:r>
-            <a:endParaRPr lang="de-DE" dirty="0"/>
-          </a:p>
-        </p:txBody>
-      </p:sp>
-      <p:sp>
-        <p:nvSpPr>
-          <p:cNvPr id="36" name="Text Placeholder 35"/>
-          <p:cNvSpPr>
-            <a:spLocks noGrp="1"/>
-          </p:cNvSpPr>
-          <p:nvPr>
-            <p:ph type="body" sz="quarter" idx="21"/>
-          </p:nvPr>
-        </p:nvSpPr>
-        <p:spPr>
-          <a:xfrm>
-            <a:off x="548680" y="5335749"/>
-            <a:ext cx="6048672" cy="1175706"/>
-          </a:xfrm>
-        </p:spPr>
-        <p:txBody>
-          <a:bodyPr/>
-          <a:lstStyle/>
-          <a:p>
-            <a:r>
-              <a:rPr lang="de-DE" dirty="0" err="1" smtClean="0"/>
-              <a:t>use_bpm</a:t>
-            </a:r>
-            <a:r>
-              <a:rPr lang="de-DE" dirty="0" smtClean="0"/>
-              <a:t> 120</a:t>
-            </a:r>
-          </a:p>
-          <a:p>
-            <a:r>
-              <a:rPr lang="de-DE" dirty="0" err="1" smtClean="0"/>
-              <a:t>play_pattern</a:t>
-            </a:r>
-            <a:r>
-              <a:rPr lang="de-DE" dirty="0" smtClean="0"/>
-              <a:t> </a:t>
-            </a:r>
-            <a:r>
-              <a:rPr lang="de-DE" dirty="0" smtClean="0"/>
-              <a:t>(</a:t>
-            </a:r>
-            <a:r>
-              <a:rPr lang="de-DE" dirty="0" err="1" smtClean="0"/>
-              <a:t>scale</a:t>
-            </a:r>
-            <a:r>
-              <a:rPr lang="de-DE" dirty="0" smtClean="0"/>
-              <a:t> :e4</a:t>
-            </a:r>
-            <a:r>
-              <a:rPr lang="de-DE" dirty="0" smtClean="0"/>
-              <a:t>, :minor)</a:t>
+              <a:t> :e4, :minor)</a:t>
             </a:r>
             <a:endParaRPr lang="de-DE" dirty="0"/>
           </a:p>
@@ -9771,11 +10137,7 @@
             </a:r>
             <a:r>
               <a:rPr lang="de-DE" dirty="0" smtClean="0"/>
-              <a:t> </a:t>
-            </a:r>
-            <a:r>
-              <a:rPr lang="de-DE" dirty="0" smtClean="0"/>
-              <a:t>(</a:t>
+              <a:t> (</a:t>
             </a:r>
             <a:r>
               <a:rPr lang="de-DE" dirty="0" err="1" smtClean="0"/>
@@ -9783,11 +10145,7 @@
             </a:r>
             <a:r>
               <a:rPr lang="de-DE" dirty="0" smtClean="0"/>
-              <a:t> :e4</a:t>
-            </a:r>
-            <a:r>
-              <a:rPr lang="de-DE" dirty="0" smtClean="0"/>
-              <a:t>, :minor)</a:t>
+              <a:t> :e4, :minor)</a:t>
             </a:r>
           </a:p>
           <a:p>
@@ -9815,8 +10173,12 @@
           <a:lstStyle/>
           <a:p>
             <a:r>
-              <a:rPr lang="de-DE" smtClean="0"/>
-              <a:t>Wir nennen das Endlosschleife</a:t>
+              <a:rPr lang="de-DE" dirty="0" smtClean="0"/>
+              <a:t>Wir nennen das </a:t>
+            </a:r>
+            <a:r>
+              <a:rPr lang="de-DE" dirty="0" smtClean="0"/>
+              <a:t>Endlosschleife, die man während des Spielens aktualisieren kann.</a:t>
             </a:r>
             <a:endParaRPr lang="de-DE" dirty="0"/>
           </a:p>
@@ -9864,11 +10226,7 @@
             </a:r>
             <a:r>
               <a:rPr lang="de-DE" dirty="0" smtClean="0"/>
-              <a:t> </a:t>
-            </a:r>
-            <a:r>
-              <a:rPr lang="de-DE" dirty="0" smtClean="0"/>
-              <a:t>(</a:t>
+              <a:t> (</a:t>
             </a:r>
             <a:r>
               <a:rPr lang="de-DE" dirty="0" err="1" smtClean="0"/>
@@ -9876,11 +10234,7 @@
             </a:r>
             <a:r>
               <a:rPr lang="de-DE" dirty="0" smtClean="0"/>
-              <a:t> :e4</a:t>
-            </a:r>
-            <a:r>
-              <a:rPr lang="de-DE" dirty="0" smtClean="0"/>
-              <a:t>, :minor)</a:t>
+              <a:t> :e4, :minor)</a:t>
             </a:r>
           </a:p>
           <a:p>
@@ -10024,7 +10378,7 @@
     </p:spTree>
     <p:extLst>
       <p:ext uri="{BB962C8B-B14F-4D97-AF65-F5344CB8AC3E}">
-        <p14:creationId xmlns:p14="http://schemas.microsoft.com/office/powerpoint/2010/main" val="2129833566"/>
+        <p14:creationId xmlns="" xmlns:p14="http://schemas.microsoft.com/office/powerpoint/2010/main" val="2129833566"/>
       </p:ext>
     </p:extLst>
   </p:cSld>
@@ -10138,10 +10492,6 @@
           <a:bodyPr/>
           <a:lstStyle/>
           <a:p>
-            <a:r>
-              <a:rPr lang="de-DE" dirty="0" smtClean="0"/>
-              <a:t>.choose	</a:t>
-            </a:r>
             <a:endParaRPr lang="de-DE" dirty="0"/>
           </a:p>
         </p:txBody>
@@ -10198,11 +10548,7 @@
             </a:r>
             <a:r>
               <a:rPr lang="de-DE" dirty="0" smtClean="0"/>
-              <a:t> </a:t>
-            </a:r>
-            <a:r>
-              <a:rPr lang="de-DE" dirty="0" smtClean="0"/>
-              <a:t>(</a:t>
+              <a:t> (</a:t>
             </a:r>
             <a:r>
               <a:rPr lang="de-DE" dirty="0" err="1" smtClean="0"/>
@@ -10210,11 +10556,7 @@
             </a:r>
             <a:r>
               <a:rPr lang="de-DE" dirty="0" smtClean="0"/>
-              <a:t> :e4</a:t>
-            </a:r>
-            <a:r>
-              <a:rPr lang="de-DE" dirty="0" smtClean="0"/>
-              <a:t>, :minor)</a:t>
+              <a:t> :e4, :minor)</a:t>
             </a:r>
           </a:p>
           <a:p>
@@ -10224,11 +10566,7 @@
             </a:r>
             <a:r>
               <a:rPr lang="de-DE" dirty="0" smtClean="0"/>
-              <a:t> </a:t>
-            </a:r>
-            <a:r>
-              <a:rPr lang="de-DE" dirty="0" smtClean="0"/>
-              <a:t>(</a:t>
+              <a:t> (</a:t>
             </a:r>
             <a:r>
               <a:rPr lang="de-DE" dirty="0" err="1" smtClean="0"/>
@@ -10236,11 +10574,7 @@
             </a:r>
             <a:r>
               <a:rPr lang="de-DE" dirty="0" smtClean="0"/>
-              <a:t> :e4</a:t>
-            </a:r>
-            <a:r>
-              <a:rPr lang="de-DE" dirty="0" smtClean="0"/>
-              <a:t>, :minor).</a:t>
+              <a:t> :e4, :minor).</a:t>
             </a:r>
             <a:r>
               <a:rPr lang="de-DE" b="1" dirty="0" err="1" smtClean="0"/>
@@ -10290,7 +10624,7 @@
     </p:spTree>
     <p:extLst>
       <p:ext uri="{BB962C8B-B14F-4D97-AF65-F5344CB8AC3E}">
-        <p14:creationId xmlns:p14="http://schemas.microsoft.com/office/powerpoint/2010/main" val="2037777663"/>
+        <p14:creationId xmlns="" xmlns:p14="http://schemas.microsoft.com/office/powerpoint/2010/main" val="2037777663"/>
       </p:ext>
     </p:extLst>
   </p:cSld>
@@ -10344,6 +10678,10 @@
           <a:bodyPr/>
           <a:lstStyle/>
           <a:p>
+            <a:r>
+              <a:rPr lang="de-DE" dirty="0" smtClean="0"/>
+              <a:t>Verwende Buffer 3</a:t>
+            </a:r>
             <a:endParaRPr lang="de-DE" dirty="0"/>
           </a:p>
         </p:txBody>
@@ -10373,18 +10711,26 @@
               <a:buChar char="-"/>
             </a:pPr>
             <a:r>
-              <a:rPr lang="de-DE" b="0" dirty="0" smtClean="0"/>
-              <a:t>Play spielt </a:t>
-            </a:r>
-            <a:r>
-              <a:rPr lang="de-DE" dirty="0" smtClean="0"/>
-              <a:t>nur</a:t>
+              <a:rPr lang="de-DE" b="0" i="1" dirty="0" smtClean="0"/>
+              <a:t>play</a:t>
             </a:r>
             <a:r>
               <a:rPr lang="de-DE" b="0" dirty="0" smtClean="0"/>
               <a:t> </a:t>
             </a:r>
             <a:r>
+              <a:rPr lang="de-DE" b="0" dirty="0" smtClean="0"/>
+              <a:t>spielt </a:t>
+            </a:r>
+            <a:r>
+              <a:rPr lang="de-DE" dirty="0" smtClean="0"/>
+              <a:t>nur</a:t>
+            </a:r>
+            <a:r>
+              <a:rPr lang="de-DE" b="0" dirty="0" smtClean="0"/>
+              <a:t> </a:t>
+            </a:r>
+            <a:r>
               <a:rPr lang="de-DE" dirty="0" smtClean="0"/>
               <a:t>einen</a:t>
             </a:r>
@@ -10401,12 +10747,16 @@
               <a:t>(</a:t>
             </a:r>
             <a:r>
-              <a:rPr lang="de-DE" b="0" dirty="0" err="1" smtClean="0"/>
-              <a:t>Play_pattern</a:t>
+              <a:rPr lang="de-DE" b="0" i="1" dirty="0" smtClean="0"/>
+              <a:t>play_pattern</a:t>
             </a:r>
             <a:r>
               <a:rPr lang="de-DE" b="0" dirty="0" smtClean="0"/>
-              <a:t> ein Muster, also viele )</a:t>
+              <a:t> </a:t>
+            </a:r>
+            <a:r>
+              <a:rPr lang="de-DE" b="0" dirty="0" smtClean="0"/>
+              <a:t>ein Muster, also viele )</a:t>
             </a:r>
           </a:p>
           <a:p>
@@ -10415,8 +10765,16 @@
               <a:buChar char="-"/>
             </a:pPr>
             <a:r>
+              <a:rPr lang="de-DE" b="0" i="1" dirty="0" smtClean="0"/>
+              <a:t>choose</a:t>
+            </a:r>
+            <a:r>
               <a:rPr lang="de-DE" b="0" dirty="0" smtClean="0"/>
-              <a:t>Choose wählt einen beliebigen Ton</a:t>
+              <a:t> </a:t>
+            </a:r>
+            <a:r>
+              <a:rPr lang="de-DE" b="0" dirty="0" smtClean="0"/>
+              <a:t>wählt einen beliebigen Ton</a:t>
             </a:r>
             <a:endParaRPr lang="de-DE" b="0" dirty="0"/>
           </a:p>
@@ -10459,8 +10817,13 @@
             </a:r>
             <a:r>
               <a:rPr lang="de-DE" dirty="0"/>
-              <a:t> zufälligen Ton aus der Tonleiter. Jedesmal einen anderen</a:t>
-            </a:r>
+              <a:t> zufälligen Ton aus der Tonleiter. Jedesmal einen </a:t>
+            </a:r>
+            <a:r>
+              <a:rPr lang="de-DE" dirty="0" smtClean="0"/>
+              <a:t>anderen.</a:t>
+            </a:r>
+            <a:endParaRPr lang="de-DE" dirty="0"/>
           </a:p>
         </p:txBody>
       </p:sp>
@@ -10722,7 +11085,7 @@
     </p:spTree>
     <p:extLst>
       <p:ext uri="{BB962C8B-B14F-4D97-AF65-F5344CB8AC3E}">
-        <p14:creationId xmlns:p14="http://schemas.microsoft.com/office/powerpoint/2010/main" val="2037777663"/>
+        <p14:creationId xmlns="" xmlns:p14="http://schemas.microsoft.com/office/powerpoint/2010/main" val="2037777663"/>
       </p:ext>
     </p:extLst>
   </p:cSld>
@@ -11277,7 +11640,7 @@
   <a:extraClrSchemeLst/>
   <a:extLst>
     <a:ext uri="{05A4C25C-085E-4340-85A3-A5531E510DB2}">
-      <thm15:themeFamily xmlns:thm15="http://schemas.microsoft.com/office/thememl/2012/main" name="Office Theme" id="{62F939B6-93AF-4DB8-9C6B-D6C7DFDC589F}" vid="{4A3C46E8-61CC-4603-A589-7422A47A8E4A}"/>
+      <thm15:themeFamily xmlns="" xmlns:thm15="http://schemas.microsoft.com/office/thememl/2012/main" name="Office Theme" id="{62F939B6-93AF-4DB8-9C6B-D6C7DFDC589F}" vid="{4A3C46E8-61CC-4603-A589-7422A47A8E4A}"/>
     </a:ext>
   </a:extLst>
 </a:theme>
@@ -11538,7 +11901,7 @@
   <a:extraClrSchemeLst/>
   <a:extLst>
     <a:ext uri="{05A4C25C-085E-4340-85A3-A5531E510DB2}">
-      <thm15:themeFamily xmlns:thm15="http://schemas.microsoft.com/office/thememl/2012/main" name="Office Theme" id="{62F939B6-93AF-4DB8-9C6B-D6C7DFDC589F}" vid="{4A3C46E8-61CC-4603-A589-7422A47A8E4A}"/>
+      <thm15:themeFamily xmlns="" xmlns:thm15="http://schemas.microsoft.com/office/thememl/2012/main" name="Office Theme" id="{62F939B6-93AF-4DB8-9C6B-D6C7DFDC589F}" vid="{4A3C46E8-61CC-4603-A589-7422A47A8E4A}"/>
     </a:ext>
   </a:extLst>
 </a:theme>

</xml_diff>

<commit_message>
fixed an h4 note into b4
</commit_message>
<xml_diff>
--- a/documentation/Sonic PI Workshop.pptx
+++ b/documentation/Sonic PI Workshop.pptx
@@ -129,7 +129,7 @@
   </p:defaultTextStyle>
   <p:extLst>
     <p:ext uri="{EFAFB233-063F-42B5-8137-9DF3F51BA10A}">
-      <p15:sldGuideLst xmlns="" xmlns:p15="http://schemas.microsoft.com/office/powerpoint/2012/main">
+      <p15:sldGuideLst xmlns:p15="http://schemas.microsoft.com/office/powerpoint/2012/main">
         <p15:guide id="1" orient="horz" pos="2880" userDrawn="1">
           <p15:clr>
             <a:srgbClr val="A4A3A4"/>
@@ -143,7 +143,7 @@
       </p15:sldGuideLst>
     </p:ext>
     <p:ext uri="{2D200454-40CA-4A62-9FC3-DE9A4176ACB9}">
-      <p15:notesGuideLst xmlns="" xmlns:p15="http://schemas.microsoft.com/office/powerpoint/2012/main"/>
+      <p15:notesGuideLst xmlns:p15="http://schemas.microsoft.com/office/powerpoint/2012/main"/>
     </p:ext>
   </p:extLst>
 </p:presentation>
@@ -232,7 +232,7 @@
             <a:fld id="{7FD773D1-FC60-4896-8BCC-9B28FBDAB5FD}" type="datetimeFigureOut">
               <a:rPr lang="de-DE" smtClean="0"/>
               <a:pPr/>
-              <a:t>23.03.2016</a:t>
+              <a:t>25.03.2016</a:t>
             </a:fld>
             <a:endParaRPr lang="de-DE"/>
           </a:p>
@@ -308,7 +308,7 @@
     </p:spTree>
     <p:extLst>
       <p:ext uri="{BB962C8B-B14F-4D97-AF65-F5344CB8AC3E}">
-        <p14:creationId xmlns="" xmlns:p14="http://schemas.microsoft.com/office/powerpoint/2010/main" val="2388778202"/>
+        <p14:creationId xmlns:p14="http://schemas.microsoft.com/office/powerpoint/2010/main" val="2388778202"/>
       </p:ext>
     </p:extLst>
   </p:cSld>
@@ -399,7 +399,7 @@
             <a:fld id="{72145D81-8E55-40FC-9585-CFDCFEF92FEB}" type="datetimeFigureOut">
               <a:rPr lang="de-DE" smtClean="0"/>
               <a:pPr/>
-              <a:t>23.03.2016</a:t>
+              <a:t>25.03.2016</a:t>
             </a:fld>
             <a:endParaRPr lang="de-DE"/>
           </a:p>
@@ -568,7 +568,7 @@
     </p:spTree>
     <p:extLst>
       <p:ext uri="{BB962C8B-B14F-4D97-AF65-F5344CB8AC3E}">
-        <p14:creationId xmlns="" xmlns:p14="http://schemas.microsoft.com/office/powerpoint/2010/main" val="1984578866"/>
+        <p14:creationId xmlns:p14="http://schemas.microsoft.com/office/powerpoint/2010/main" val="1984578866"/>
       </p:ext>
     </p:extLst>
   </p:cSld>
@@ -712,6 +712,686 @@
           <a:bodyPr/>
           <a:lstStyle/>
           <a:p>
+            <a:endParaRPr lang="de-DE"/>
+          </a:p>
+        </p:txBody>
+      </p:sp>
+      <p:sp>
+        <p:nvSpPr>
+          <p:cNvPr id="4" name="Slide Number Placeholder 3"/>
+          <p:cNvSpPr>
+            <a:spLocks noGrp="1"/>
+          </p:cNvSpPr>
+          <p:nvPr>
+            <p:ph type="sldNum" sz="quarter" idx="10"/>
+          </p:nvPr>
+        </p:nvSpPr>
+        <p:spPr/>
+        <p:txBody>
+          <a:bodyPr/>
+          <a:lstStyle/>
+          <a:p>
+            <a:fld id="{D6E72435-FA90-4640-AFCA-E6A02F5F1494}" type="slidenum">
+              <a:rPr lang="de-DE" smtClean="0"/>
+              <a:pPr/>
+              <a:t>1</a:t>
+            </a:fld>
+            <a:endParaRPr lang="de-DE"/>
+          </a:p>
+        </p:txBody>
+      </p:sp>
+    </p:spTree>
+    <p:extLst>
+      <p:ext uri="{BB962C8B-B14F-4D97-AF65-F5344CB8AC3E}">
+        <p14:creationId xmlns:p14="http://schemas.microsoft.com/office/powerpoint/2010/main" val="1065730553"/>
+      </p:ext>
+    </p:extLst>
+  </p:cSld>
+  <p:clrMapOvr>
+    <a:masterClrMapping/>
+  </p:clrMapOvr>
+</p:notes>
+</file>
+
+<file path=ppt/notesSlides/notesSlide10.xml><?xml version="1.0" encoding="utf-8"?>
+<p:notes xmlns:a="http://schemas.openxmlformats.org/drawingml/2006/main" xmlns:r="http://schemas.openxmlformats.org/officeDocument/2006/relationships" xmlns:p="http://schemas.openxmlformats.org/presentationml/2006/main">
+  <p:cSld>
+    <p:spTree>
+      <p:nvGrpSpPr>
+        <p:cNvPr id="1" name=""/>
+        <p:cNvGrpSpPr/>
+        <p:nvPr/>
+      </p:nvGrpSpPr>
+      <p:grpSpPr>
+        <a:xfrm>
+          <a:off x="0" y="0"/>
+          <a:ext cx="0" cy="0"/>
+          <a:chOff x="0" y="0"/>
+          <a:chExt cx="0" cy="0"/>
+        </a:xfrm>
+      </p:grpSpPr>
+      <p:sp>
+        <p:nvSpPr>
+          <p:cNvPr id="2" name="Slide Image Placeholder 1"/>
+          <p:cNvSpPr>
+            <a:spLocks noGrp="1" noRot="1" noChangeAspect="1"/>
+          </p:cNvSpPr>
+          <p:nvPr>
+            <p:ph type="sldImg"/>
+          </p:nvPr>
+        </p:nvSpPr>
+        <p:spPr/>
+      </p:sp>
+      <p:sp>
+        <p:nvSpPr>
+          <p:cNvPr id="3" name="Notes Placeholder 2"/>
+          <p:cNvSpPr>
+            <a:spLocks noGrp="1"/>
+          </p:cNvSpPr>
+          <p:nvPr>
+            <p:ph type="body" idx="1"/>
+          </p:nvPr>
+        </p:nvSpPr>
+        <p:spPr/>
+        <p:txBody>
+          <a:bodyPr/>
+          <a:lstStyle/>
+          <a:p>
+            <a:endParaRPr lang="de-DE"/>
+          </a:p>
+        </p:txBody>
+      </p:sp>
+      <p:sp>
+        <p:nvSpPr>
+          <p:cNvPr id="4" name="Slide Number Placeholder 3"/>
+          <p:cNvSpPr>
+            <a:spLocks noGrp="1"/>
+          </p:cNvSpPr>
+          <p:nvPr>
+            <p:ph type="sldNum" sz="quarter" idx="10"/>
+          </p:nvPr>
+        </p:nvSpPr>
+        <p:spPr/>
+        <p:txBody>
+          <a:bodyPr/>
+          <a:lstStyle/>
+          <a:p>
+            <a:fld id="{D6E72435-FA90-4640-AFCA-E6A02F5F1494}" type="slidenum">
+              <a:rPr lang="de-DE" smtClean="0"/>
+              <a:pPr/>
+              <a:t>10</a:t>
+            </a:fld>
+            <a:endParaRPr lang="de-DE"/>
+          </a:p>
+        </p:txBody>
+      </p:sp>
+    </p:spTree>
+    <p:extLst>
+      <p:ext uri="{BB962C8B-B14F-4D97-AF65-F5344CB8AC3E}">
+        <p14:creationId xmlns:p14="http://schemas.microsoft.com/office/powerpoint/2010/main" val="1269152783"/>
+      </p:ext>
+    </p:extLst>
+  </p:cSld>
+  <p:clrMapOvr>
+    <a:masterClrMapping/>
+  </p:clrMapOvr>
+</p:notes>
+</file>
+
+<file path=ppt/notesSlides/notesSlide11.xml><?xml version="1.0" encoding="utf-8"?>
+<p:notes xmlns:a="http://schemas.openxmlformats.org/drawingml/2006/main" xmlns:r="http://schemas.openxmlformats.org/officeDocument/2006/relationships" xmlns:p="http://schemas.openxmlformats.org/presentationml/2006/main">
+  <p:cSld>
+    <p:spTree>
+      <p:nvGrpSpPr>
+        <p:cNvPr id="1" name=""/>
+        <p:cNvGrpSpPr/>
+        <p:nvPr/>
+      </p:nvGrpSpPr>
+      <p:grpSpPr>
+        <a:xfrm>
+          <a:off x="0" y="0"/>
+          <a:ext cx="0" cy="0"/>
+          <a:chOff x="0" y="0"/>
+          <a:chExt cx="0" cy="0"/>
+        </a:xfrm>
+      </p:grpSpPr>
+      <p:sp>
+        <p:nvSpPr>
+          <p:cNvPr id="2" name="Slide Image Placeholder 1"/>
+          <p:cNvSpPr>
+            <a:spLocks noGrp="1" noRot="1" noChangeAspect="1"/>
+          </p:cNvSpPr>
+          <p:nvPr>
+            <p:ph type="sldImg"/>
+          </p:nvPr>
+        </p:nvSpPr>
+        <p:spPr/>
+      </p:sp>
+      <p:sp>
+        <p:nvSpPr>
+          <p:cNvPr id="3" name="Notes Placeholder 2"/>
+          <p:cNvSpPr>
+            <a:spLocks noGrp="1"/>
+          </p:cNvSpPr>
+          <p:nvPr>
+            <p:ph type="body" idx="1"/>
+          </p:nvPr>
+        </p:nvSpPr>
+        <p:spPr/>
+        <p:txBody>
+          <a:bodyPr/>
+          <a:lstStyle/>
+          <a:p>
+            <a:endParaRPr lang="de-DE"/>
+          </a:p>
+        </p:txBody>
+      </p:sp>
+      <p:sp>
+        <p:nvSpPr>
+          <p:cNvPr id="4" name="Slide Number Placeholder 3"/>
+          <p:cNvSpPr>
+            <a:spLocks noGrp="1"/>
+          </p:cNvSpPr>
+          <p:nvPr>
+            <p:ph type="sldNum" sz="quarter" idx="10"/>
+          </p:nvPr>
+        </p:nvSpPr>
+        <p:spPr/>
+        <p:txBody>
+          <a:bodyPr/>
+          <a:lstStyle/>
+          <a:p>
+            <a:fld id="{D6E72435-FA90-4640-AFCA-E6A02F5F1494}" type="slidenum">
+              <a:rPr lang="de-DE" smtClean="0"/>
+              <a:pPr/>
+              <a:t>11</a:t>
+            </a:fld>
+            <a:endParaRPr lang="de-DE"/>
+          </a:p>
+        </p:txBody>
+      </p:sp>
+    </p:spTree>
+    <p:extLst>
+      <p:ext uri="{BB962C8B-B14F-4D97-AF65-F5344CB8AC3E}">
+        <p14:creationId xmlns:p14="http://schemas.microsoft.com/office/powerpoint/2010/main" val="4068946874"/>
+      </p:ext>
+    </p:extLst>
+  </p:cSld>
+  <p:clrMapOvr>
+    <a:masterClrMapping/>
+  </p:clrMapOvr>
+</p:notes>
+</file>
+
+<file path=ppt/notesSlides/notesSlide12.xml><?xml version="1.0" encoding="utf-8"?>
+<p:notes xmlns:a="http://schemas.openxmlformats.org/drawingml/2006/main" xmlns:r="http://schemas.openxmlformats.org/officeDocument/2006/relationships" xmlns:p="http://schemas.openxmlformats.org/presentationml/2006/main">
+  <p:cSld>
+    <p:spTree>
+      <p:nvGrpSpPr>
+        <p:cNvPr id="1" name=""/>
+        <p:cNvGrpSpPr/>
+        <p:nvPr/>
+      </p:nvGrpSpPr>
+      <p:grpSpPr>
+        <a:xfrm>
+          <a:off x="0" y="0"/>
+          <a:ext cx="0" cy="0"/>
+          <a:chOff x="0" y="0"/>
+          <a:chExt cx="0" cy="0"/>
+        </a:xfrm>
+      </p:grpSpPr>
+      <p:sp>
+        <p:nvSpPr>
+          <p:cNvPr id="2" name="Slide Image Placeholder 1"/>
+          <p:cNvSpPr>
+            <a:spLocks noGrp="1" noRot="1" noChangeAspect="1"/>
+          </p:cNvSpPr>
+          <p:nvPr>
+            <p:ph type="sldImg"/>
+          </p:nvPr>
+        </p:nvSpPr>
+        <p:spPr/>
+      </p:sp>
+      <p:sp>
+        <p:nvSpPr>
+          <p:cNvPr id="3" name="Notes Placeholder 2"/>
+          <p:cNvSpPr>
+            <a:spLocks noGrp="1"/>
+          </p:cNvSpPr>
+          <p:nvPr>
+            <p:ph type="body" idx="1"/>
+          </p:nvPr>
+        </p:nvSpPr>
+        <p:spPr/>
+        <p:txBody>
+          <a:bodyPr/>
+          <a:lstStyle/>
+          <a:p>
+            <a:endParaRPr lang="de-DE"/>
+          </a:p>
+        </p:txBody>
+      </p:sp>
+      <p:sp>
+        <p:nvSpPr>
+          <p:cNvPr id="4" name="Slide Number Placeholder 3"/>
+          <p:cNvSpPr>
+            <a:spLocks noGrp="1"/>
+          </p:cNvSpPr>
+          <p:nvPr>
+            <p:ph type="sldNum" sz="quarter" idx="10"/>
+          </p:nvPr>
+        </p:nvSpPr>
+        <p:spPr/>
+        <p:txBody>
+          <a:bodyPr/>
+          <a:lstStyle/>
+          <a:p>
+            <a:fld id="{D6E72435-FA90-4640-AFCA-E6A02F5F1494}" type="slidenum">
+              <a:rPr lang="de-DE" smtClean="0"/>
+              <a:pPr/>
+              <a:t>12</a:t>
+            </a:fld>
+            <a:endParaRPr lang="de-DE"/>
+          </a:p>
+        </p:txBody>
+      </p:sp>
+    </p:spTree>
+    <p:extLst>
+      <p:ext uri="{BB962C8B-B14F-4D97-AF65-F5344CB8AC3E}">
+        <p14:creationId xmlns:p14="http://schemas.microsoft.com/office/powerpoint/2010/main" val="2841130257"/>
+      </p:ext>
+    </p:extLst>
+  </p:cSld>
+  <p:clrMapOvr>
+    <a:masterClrMapping/>
+  </p:clrMapOvr>
+</p:notes>
+</file>
+
+<file path=ppt/notesSlides/notesSlide13.xml><?xml version="1.0" encoding="utf-8"?>
+<p:notes xmlns:a="http://schemas.openxmlformats.org/drawingml/2006/main" xmlns:r="http://schemas.openxmlformats.org/officeDocument/2006/relationships" xmlns:p="http://schemas.openxmlformats.org/presentationml/2006/main">
+  <p:cSld>
+    <p:spTree>
+      <p:nvGrpSpPr>
+        <p:cNvPr id="1" name=""/>
+        <p:cNvGrpSpPr/>
+        <p:nvPr/>
+      </p:nvGrpSpPr>
+      <p:grpSpPr>
+        <a:xfrm>
+          <a:off x="0" y="0"/>
+          <a:ext cx="0" cy="0"/>
+          <a:chOff x="0" y="0"/>
+          <a:chExt cx="0" cy="0"/>
+        </a:xfrm>
+      </p:grpSpPr>
+      <p:sp>
+        <p:nvSpPr>
+          <p:cNvPr id="2" name="Slide Image Placeholder 1"/>
+          <p:cNvSpPr>
+            <a:spLocks noGrp="1" noRot="1" noChangeAspect="1"/>
+          </p:cNvSpPr>
+          <p:nvPr>
+            <p:ph type="sldImg"/>
+          </p:nvPr>
+        </p:nvSpPr>
+        <p:spPr/>
+      </p:sp>
+      <p:sp>
+        <p:nvSpPr>
+          <p:cNvPr id="3" name="Notes Placeholder 2"/>
+          <p:cNvSpPr>
+            <a:spLocks noGrp="1"/>
+          </p:cNvSpPr>
+          <p:nvPr>
+            <p:ph type="body" idx="1"/>
+          </p:nvPr>
+        </p:nvSpPr>
+        <p:spPr/>
+        <p:txBody>
+          <a:bodyPr/>
+          <a:lstStyle/>
+          <a:p>
+            <a:endParaRPr lang="de-DE"/>
+          </a:p>
+        </p:txBody>
+      </p:sp>
+      <p:sp>
+        <p:nvSpPr>
+          <p:cNvPr id="4" name="Slide Number Placeholder 3"/>
+          <p:cNvSpPr>
+            <a:spLocks noGrp="1"/>
+          </p:cNvSpPr>
+          <p:nvPr>
+            <p:ph type="sldNum" sz="quarter" idx="10"/>
+          </p:nvPr>
+        </p:nvSpPr>
+        <p:spPr/>
+        <p:txBody>
+          <a:bodyPr/>
+          <a:lstStyle/>
+          <a:p>
+            <a:fld id="{D6E72435-FA90-4640-AFCA-E6A02F5F1494}" type="slidenum">
+              <a:rPr lang="de-DE" smtClean="0"/>
+              <a:pPr/>
+              <a:t>13</a:t>
+            </a:fld>
+            <a:endParaRPr lang="de-DE"/>
+          </a:p>
+        </p:txBody>
+      </p:sp>
+    </p:spTree>
+    <p:extLst>
+      <p:ext uri="{BB962C8B-B14F-4D97-AF65-F5344CB8AC3E}">
+        <p14:creationId xmlns:p14="http://schemas.microsoft.com/office/powerpoint/2010/main" val="1164118675"/>
+      </p:ext>
+    </p:extLst>
+  </p:cSld>
+  <p:clrMapOvr>
+    <a:masterClrMapping/>
+  </p:clrMapOvr>
+</p:notes>
+</file>
+
+<file path=ppt/notesSlides/notesSlide14.xml><?xml version="1.0" encoding="utf-8"?>
+<p:notes xmlns:a="http://schemas.openxmlformats.org/drawingml/2006/main" xmlns:r="http://schemas.openxmlformats.org/officeDocument/2006/relationships" xmlns:p="http://schemas.openxmlformats.org/presentationml/2006/main">
+  <p:cSld>
+    <p:spTree>
+      <p:nvGrpSpPr>
+        <p:cNvPr id="1" name=""/>
+        <p:cNvGrpSpPr/>
+        <p:nvPr/>
+      </p:nvGrpSpPr>
+      <p:grpSpPr>
+        <a:xfrm>
+          <a:off x="0" y="0"/>
+          <a:ext cx="0" cy="0"/>
+          <a:chOff x="0" y="0"/>
+          <a:chExt cx="0" cy="0"/>
+        </a:xfrm>
+      </p:grpSpPr>
+      <p:sp>
+        <p:nvSpPr>
+          <p:cNvPr id="2" name="Slide Image Placeholder 1"/>
+          <p:cNvSpPr>
+            <a:spLocks noGrp="1" noRot="1" noChangeAspect="1"/>
+          </p:cNvSpPr>
+          <p:nvPr>
+            <p:ph type="sldImg"/>
+          </p:nvPr>
+        </p:nvSpPr>
+        <p:spPr/>
+      </p:sp>
+      <p:sp>
+        <p:nvSpPr>
+          <p:cNvPr id="3" name="Notes Placeholder 2"/>
+          <p:cNvSpPr>
+            <a:spLocks noGrp="1"/>
+          </p:cNvSpPr>
+          <p:nvPr>
+            <p:ph type="body" idx="1"/>
+          </p:nvPr>
+        </p:nvSpPr>
+        <p:spPr/>
+        <p:txBody>
+          <a:bodyPr/>
+          <a:lstStyle/>
+          <a:p>
+            <a:endParaRPr lang="de-DE"/>
+          </a:p>
+        </p:txBody>
+      </p:sp>
+      <p:sp>
+        <p:nvSpPr>
+          <p:cNvPr id="4" name="Slide Number Placeholder 3"/>
+          <p:cNvSpPr>
+            <a:spLocks noGrp="1"/>
+          </p:cNvSpPr>
+          <p:nvPr>
+            <p:ph type="sldNum" sz="quarter" idx="10"/>
+          </p:nvPr>
+        </p:nvSpPr>
+        <p:spPr/>
+        <p:txBody>
+          <a:bodyPr/>
+          <a:lstStyle/>
+          <a:p>
+            <a:fld id="{D6E72435-FA90-4640-AFCA-E6A02F5F1494}" type="slidenum">
+              <a:rPr lang="de-DE" smtClean="0"/>
+              <a:pPr/>
+              <a:t>14</a:t>
+            </a:fld>
+            <a:endParaRPr lang="de-DE"/>
+          </a:p>
+        </p:txBody>
+      </p:sp>
+    </p:spTree>
+    <p:extLst>
+      <p:ext uri="{BB962C8B-B14F-4D97-AF65-F5344CB8AC3E}">
+        <p14:creationId xmlns:p14="http://schemas.microsoft.com/office/powerpoint/2010/main" val="1051459903"/>
+      </p:ext>
+    </p:extLst>
+  </p:cSld>
+  <p:clrMapOvr>
+    <a:masterClrMapping/>
+  </p:clrMapOvr>
+</p:notes>
+</file>
+
+<file path=ppt/notesSlides/notesSlide15.xml><?xml version="1.0" encoding="utf-8"?>
+<p:notes xmlns:a="http://schemas.openxmlformats.org/drawingml/2006/main" xmlns:r="http://schemas.openxmlformats.org/officeDocument/2006/relationships" xmlns:p="http://schemas.openxmlformats.org/presentationml/2006/main">
+  <p:cSld>
+    <p:spTree>
+      <p:nvGrpSpPr>
+        <p:cNvPr id="1" name=""/>
+        <p:cNvGrpSpPr/>
+        <p:nvPr/>
+      </p:nvGrpSpPr>
+      <p:grpSpPr>
+        <a:xfrm>
+          <a:off x="0" y="0"/>
+          <a:ext cx="0" cy="0"/>
+          <a:chOff x="0" y="0"/>
+          <a:chExt cx="0" cy="0"/>
+        </a:xfrm>
+      </p:grpSpPr>
+      <p:sp>
+        <p:nvSpPr>
+          <p:cNvPr id="2" name="Slide Image Placeholder 1"/>
+          <p:cNvSpPr>
+            <a:spLocks noGrp="1" noRot="1" noChangeAspect="1"/>
+          </p:cNvSpPr>
+          <p:nvPr>
+            <p:ph type="sldImg"/>
+          </p:nvPr>
+        </p:nvSpPr>
+        <p:spPr/>
+      </p:sp>
+      <p:sp>
+        <p:nvSpPr>
+          <p:cNvPr id="3" name="Notes Placeholder 2"/>
+          <p:cNvSpPr>
+            <a:spLocks noGrp="1"/>
+          </p:cNvSpPr>
+          <p:nvPr>
+            <p:ph type="body" idx="1"/>
+          </p:nvPr>
+        </p:nvSpPr>
+        <p:spPr/>
+        <p:txBody>
+          <a:bodyPr/>
+          <a:lstStyle/>
+          <a:p>
+            <a:endParaRPr lang="de-DE"/>
+          </a:p>
+        </p:txBody>
+      </p:sp>
+      <p:sp>
+        <p:nvSpPr>
+          <p:cNvPr id="4" name="Slide Number Placeholder 3"/>
+          <p:cNvSpPr>
+            <a:spLocks noGrp="1"/>
+          </p:cNvSpPr>
+          <p:nvPr>
+            <p:ph type="sldNum" sz="quarter" idx="10"/>
+          </p:nvPr>
+        </p:nvSpPr>
+        <p:spPr/>
+        <p:txBody>
+          <a:bodyPr/>
+          <a:lstStyle/>
+          <a:p>
+            <a:fld id="{D6E72435-FA90-4640-AFCA-E6A02F5F1494}" type="slidenum">
+              <a:rPr lang="de-DE" smtClean="0"/>
+              <a:pPr/>
+              <a:t>15</a:t>
+            </a:fld>
+            <a:endParaRPr lang="de-DE"/>
+          </a:p>
+        </p:txBody>
+      </p:sp>
+    </p:spTree>
+    <p:extLst>
+      <p:ext uri="{BB962C8B-B14F-4D97-AF65-F5344CB8AC3E}">
+        <p14:creationId xmlns:p14="http://schemas.microsoft.com/office/powerpoint/2010/main" val="2903287065"/>
+      </p:ext>
+    </p:extLst>
+  </p:cSld>
+  <p:clrMapOvr>
+    <a:masterClrMapping/>
+  </p:clrMapOvr>
+</p:notes>
+</file>
+
+<file path=ppt/notesSlides/notesSlide16.xml><?xml version="1.0" encoding="utf-8"?>
+<p:notes xmlns:a="http://schemas.openxmlformats.org/drawingml/2006/main" xmlns:r="http://schemas.openxmlformats.org/officeDocument/2006/relationships" xmlns:p="http://schemas.openxmlformats.org/presentationml/2006/main">
+  <p:cSld>
+    <p:spTree>
+      <p:nvGrpSpPr>
+        <p:cNvPr id="1" name=""/>
+        <p:cNvGrpSpPr/>
+        <p:nvPr/>
+      </p:nvGrpSpPr>
+      <p:grpSpPr>
+        <a:xfrm>
+          <a:off x="0" y="0"/>
+          <a:ext cx="0" cy="0"/>
+          <a:chOff x="0" y="0"/>
+          <a:chExt cx="0" cy="0"/>
+        </a:xfrm>
+      </p:grpSpPr>
+      <p:sp>
+        <p:nvSpPr>
+          <p:cNvPr id="2" name="Slide Image Placeholder 1"/>
+          <p:cNvSpPr>
+            <a:spLocks noGrp="1" noRot="1" noChangeAspect="1"/>
+          </p:cNvSpPr>
+          <p:nvPr>
+            <p:ph type="sldImg"/>
+          </p:nvPr>
+        </p:nvSpPr>
+        <p:spPr/>
+      </p:sp>
+      <p:sp>
+        <p:nvSpPr>
+          <p:cNvPr id="3" name="Notes Placeholder 2"/>
+          <p:cNvSpPr>
+            <a:spLocks noGrp="1"/>
+          </p:cNvSpPr>
+          <p:nvPr>
+            <p:ph type="body" idx="1"/>
+          </p:nvPr>
+        </p:nvSpPr>
+        <p:spPr/>
+        <p:txBody>
+          <a:bodyPr/>
+          <a:lstStyle/>
+          <a:p>
+            <a:endParaRPr lang="de-DE"/>
+          </a:p>
+        </p:txBody>
+      </p:sp>
+      <p:sp>
+        <p:nvSpPr>
+          <p:cNvPr id="4" name="Slide Number Placeholder 3"/>
+          <p:cNvSpPr>
+            <a:spLocks noGrp="1"/>
+          </p:cNvSpPr>
+          <p:nvPr>
+            <p:ph type="sldNum" sz="quarter" idx="10"/>
+          </p:nvPr>
+        </p:nvSpPr>
+        <p:spPr/>
+        <p:txBody>
+          <a:bodyPr/>
+          <a:lstStyle/>
+          <a:p>
+            <a:fld id="{D6E72435-FA90-4640-AFCA-E6A02F5F1494}" type="slidenum">
+              <a:rPr lang="de-DE" smtClean="0"/>
+              <a:pPr/>
+              <a:t>16</a:t>
+            </a:fld>
+            <a:endParaRPr lang="de-DE"/>
+          </a:p>
+        </p:txBody>
+      </p:sp>
+    </p:spTree>
+    <p:extLst>
+      <p:ext uri="{BB962C8B-B14F-4D97-AF65-F5344CB8AC3E}">
+        <p14:creationId xmlns:p14="http://schemas.microsoft.com/office/powerpoint/2010/main" val="4254741149"/>
+      </p:ext>
+    </p:extLst>
+  </p:cSld>
+  <p:clrMapOvr>
+    <a:masterClrMapping/>
+  </p:clrMapOvr>
+</p:notes>
+</file>
+
+<file path=ppt/notesSlides/notesSlide17.xml><?xml version="1.0" encoding="utf-8"?>
+<p:notes xmlns:a="http://schemas.openxmlformats.org/drawingml/2006/main" xmlns:r="http://schemas.openxmlformats.org/officeDocument/2006/relationships" xmlns:p="http://schemas.openxmlformats.org/presentationml/2006/main">
+  <p:cSld>
+    <p:spTree>
+      <p:nvGrpSpPr>
+        <p:cNvPr id="1" name=""/>
+        <p:cNvGrpSpPr/>
+        <p:nvPr/>
+      </p:nvGrpSpPr>
+      <p:grpSpPr>
+        <a:xfrm>
+          <a:off x="0" y="0"/>
+          <a:ext cx="0" cy="0"/>
+          <a:chOff x="0" y="0"/>
+          <a:chExt cx="0" cy="0"/>
+        </a:xfrm>
+      </p:grpSpPr>
+      <p:sp>
+        <p:nvSpPr>
+          <p:cNvPr id="2" name="Slide Image Placeholder 1"/>
+          <p:cNvSpPr>
+            <a:spLocks noGrp="1" noRot="1" noChangeAspect="1"/>
+          </p:cNvSpPr>
+          <p:nvPr>
+            <p:ph type="sldImg"/>
+          </p:nvPr>
+        </p:nvSpPr>
+        <p:spPr/>
+      </p:sp>
+      <p:sp>
+        <p:nvSpPr>
+          <p:cNvPr id="3" name="Notes Placeholder 2"/>
+          <p:cNvSpPr>
+            <a:spLocks noGrp="1"/>
+          </p:cNvSpPr>
+          <p:nvPr>
+            <p:ph type="body" idx="1"/>
+          </p:nvPr>
+        </p:nvSpPr>
+        <p:spPr/>
+        <p:txBody>
+          <a:bodyPr/>
+          <a:lstStyle/>
+          <a:p>
             <a:endParaRPr lang="de-DE" dirty="0"/>
           </a:p>
         </p:txBody>
@@ -743,7 +1423,92 @@
     </p:spTree>
     <p:extLst>
       <p:ext uri="{BB962C8B-B14F-4D97-AF65-F5344CB8AC3E}">
-        <p14:creationId xmlns="" xmlns:p14="http://schemas.microsoft.com/office/powerpoint/2010/main" val="4054934049"/>
+        <p14:creationId xmlns:p14="http://schemas.microsoft.com/office/powerpoint/2010/main" val="4054934049"/>
+      </p:ext>
+    </p:extLst>
+  </p:cSld>
+  <p:clrMapOvr>
+    <a:masterClrMapping/>
+  </p:clrMapOvr>
+</p:notes>
+</file>
+
+<file path=ppt/notesSlides/notesSlide18.xml><?xml version="1.0" encoding="utf-8"?>
+<p:notes xmlns:a="http://schemas.openxmlformats.org/drawingml/2006/main" xmlns:r="http://schemas.openxmlformats.org/officeDocument/2006/relationships" xmlns:p="http://schemas.openxmlformats.org/presentationml/2006/main">
+  <p:cSld>
+    <p:spTree>
+      <p:nvGrpSpPr>
+        <p:cNvPr id="1" name=""/>
+        <p:cNvGrpSpPr/>
+        <p:nvPr/>
+      </p:nvGrpSpPr>
+      <p:grpSpPr>
+        <a:xfrm>
+          <a:off x="0" y="0"/>
+          <a:ext cx="0" cy="0"/>
+          <a:chOff x="0" y="0"/>
+          <a:chExt cx="0" cy="0"/>
+        </a:xfrm>
+      </p:grpSpPr>
+      <p:sp>
+        <p:nvSpPr>
+          <p:cNvPr id="2" name="Slide Image Placeholder 1"/>
+          <p:cNvSpPr>
+            <a:spLocks noGrp="1" noRot="1" noChangeAspect="1"/>
+          </p:cNvSpPr>
+          <p:nvPr>
+            <p:ph type="sldImg"/>
+          </p:nvPr>
+        </p:nvSpPr>
+        <p:spPr/>
+      </p:sp>
+      <p:sp>
+        <p:nvSpPr>
+          <p:cNvPr id="3" name="Notes Placeholder 2"/>
+          <p:cNvSpPr>
+            <a:spLocks noGrp="1"/>
+          </p:cNvSpPr>
+          <p:nvPr>
+            <p:ph type="body" idx="1"/>
+          </p:nvPr>
+        </p:nvSpPr>
+        <p:spPr/>
+        <p:txBody>
+          <a:bodyPr/>
+          <a:lstStyle/>
+          <a:p>
+            <a:endParaRPr lang="de-DE" dirty="0"/>
+          </a:p>
+        </p:txBody>
+      </p:sp>
+      <p:sp>
+        <p:nvSpPr>
+          <p:cNvPr id="4" name="Slide Number Placeholder 3"/>
+          <p:cNvSpPr>
+            <a:spLocks noGrp="1"/>
+          </p:cNvSpPr>
+          <p:nvPr>
+            <p:ph type="sldNum" sz="quarter" idx="10"/>
+          </p:nvPr>
+        </p:nvSpPr>
+        <p:spPr/>
+        <p:txBody>
+          <a:bodyPr/>
+          <a:lstStyle/>
+          <a:p>
+            <a:fld id="{D6E72435-FA90-4640-AFCA-E6A02F5F1494}" type="slidenum">
+              <a:rPr lang="de-DE" smtClean="0"/>
+              <a:pPr/>
+              <a:t>18</a:t>
+            </a:fld>
+            <a:endParaRPr lang="de-DE"/>
+          </a:p>
+        </p:txBody>
+      </p:sp>
+    </p:spTree>
+    <p:extLst>
+      <p:ext uri="{BB962C8B-B14F-4D97-AF65-F5344CB8AC3E}">
+        <p14:creationId xmlns:p14="http://schemas.microsoft.com/office/powerpoint/2010/main" val="762545407"/>
       </p:ext>
     </p:extLst>
   </p:cSld>
@@ -797,7 +1562,7 @@
           <a:bodyPr/>
           <a:lstStyle/>
           <a:p>
-            <a:endParaRPr lang="de-DE" dirty="0"/>
+            <a:endParaRPr lang="de-DE"/>
           </a:p>
         </p:txBody>
       </p:sp>
@@ -819,7 +1584,7 @@
             <a:fld id="{D6E72435-FA90-4640-AFCA-E6A02F5F1494}" type="slidenum">
               <a:rPr lang="de-DE" smtClean="0"/>
               <a:pPr/>
-              <a:t>18</a:t>
+              <a:t>2</a:t>
             </a:fld>
             <a:endParaRPr lang="de-DE"/>
           </a:p>
@@ -828,7 +1593,602 @@
     </p:spTree>
     <p:extLst>
       <p:ext uri="{BB962C8B-B14F-4D97-AF65-F5344CB8AC3E}">
-        <p14:creationId xmlns="" xmlns:p14="http://schemas.microsoft.com/office/powerpoint/2010/main" val="762545407"/>
+        <p14:creationId xmlns:p14="http://schemas.microsoft.com/office/powerpoint/2010/main" val="1452491637"/>
+      </p:ext>
+    </p:extLst>
+  </p:cSld>
+  <p:clrMapOvr>
+    <a:masterClrMapping/>
+  </p:clrMapOvr>
+</p:notes>
+</file>
+
+<file path=ppt/notesSlides/notesSlide3.xml><?xml version="1.0" encoding="utf-8"?>
+<p:notes xmlns:a="http://schemas.openxmlformats.org/drawingml/2006/main" xmlns:r="http://schemas.openxmlformats.org/officeDocument/2006/relationships" xmlns:p="http://schemas.openxmlformats.org/presentationml/2006/main">
+  <p:cSld>
+    <p:spTree>
+      <p:nvGrpSpPr>
+        <p:cNvPr id="1" name=""/>
+        <p:cNvGrpSpPr/>
+        <p:nvPr/>
+      </p:nvGrpSpPr>
+      <p:grpSpPr>
+        <a:xfrm>
+          <a:off x="0" y="0"/>
+          <a:ext cx="0" cy="0"/>
+          <a:chOff x="0" y="0"/>
+          <a:chExt cx="0" cy="0"/>
+        </a:xfrm>
+      </p:grpSpPr>
+      <p:sp>
+        <p:nvSpPr>
+          <p:cNvPr id="2" name="Slide Image Placeholder 1"/>
+          <p:cNvSpPr>
+            <a:spLocks noGrp="1" noRot="1" noChangeAspect="1"/>
+          </p:cNvSpPr>
+          <p:nvPr>
+            <p:ph type="sldImg"/>
+          </p:nvPr>
+        </p:nvSpPr>
+        <p:spPr/>
+      </p:sp>
+      <p:sp>
+        <p:nvSpPr>
+          <p:cNvPr id="3" name="Notes Placeholder 2"/>
+          <p:cNvSpPr>
+            <a:spLocks noGrp="1"/>
+          </p:cNvSpPr>
+          <p:nvPr>
+            <p:ph type="body" idx="1"/>
+          </p:nvPr>
+        </p:nvSpPr>
+        <p:spPr/>
+        <p:txBody>
+          <a:bodyPr/>
+          <a:lstStyle/>
+          <a:p>
+            <a:endParaRPr lang="de-DE"/>
+          </a:p>
+        </p:txBody>
+      </p:sp>
+      <p:sp>
+        <p:nvSpPr>
+          <p:cNvPr id="4" name="Slide Number Placeholder 3"/>
+          <p:cNvSpPr>
+            <a:spLocks noGrp="1"/>
+          </p:cNvSpPr>
+          <p:nvPr>
+            <p:ph type="sldNum" sz="quarter" idx="10"/>
+          </p:nvPr>
+        </p:nvSpPr>
+        <p:spPr/>
+        <p:txBody>
+          <a:bodyPr/>
+          <a:lstStyle/>
+          <a:p>
+            <a:fld id="{D6E72435-FA90-4640-AFCA-E6A02F5F1494}" type="slidenum">
+              <a:rPr lang="de-DE" smtClean="0"/>
+              <a:pPr/>
+              <a:t>3</a:t>
+            </a:fld>
+            <a:endParaRPr lang="de-DE"/>
+          </a:p>
+        </p:txBody>
+      </p:sp>
+    </p:spTree>
+    <p:extLst>
+      <p:ext uri="{BB962C8B-B14F-4D97-AF65-F5344CB8AC3E}">
+        <p14:creationId xmlns:p14="http://schemas.microsoft.com/office/powerpoint/2010/main" val="1163449672"/>
+      </p:ext>
+    </p:extLst>
+  </p:cSld>
+  <p:clrMapOvr>
+    <a:masterClrMapping/>
+  </p:clrMapOvr>
+</p:notes>
+</file>
+
+<file path=ppt/notesSlides/notesSlide4.xml><?xml version="1.0" encoding="utf-8"?>
+<p:notes xmlns:a="http://schemas.openxmlformats.org/drawingml/2006/main" xmlns:r="http://schemas.openxmlformats.org/officeDocument/2006/relationships" xmlns:p="http://schemas.openxmlformats.org/presentationml/2006/main">
+  <p:cSld>
+    <p:spTree>
+      <p:nvGrpSpPr>
+        <p:cNvPr id="1" name=""/>
+        <p:cNvGrpSpPr/>
+        <p:nvPr/>
+      </p:nvGrpSpPr>
+      <p:grpSpPr>
+        <a:xfrm>
+          <a:off x="0" y="0"/>
+          <a:ext cx="0" cy="0"/>
+          <a:chOff x="0" y="0"/>
+          <a:chExt cx="0" cy="0"/>
+        </a:xfrm>
+      </p:grpSpPr>
+      <p:sp>
+        <p:nvSpPr>
+          <p:cNvPr id="2" name="Slide Image Placeholder 1"/>
+          <p:cNvSpPr>
+            <a:spLocks noGrp="1" noRot="1" noChangeAspect="1"/>
+          </p:cNvSpPr>
+          <p:nvPr>
+            <p:ph type="sldImg"/>
+          </p:nvPr>
+        </p:nvSpPr>
+        <p:spPr/>
+      </p:sp>
+      <p:sp>
+        <p:nvSpPr>
+          <p:cNvPr id="3" name="Notes Placeholder 2"/>
+          <p:cNvSpPr>
+            <a:spLocks noGrp="1"/>
+          </p:cNvSpPr>
+          <p:nvPr>
+            <p:ph type="body" idx="1"/>
+          </p:nvPr>
+        </p:nvSpPr>
+        <p:spPr/>
+        <p:txBody>
+          <a:bodyPr/>
+          <a:lstStyle/>
+          <a:p>
+            <a:endParaRPr lang="de-DE"/>
+          </a:p>
+        </p:txBody>
+      </p:sp>
+      <p:sp>
+        <p:nvSpPr>
+          <p:cNvPr id="4" name="Slide Number Placeholder 3"/>
+          <p:cNvSpPr>
+            <a:spLocks noGrp="1"/>
+          </p:cNvSpPr>
+          <p:nvPr>
+            <p:ph type="sldNum" sz="quarter" idx="10"/>
+          </p:nvPr>
+        </p:nvSpPr>
+        <p:spPr/>
+        <p:txBody>
+          <a:bodyPr/>
+          <a:lstStyle/>
+          <a:p>
+            <a:fld id="{D6E72435-FA90-4640-AFCA-E6A02F5F1494}" type="slidenum">
+              <a:rPr lang="de-DE" smtClean="0"/>
+              <a:pPr/>
+              <a:t>4</a:t>
+            </a:fld>
+            <a:endParaRPr lang="de-DE"/>
+          </a:p>
+        </p:txBody>
+      </p:sp>
+    </p:spTree>
+    <p:extLst>
+      <p:ext uri="{BB962C8B-B14F-4D97-AF65-F5344CB8AC3E}">
+        <p14:creationId xmlns:p14="http://schemas.microsoft.com/office/powerpoint/2010/main" val="325274088"/>
+      </p:ext>
+    </p:extLst>
+  </p:cSld>
+  <p:clrMapOvr>
+    <a:masterClrMapping/>
+  </p:clrMapOvr>
+</p:notes>
+</file>
+
+<file path=ppt/notesSlides/notesSlide5.xml><?xml version="1.0" encoding="utf-8"?>
+<p:notes xmlns:a="http://schemas.openxmlformats.org/drawingml/2006/main" xmlns:r="http://schemas.openxmlformats.org/officeDocument/2006/relationships" xmlns:p="http://schemas.openxmlformats.org/presentationml/2006/main">
+  <p:cSld>
+    <p:spTree>
+      <p:nvGrpSpPr>
+        <p:cNvPr id="1" name=""/>
+        <p:cNvGrpSpPr/>
+        <p:nvPr/>
+      </p:nvGrpSpPr>
+      <p:grpSpPr>
+        <a:xfrm>
+          <a:off x="0" y="0"/>
+          <a:ext cx="0" cy="0"/>
+          <a:chOff x="0" y="0"/>
+          <a:chExt cx="0" cy="0"/>
+        </a:xfrm>
+      </p:grpSpPr>
+      <p:sp>
+        <p:nvSpPr>
+          <p:cNvPr id="2" name="Slide Image Placeholder 1"/>
+          <p:cNvSpPr>
+            <a:spLocks noGrp="1" noRot="1" noChangeAspect="1"/>
+          </p:cNvSpPr>
+          <p:nvPr>
+            <p:ph type="sldImg"/>
+          </p:nvPr>
+        </p:nvSpPr>
+        <p:spPr/>
+      </p:sp>
+      <p:sp>
+        <p:nvSpPr>
+          <p:cNvPr id="3" name="Notes Placeholder 2"/>
+          <p:cNvSpPr>
+            <a:spLocks noGrp="1"/>
+          </p:cNvSpPr>
+          <p:nvPr>
+            <p:ph type="body" idx="1"/>
+          </p:nvPr>
+        </p:nvSpPr>
+        <p:spPr/>
+        <p:txBody>
+          <a:bodyPr/>
+          <a:lstStyle/>
+          <a:p>
+            <a:endParaRPr lang="de-DE"/>
+          </a:p>
+        </p:txBody>
+      </p:sp>
+      <p:sp>
+        <p:nvSpPr>
+          <p:cNvPr id="4" name="Slide Number Placeholder 3"/>
+          <p:cNvSpPr>
+            <a:spLocks noGrp="1"/>
+          </p:cNvSpPr>
+          <p:nvPr>
+            <p:ph type="sldNum" sz="quarter" idx="10"/>
+          </p:nvPr>
+        </p:nvSpPr>
+        <p:spPr/>
+        <p:txBody>
+          <a:bodyPr/>
+          <a:lstStyle/>
+          <a:p>
+            <a:fld id="{D6E72435-FA90-4640-AFCA-E6A02F5F1494}" type="slidenum">
+              <a:rPr lang="de-DE" smtClean="0"/>
+              <a:pPr/>
+              <a:t>5</a:t>
+            </a:fld>
+            <a:endParaRPr lang="de-DE"/>
+          </a:p>
+        </p:txBody>
+      </p:sp>
+    </p:spTree>
+    <p:extLst>
+      <p:ext uri="{BB962C8B-B14F-4D97-AF65-F5344CB8AC3E}">
+        <p14:creationId xmlns:p14="http://schemas.microsoft.com/office/powerpoint/2010/main" val="1263954132"/>
+      </p:ext>
+    </p:extLst>
+  </p:cSld>
+  <p:clrMapOvr>
+    <a:masterClrMapping/>
+  </p:clrMapOvr>
+</p:notes>
+</file>
+
+<file path=ppt/notesSlides/notesSlide6.xml><?xml version="1.0" encoding="utf-8"?>
+<p:notes xmlns:a="http://schemas.openxmlformats.org/drawingml/2006/main" xmlns:r="http://schemas.openxmlformats.org/officeDocument/2006/relationships" xmlns:p="http://schemas.openxmlformats.org/presentationml/2006/main">
+  <p:cSld>
+    <p:spTree>
+      <p:nvGrpSpPr>
+        <p:cNvPr id="1" name=""/>
+        <p:cNvGrpSpPr/>
+        <p:nvPr/>
+      </p:nvGrpSpPr>
+      <p:grpSpPr>
+        <a:xfrm>
+          <a:off x="0" y="0"/>
+          <a:ext cx="0" cy="0"/>
+          <a:chOff x="0" y="0"/>
+          <a:chExt cx="0" cy="0"/>
+        </a:xfrm>
+      </p:grpSpPr>
+      <p:sp>
+        <p:nvSpPr>
+          <p:cNvPr id="2" name="Slide Image Placeholder 1"/>
+          <p:cNvSpPr>
+            <a:spLocks noGrp="1" noRot="1" noChangeAspect="1"/>
+          </p:cNvSpPr>
+          <p:nvPr>
+            <p:ph type="sldImg"/>
+          </p:nvPr>
+        </p:nvSpPr>
+        <p:spPr/>
+      </p:sp>
+      <p:sp>
+        <p:nvSpPr>
+          <p:cNvPr id="3" name="Notes Placeholder 2"/>
+          <p:cNvSpPr>
+            <a:spLocks noGrp="1"/>
+          </p:cNvSpPr>
+          <p:nvPr>
+            <p:ph type="body" idx="1"/>
+          </p:nvPr>
+        </p:nvSpPr>
+        <p:spPr/>
+        <p:txBody>
+          <a:bodyPr/>
+          <a:lstStyle/>
+          <a:p>
+            <a:endParaRPr lang="de-DE"/>
+          </a:p>
+        </p:txBody>
+      </p:sp>
+      <p:sp>
+        <p:nvSpPr>
+          <p:cNvPr id="4" name="Slide Number Placeholder 3"/>
+          <p:cNvSpPr>
+            <a:spLocks noGrp="1"/>
+          </p:cNvSpPr>
+          <p:nvPr>
+            <p:ph type="sldNum" sz="quarter" idx="10"/>
+          </p:nvPr>
+        </p:nvSpPr>
+        <p:spPr/>
+        <p:txBody>
+          <a:bodyPr/>
+          <a:lstStyle/>
+          <a:p>
+            <a:fld id="{D6E72435-FA90-4640-AFCA-E6A02F5F1494}" type="slidenum">
+              <a:rPr lang="de-DE" smtClean="0"/>
+              <a:pPr/>
+              <a:t>6</a:t>
+            </a:fld>
+            <a:endParaRPr lang="de-DE"/>
+          </a:p>
+        </p:txBody>
+      </p:sp>
+    </p:spTree>
+    <p:extLst>
+      <p:ext uri="{BB962C8B-B14F-4D97-AF65-F5344CB8AC3E}">
+        <p14:creationId xmlns:p14="http://schemas.microsoft.com/office/powerpoint/2010/main" val="2274249320"/>
+      </p:ext>
+    </p:extLst>
+  </p:cSld>
+  <p:clrMapOvr>
+    <a:masterClrMapping/>
+  </p:clrMapOvr>
+</p:notes>
+</file>
+
+<file path=ppt/notesSlides/notesSlide7.xml><?xml version="1.0" encoding="utf-8"?>
+<p:notes xmlns:a="http://schemas.openxmlformats.org/drawingml/2006/main" xmlns:r="http://schemas.openxmlformats.org/officeDocument/2006/relationships" xmlns:p="http://schemas.openxmlformats.org/presentationml/2006/main">
+  <p:cSld>
+    <p:spTree>
+      <p:nvGrpSpPr>
+        <p:cNvPr id="1" name=""/>
+        <p:cNvGrpSpPr/>
+        <p:nvPr/>
+      </p:nvGrpSpPr>
+      <p:grpSpPr>
+        <a:xfrm>
+          <a:off x="0" y="0"/>
+          <a:ext cx="0" cy="0"/>
+          <a:chOff x="0" y="0"/>
+          <a:chExt cx="0" cy="0"/>
+        </a:xfrm>
+      </p:grpSpPr>
+      <p:sp>
+        <p:nvSpPr>
+          <p:cNvPr id="2" name="Slide Image Placeholder 1"/>
+          <p:cNvSpPr>
+            <a:spLocks noGrp="1" noRot="1" noChangeAspect="1"/>
+          </p:cNvSpPr>
+          <p:nvPr>
+            <p:ph type="sldImg"/>
+          </p:nvPr>
+        </p:nvSpPr>
+        <p:spPr/>
+      </p:sp>
+      <p:sp>
+        <p:nvSpPr>
+          <p:cNvPr id="3" name="Notes Placeholder 2"/>
+          <p:cNvSpPr>
+            <a:spLocks noGrp="1"/>
+          </p:cNvSpPr>
+          <p:nvPr>
+            <p:ph type="body" idx="1"/>
+          </p:nvPr>
+        </p:nvSpPr>
+        <p:spPr/>
+        <p:txBody>
+          <a:bodyPr/>
+          <a:lstStyle/>
+          <a:p>
+            <a:endParaRPr lang="de-DE"/>
+          </a:p>
+        </p:txBody>
+      </p:sp>
+      <p:sp>
+        <p:nvSpPr>
+          <p:cNvPr id="4" name="Slide Number Placeholder 3"/>
+          <p:cNvSpPr>
+            <a:spLocks noGrp="1"/>
+          </p:cNvSpPr>
+          <p:nvPr>
+            <p:ph type="sldNum" sz="quarter" idx="10"/>
+          </p:nvPr>
+        </p:nvSpPr>
+        <p:spPr/>
+        <p:txBody>
+          <a:bodyPr/>
+          <a:lstStyle/>
+          <a:p>
+            <a:fld id="{D6E72435-FA90-4640-AFCA-E6A02F5F1494}" type="slidenum">
+              <a:rPr lang="de-DE" smtClean="0"/>
+              <a:pPr/>
+              <a:t>7</a:t>
+            </a:fld>
+            <a:endParaRPr lang="de-DE"/>
+          </a:p>
+        </p:txBody>
+      </p:sp>
+    </p:spTree>
+    <p:extLst>
+      <p:ext uri="{BB962C8B-B14F-4D97-AF65-F5344CB8AC3E}">
+        <p14:creationId xmlns:p14="http://schemas.microsoft.com/office/powerpoint/2010/main" val="3085416761"/>
+      </p:ext>
+    </p:extLst>
+  </p:cSld>
+  <p:clrMapOvr>
+    <a:masterClrMapping/>
+  </p:clrMapOvr>
+</p:notes>
+</file>
+
+<file path=ppt/notesSlides/notesSlide8.xml><?xml version="1.0" encoding="utf-8"?>
+<p:notes xmlns:a="http://schemas.openxmlformats.org/drawingml/2006/main" xmlns:r="http://schemas.openxmlformats.org/officeDocument/2006/relationships" xmlns:p="http://schemas.openxmlformats.org/presentationml/2006/main">
+  <p:cSld>
+    <p:spTree>
+      <p:nvGrpSpPr>
+        <p:cNvPr id="1" name=""/>
+        <p:cNvGrpSpPr/>
+        <p:nvPr/>
+      </p:nvGrpSpPr>
+      <p:grpSpPr>
+        <a:xfrm>
+          <a:off x="0" y="0"/>
+          <a:ext cx="0" cy="0"/>
+          <a:chOff x="0" y="0"/>
+          <a:chExt cx="0" cy="0"/>
+        </a:xfrm>
+      </p:grpSpPr>
+      <p:sp>
+        <p:nvSpPr>
+          <p:cNvPr id="2" name="Slide Image Placeholder 1"/>
+          <p:cNvSpPr>
+            <a:spLocks noGrp="1" noRot="1" noChangeAspect="1"/>
+          </p:cNvSpPr>
+          <p:nvPr>
+            <p:ph type="sldImg"/>
+          </p:nvPr>
+        </p:nvSpPr>
+        <p:spPr/>
+      </p:sp>
+      <p:sp>
+        <p:nvSpPr>
+          <p:cNvPr id="3" name="Notes Placeholder 2"/>
+          <p:cNvSpPr>
+            <a:spLocks noGrp="1"/>
+          </p:cNvSpPr>
+          <p:nvPr>
+            <p:ph type="body" idx="1"/>
+          </p:nvPr>
+        </p:nvSpPr>
+        <p:spPr/>
+        <p:txBody>
+          <a:bodyPr/>
+          <a:lstStyle/>
+          <a:p>
+            <a:endParaRPr lang="de-DE"/>
+          </a:p>
+        </p:txBody>
+      </p:sp>
+      <p:sp>
+        <p:nvSpPr>
+          <p:cNvPr id="4" name="Slide Number Placeholder 3"/>
+          <p:cNvSpPr>
+            <a:spLocks noGrp="1"/>
+          </p:cNvSpPr>
+          <p:nvPr>
+            <p:ph type="sldNum" sz="quarter" idx="10"/>
+          </p:nvPr>
+        </p:nvSpPr>
+        <p:spPr/>
+        <p:txBody>
+          <a:bodyPr/>
+          <a:lstStyle/>
+          <a:p>
+            <a:fld id="{D6E72435-FA90-4640-AFCA-E6A02F5F1494}" type="slidenum">
+              <a:rPr lang="de-DE" smtClean="0"/>
+              <a:pPr/>
+              <a:t>8</a:t>
+            </a:fld>
+            <a:endParaRPr lang="de-DE"/>
+          </a:p>
+        </p:txBody>
+      </p:sp>
+    </p:spTree>
+    <p:extLst>
+      <p:ext uri="{BB962C8B-B14F-4D97-AF65-F5344CB8AC3E}">
+        <p14:creationId xmlns:p14="http://schemas.microsoft.com/office/powerpoint/2010/main" val="3817994481"/>
+      </p:ext>
+    </p:extLst>
+  </p:cSld>
+  <p:clrMapOvr>
+    <a:masterClrMapping/>
+  </p:clrMapOvr>
+</p:notes>
+</file>
+
+<file path=ppt/notesSlides/notesSlide9.xml><?xml version="1.0" encoding="utf-8"?>
+<p:notes xmlns:a="http://schemas.openxmlformats.org/drawingml/2006/main" xmlns:r="http://schemas.openxmlformats.org/officeDocument/2006/relationships" xmlns:p="http://schemas.openxmlformats.org/presentationml/2006/main">
+  <p:cSld>
+    <p:spTree>
+      <p:nvGrpSpPr>
+        <p:cNvPr id="1" name=""/>
+        <p:cNvGrpSpPr/>
+        <p:nvPr/>
+      </p:nvGrpSpPr>
+      <p:grpSpPr>
+        <a:xfrm>
+          <a:off x="0" y="0"/>
+          <a:ext cx="0" cy="0"/>
+          <a:chOff x="0" y="0"/>
+          <a:chExt cx="0" cy="0"/>
+        </a:xfrm>
+      </p:grpSpPr>
+      <p:sp>
+        <p:nvSpPr>
+          <p:cNvPr id="2" name="Slide Image Placeholder 1"/>
+          <p:cNvSpPr>
+            <a:spLocks noGrp="1" noRot="1" noChangeAspect="1"/>
+          </p:cNvSpPr>
+          <p:nvPr>
+            <p:ph type="sldImg"/>
+          </p:nvPr>
+        </p:nvSpPr>
+        <p:spPr/>
+      </p:sp>
+      <p:sp>
+        <p:nvSpPr>
+          <p:cNvPr id="3" name="Notes Placeholder 2"/>
+          <p:cNvSpPr>
+            <a:spLocks noGrp="1"/>
+          </p:cNvSpPr>
+          <p:nvPr>
+            <p:ph type="body" idx="1"/>
+          </p:nvPr>
+        </p:nvSpPr>
+        <p:spPr/>
+        <p:txBody>
+          <a:bodyPr/>
+          <a:lstStyle/>
+          <a:p>
+            <a:endParaRPr lang="de-DE"/>
+          </a:p>
+        </p:txBody>
+      </p:sp>
+      <p:sp>
+        <p:nvSpPr>
+          <p:cNvPr id="4" name="Slide Number Placeholder 3"/>
+          <p:cNvSpPr>
+            <a:spLocks noGrp="1"/>
+          </p:cNvSpPr>
+          <p:nvPr>
+            <p:ph type="sldNum" sz="quarter" idx="10"/>
+          </p:nvPr>
+        </p:nvSpPr>
+        <p:spPr/>
+        <p:txBody>
+          <a:bodyPr/>
+          <a:lstStyle/>
+          <a:p>
+            <a:fld id="{D6E72435-FA90-4640-AFCA-E6A02F5F1494}" type="slidenum">
+              <a:rPr lang="de-DE" smtClean="0"/>
+              <a:pPr/>
+              <a:t>9</a:t>
+            </a:fld>
+            <a:endParaRPr lang="de-DE"/>
+          </a:p>
+        </p:txBody>
+      </p:sp>
+    </p:spTree>
+    <p:extLst>
+      <p:ext uri="{BB962C8B-B14F-4D97-AF65-F5344CB8AC3E}">
+        <p14:creationId xmlns:p14="http://schemas.microsoft.com/office/powerpoint/2010/main" val="2571586537"/>
       </p:ext>
     </p:extLst>
   </p:cSld>
@@ -1486,7 +2846,7 @@
     </p:spTree>
     <p:extLst>
       <p:ext uri="{BB962C8B-B14F-4D97-AF65-F5344CB8AC3E}">
-        <p14:creationId xmlns="" xmlns:p14="http://schemas.microsoft.com/office/powerpoint/2010/main" val="3388351758"/>
+        <p14:creationId xmlns:p14="http://schemas.microsoft.com/office/powerpoint/2010/main" val="3388351758"/>
       </p:ext>
     </p:extLst>
   </p:cSld>
@@ -1821,7 +3181,7 @@
     </p:spTree>
     <p:extLst>
       <p:ext uri="{BB962C8B-B14F-4D97-AF65-F5344CB8AC3E}">
-        <p14:creationId xmlns="" xmlns:p14="http://schemas.microsoft.com/office/powerpoint/2010/main" val="1756338724"/>
+        <p14:creationId xmlns:p14="http://schemas.microsoft.com/office/powerpoint/2010/main" val="1756338724"/>
       </p:ext>
     </p:extLst>
   </p:cSld>
@@ -2156,7 +3516,7 @@
     </p:spTree>
     <p:extLst>
       <p:ext uri="{BB962C8B-B14F-4D97-AF65-F5344CB8AC3E}">
-        <p14:creationId xmlns="" xmlns:p14="http://schemas.microsoft.com/office/powerpoint/2010/main" val="720233445"/>
+        <p14:creationId xmlns:p14="http://schemas.microsoft.com/office/powerpoint/2010/main" val="720233445"/>
       </p:ext>
     </p:extLst>
   </p:cSld>
@@ -2488,7 +3848,7 @@
     </p:spTree>
     <p:extLst>
       <p:ext uri="{BB962C8B-B14F-4D97-AF65-F5344CB8AC3E}">
-        <p14:creationId xmlns="" xmlns:p14="http://schemas.microsoft.com/office/powerpoint/2010/main" val="1448331384"/>
+        <p14:creationId xmlns:p14="http://schemas.microsoft.com/office/powerpoint/2010/main" val="1448331384"/>
       </p:ext>
     </p:extLst>
   </p:cSld>
@@ -2639,7 +3999,7 @@
             <a:fld id="{421FAFA7-FD27-4797-86F0-797A053F7FF1}" type="datetimeFigureOut">
               <a:rPr lang="de-DE" smtClean="0"/>
               <a:pPr/>
-              <a:t>23.03.2016</a:t>
+              <a:t>25.03.2016</a:t>
             </a:fld>
             <a:endParaRPr lang="de-DE"/>
           </a:p>
@@ -3588,7 +4948,7 @@
           <p:nvPr/>
         </p:nvPicPr>
         <p:blipFill>
-          <a:blip r:embed="rId2" cstate="print"/>
+          <a:blip r:embed="rId3" cstate="print"/>
           <a:srcRect/>
           <a:stretch>
             <a:fillRect/>
@@ -3620,7 +4980,7 @@
           <p:nvPr/>
         </p:nvPicPr>
         <p:blipFill>
-          <a:blip r:embed="rId3" cstate="print"/>
+          <a:blip r:embed="rId4" cstate="print"/>
           <a:srcRect/>
           <a:stretch>
             <a:fillRect/>
@@ -3691,7 +5051,7 @@
     </p:spTree>
     <p:extLst>
       <p:ext uri="{BB962C8B-B14F-4D97-AF65-F5344CB8AC3E}">
-        <p14:creationId xmlns="" xmlns:p14="http://schemas.microsoft.com/office/powerpoint/2010/main" val="1464364472"/>
+        <p14:creationId xmlns:p14="http://schemas.microsoft.com/office/powerpoint/2010/main" val="1464364472"/>
       </p:ext>
     </p:extLst>
   </p:cSld>
@@ -3850,7 +5210,7 @@
     </p:spTree>
     <p:extLst>
       <p:ext uri="{BB962C8B-B14F-4D97-AF65-F5344CB8AC3E}">
-        <p14:creationId xmlns="" xmlns:p14="http://schemas.microsoft.com/office/powerpoint/2010/main" val="3690587624"/>
+        <p14:creationId xmlns:p14="http://schemas.microsoft.com/office/powerpoint/2010/main" val="3690587624"/>
       </p:ext>
     </p:extLst>
   </p:cSld>
@@ -4088,7 +5448,7 @@
     </p:spTree>
     <p:extLst>
       <p:ext uri="{BB962C8B-B14F-4D97-AF65-F5344CB8AC3E}">
-        <p14:creationId xmlns="" xmlns:p14="http://schemas.microsoft.com/office/powerpoint/2010/main" val="3397233553"/>
+        <p14:creationId xmlns:p14="http://schemas.microsoft.com/office/powerpoint/2010/main" val="3397233553"/>
       </p:ext>
     </p:extLst>
   </p:cSld>
@@ -4247,7 +5607,7 @@
     </p:spTree>
     <p:extLst>
       <p:ext uri="{BB962C8B-B14F-4D97-AF65-F5344CB8AC3E}">
-        <p14:creationId xmlns="" xmlns:p14="http://schemas.microsoft.com/office/powerpoint/2010/main" val="4265769765"/>
+        <p14:creationId xmlns:p14="http://schemas.microsoft.com/office/powerpoint/2010/main" val="4265769765"/>
       </p:ext>
     </p:extLst>
   </p:cSld>
@@ -4332,19 +5692,7 @@
           <a:p>
             <a:r>
               <a:rPr lang="de-DE" dirty="0" smtClean="0"/>
-              <a:t>Danach </a:t>
-            </a:r>
-            <a:r>
-              <a:rPr lang="de-DE" dirty="0" smtClean="0"/>
-              <a:t>kopiere das Schlagzeug (Buffer 4)  und Melodie in </a:t>
-            </a:r>
-            <a:r>
-              <a:rPr lang="de-DE" dirty="0" smtClean="0"/>
-              <a:t>Buffer 5 </a:t>
-            </a:r>
-            <a:r>
-              <a:rPr lang="de-DE" dirty="0" smtClean="0"/>
-              <a:t>zusammen</a:t>
+              <a:t>Danach kopiere das Schlagzeug (Buffer 4)  und Melodie in Buffer 5 zusammen</a:t>
             </a:r>
           </a:p>
         </p:txBody>
@@ -4371,11 +5719,7 @@
           <a:p>
             <a:r>
               <a:rPr lang="de-DE" dirty="0" smtClean="0"/>
-              <a:t>use_bpm</a:t>
-            </a:r>
-            <a:r>
-              <a:rPr lang="de-DE" dirty="0" smtClean="0"/>
-              <a:t>		use_synth :hollow		,amp: 5</a:t>
+              <a:t>use_bpm		use_synth :hollow		,amp: 5</a:t>
             </a:r>
           </a:p>
           <a:p>
@@ -4592,7 +5936,7 @@
     </p:spTree>
     <p:extLst>
       <p:ext uri="{BB962C8B-B14F-4D97-AF65-F5344CB8AC3E}">
-        <p14:creationId xmlns="" xmlns:p14="http://schemas.microsoft.com/office/powerpoint/2010/main" val="174545010"/>
+        <p14:creationId xmlns:p14="http://schemas.microsoft.com/office/powerpoint/2010/main" val="174545010"/>
       </p:ext>
     </p:extLst>
   </p:cSld>
@@ -4767,11 +6111,7 @@
             </a:pPr>
             <a:r>
               <a:rPr lang="de-DE" sz="2400" dirty="0" smtClean="0"/>
-              <a:t>Mehr </a:t>
-            </a:r>
-            <a:r>
-              <a:rPr lang="de-DE" sz="2400" dirty="0" smtClean="0"/>
-              <a:t>Melodie</a:t>
+              <a:t>Mehr Melodie</a:t>
             </a:r>
           </a:p>
           <a:p>
@@ -4783,7 +6123,6 @@
               <a:rPr lang="de-DE" sz="2400" dirty="0" smtClean="0"/>
               <a:t>Effekte</a:t>
             </a:r>
-            <a:endParaRPr lang="de-DE" sz="2400" dirty="0" smtClean="0"/>
           </a:p>
           <a:p>
             <a:pPr marL="114275" indent="-457200" algn="l">
@@ -4918,7 +6257,7 @@
     </p:spTree>
     <p:extLst>
       <p:ext uri="{BB962C8B-B14F-4D97-AF65-F5344CB8AC3E}">
-        <p14:creationId xmlns="" xmlns:p14="http://schemas.microsoft.com/office/powerpoint/2010/main" val="1805105135"/>
+        <p14:creationId xmlns:p14="http://schemas.microsoft.com/office/powerpoint/2010/main" val="1805105135"/>
       </p:ext>
     </p:extLst>
   </p:cSld>
@@ -5005,11 +6344,7 @@
             </a:r>
             <a:r>
               <a:rPr lang="de-DE" dirty="0"/>
-              <a:t>steht für „Effects“ = Effekte. </a:t>
-            </a:r>
-            <a:r>
-              <a:rPr lang="de-DE" dirty="0"/>
-              <a:t>Jeder Effekt kann auch „Parameter“ haben: Hier die Größe des Raums für den Hall</a:t>
+              <a:t>steht für „Effects“ = Effekte. Jeder Effekt kann auch „Parameter“ haben: Hier die Größe des Raums für den Hall</a:t>
             </a:r>
           </a:p>
           <a:p>
@@ -5189,7 +6524,7 @@
     </p:spTree>
     <p:extLst>
       <p:ext uri="{BB962C8B-B14F-4D97-AF65-F5344CB8AC3E}">
-        <p14:creationId xmlns:p14="http://schemas.microsoft.com/office/powerpoint/2010/main" xmlns="" val="174545010"/>
+        <p14:creationId xmlns:p14="http://schemas.microsoft.com/office/powerpoint/2010/main" val="174545010"/>
       </p:ext>
     </p:extLst>
   </p:cSld>
@@ -6133,7 +7468,7 @@
     </p:spTree>
     <p:extLst>
       <p:ext uri="{BB962C8B-B14F-4D97-AF65-F5344CB8AC3E}">
-        <p14:creationId xmlns="" xmlns:p14="http://schemas.microsoft.com/office/powerpoint/2010/main" val="2498599068"/>
+        <p14:creationId xmlns:p14="http://schemas.microsoft.com/office/powerpoint/2010/main" val="2498599068"/>
       </p:ext>
     </p:extLst>
   </p:cSld>
@@ -7035,7 +8370,7 @@
     </p:spTree>
     <p:extLst>
       <p:ext uri="{BB962C8B-B14F-4D97-AF65-F5344CB8AC3E}">
-        <p14:creationId xmlns="" xmlns:p14="http://schemas.microsoft.com/office/powerpoint/2010/main" val="33299266"/>
+        <p14:creationId xmlns:p14="http://schemas.microsoft.com/office/powerpoint/2010/main" val="33299266"/>
       </p:ext>
     </p:extLst>
   </p:cSld>
@@ -9009,7 +10344,7 @@
     </p:spTree>
     <p:extLst>
       <p:ext uri="{BB962C8B-B14F-4D97-AF65-F5344CB8AC3E}">
-        <p14:creationId xmlns="" xmlns:p14="http://schemas.microsoft.com/office/powerpoint/2010/main" val="2498599068"/>
+        <p14:creationId xmlns:p14="http://schemas.microsoft.com/office/powerpoint/2010/main" val="2498599068"/>
       </p:ext>
     </p:extLst>
   </p:cSld>
@@ -9379,7 +10714,7 @@
     </p:spTree>
     <p:extLst>
       <p:ext uri="{BB962C8B-B14F-4D97-AF65-F5344CB8AC3E}">
-        <p14:creationId xmlns="" xmlns:p14="http://schemas.microsoft.com/office/powerpoint/2010/main" val="1490740007"/>
+        <p14:creationId xmlns:p14="http://schemas.microsoft.com/office/powerpoint/2010/main" val="1490740007"/>
       </p:ext>
     </p:extLst>
   </p:cSld>
@@ -9481,7 +10816,15 @@
           <a:p>
             <a:r>
               <a:rPr lang="de-DE" dirty="0" smtClean="0"/>
-              <a:t>	:a4	:h4	 :major7	:minor</a:t>
+              <a:t>	:a4	</a:t>
+            </a:r>
+            <a:r>
+              <a:rPr lang="de-DE" dirty="0" smtClean="0"/>
+              <a:t>:b4</a:t>
+            </a:r>
+            <a:r>
+              <a:rPr lang="de-DE" dirty="0" smtClean="0"/>
+              <a:t>	 :major7	:minor</a:t>
             </a:r>
           </a:p>
           <a:p>
@@ -9734,7 +11077,7 @@
     </p:spTree>
     <p:extLst>
       <p:ext uri="{BB962C8B-B14F-4D97-AF65-F5344CB8AC3E}">
-        <p14:creationId xmlns="" xmlns:p14="http://schemas.microsoft.com/office/powerpoint/2010/main" val="1053451598"/>
+        <p14:creationId xmlns:p14="http://schemas.microsoft.com/office/powerpoint/2010/main" val="1053451598"/>
       </p:ext>
     </p:extLst>
   </p:cSld>
@@ -9785,15 +11128,7 @@
           <a:p>
             <a:r>
               <a:rPr lang="de-DE" dirty="0" smtClean="0"/>
-              <a:t>Spiele </a:t>
-            </a:r>
-            <a:r>
-              <a:rPr lang="de-DE" dirty="0" smtClean="0"/>
-              <a:t>ein </a:t>
-            </a:r>
-            <a:r>
-              <a:rPr lang="de-DE" dirty="0" smtClean="0"/>
-              <a:t>Muster (=Pattern) </a:t>
+              <a:t>Spiele ein Muster (=Pattern) </a:t>
             </a:r>
             <a:r>
               <a:rPr lang="de-DE" dirty="0"/>
@@ -10174,11 +11509,7 @@
           <a:p>
             <a:r>
               <a:rPr lang="de-DE" dirty="0" smtClean="0"/>
-              <a:t>Wir nennen das </a:t>
-            </a:r>
-            <a:r>
-              <a:rPr lang="de-DE" dirty="0" smtClean="0"/>
-              <a:t>Endlosschleife, die man während des Spielens aktualisieren kann.</a:t>
+              <a:t>Wir nennen das Endlosschleife, die man während des Spielens aktualisieren kann.</a:t>
             </a:r>
             <a:endParaRPr lang="de-DE" dirty="0"/>
           </a:p>
@@ -10378,7 +11709,7 @@
     </p:spTree>
     <p:extLst>
       <p:ext uri="{BB962C8B-B14F-4D97-AF65-F5344CB8AC3E}">
-        <p14:creationId xmlns="" xmlns:p14="http://schemas.microsoft.com/office/powerpoint/2010/main" val="2129833566"/>
+        <p14:creationId xmlns:p14="http://schemas.microsoft.com/office/powerpoint/2010/main" val="2129833566"/>
       </p:ext>
     </p:extLst>
   </p:cSld>
@@ -10624,7 +11955,7 @@
     </p:spTree>
     <p:extLst>
       <p:ext uri="{BB962C8B-B14F-4D97-AF65-F5344CB8AC3E}">
-        <p14:creationId xmlns="" xmlns:p14="http://schemas.microsoft.com/office/powerpoint/2010/main" val="2037777663"/>
+        <p14:creationId xmlns:p14="http://schemas.microsoft.com/office/powerpoint/2010/main" val="2037777663"/>
       </p:ext>
     </p:extLst>
   </p:cSld>
@@ -10716,11 +12047,7 @@
             </a:r>
             <a:r>
               <a:rPr lang="de-DE" b="0" dirty="0" smtClean="0"/>
-              <a:t> </a:t>
-            </a:r>
-            <a:r>
-              <a:rPr lang="de-DE" b="0" dirty="0" smtClean="0"/>
-              <a:t>spielt </a:t>
+              <a:t> spielt </a:t>
             </a:r>
             <a:r>
               <a:rPr lang="de-DE" dirty="0" smtClean="0"/>
@@ -10752,11 +12079,7 @@
             </a:r>
             <a:r>
               <a:rPr lang="de-DE" b="0" dirty="0" smtClean="0"/>
-              <a:t> </a:t>
-            </a:r>
-            <a:r>
-              <a:rPr lang="de-DE" b="0" dirty="0" smtClean="0"/>
-              <a:t>ein Muster, also viele )</a:t>
+              <a:t> ein Muster, also viele )</a:t>
             </a:r>
           </a:p>
           <a:p>
@@ -10770,11 +12093,7 @@
             </a:r>
             <a:r>
               <a:rPr lang="de-DE" b="0" dirty="0" smtClean="0"/>
-              <a:t> </a:t>
-            </a:r>
-            <a:r>
-              <a:rPr lang="de-DE" b="0" dirty="0" smtClean="0"/>
-              <a:t>wählt einen beliebigen Ton</a:t>
+              <a:t> wählt einen beliebigen Ton</a:t>
             </a:r>
             <a:endParaRPr lang="de-DE" b="0" dirty="0"/>
           </a:p>
@@ -11085,7 +12404,7 @@
     </p:spTree>
     <p:extLst>
       <p:ext uri="{BB962C8B-B14F-4D97-AF65-F5344CB8AC3E}">
-        <p14:creationId xmlns="" xmlns:p14="http://schemas.microsoft.com/office/powerpoint/2010/main" val="2037777663"/>
+        <p14:creationId xmlns:p14="http://schemas.microsoft.com/office/powerpoint/2010/main" val="2037777663"/>
       </p:ext>
     </p:extLst>
   </p:cSld>
@@ -11640,7 +12959,7 @@
   <a:extraClrSchemeLst/>
   <a:extLst>
     <a:ext uri="{05A4C25C-085E-4340-85A3-A5531E510DB2}">
-      <thm15:themeFamily xmlns="" xmlns:thm15="http://schemas.microsoft.com/office/thememl/2012/main" name="Office Theme" id="{62F939B6-93AF-4DB8-9C6B-D6C7DFDC589F}" vid="{4A3C46E8-61CC-4603-A589-7422A47A8E4A}"/>
+      <thm15:themeFamily xmlns:thm15="http://schemas.microsoft.com/office/thememl/2012/main" name="Office Theme" id="{62F939B6-93AF-4DB8-9C6B-D6C7DFDC589F}" vid="{4A3C46E8-61CC-4603-A589-7422A47A8E4A}"/>
     </a:ext>
   </a:extLst>
 </a:theme>
@@ -11901,7 +13220,7 @@
   <a:extraClrSchemeLst/>
   <a:extLst>
     <a:ext uri="{05A4C25C-085E-4340-85A3-A5531E510DB2}">
-      <thm15:themeFamily xmlns="" xmlns:thm15="http://schemas.microsoft.com/office/thememl/2012/main" name="Office Theme" id="{62F939B6-93AF-4DB8-9C6B-D6C7DFDC589F}" vid="{4A3C46E8-61CC-4603-A589-7422A47A8E4A}"/>
+      <thm15:themeFamily xmlns:thm15="http://schemas.microsoft.com/office/thememl/2012/main" name="Office Theme" id="{62F939B6-93AF-4DB8-9C6B-D6C7DFDC589F}" vid="{4A3C46E8-61CC-4603-A589-7422A47A8E4A}"/>
     </a:ext>
   </a:extLst>
 </a:theme>

</xml_diff>

<commit_message>
Adapted everything to Sonic 2.10: Modified custom sample usage via sample filters. Relate documentation new synths and new samples. Amended all examples. Added new LOAD Button to GUI.
</commit_message>
<xml_diff>
--- a/documentation/Sonic PI Workshop.pptx
+++ b/documentation/Sonic PI Workshop.pptx
@@ -232,7 +232,7 @@
             <a:fld id="{7FD773D1-FC60-4896-8BCC-9B28FBDAB5FD}" type="datetimeFigureOut">
               <a:rPr lang="de-DE" smtClean="0"/>
               <a:pPr/>
-              <a:t>25.03.2016</a:t>
+              <a:t>17.04.2016</a:t>
             </a:fld>
             <a:endParaRPr lang="de-DE"/>
           </a:p>
@@ -399,7 +399,7 @@
             <a:fld id="{72145D81-8E55-40FC-9585-CFDCFEF92FEB}" type="datetimeFigureOut">
               <a:rPr lang="de-DE" smtClean="0"/>
               <a:pPr/>
-              <a:t>25.03.2016</a:t>
+              <a:t>17.04.2016</a:t>
             </a:fld>
             <a:endParaRPr lang="de-DE"/>
           </a:p>
@@ -3999,7 +3999,7 @@
             <a:fld id="{421FAFA7-FD27-4797-86F0-797A053F7FF1}" type="datetimeFigureOut">
               <a:rPr lang="de-DE" smtClean="0"/>
               <a:pPr/>
-              <a:t>25.03.2016</a:t>
+              <a:t>17.04.2016</a:t>
             </a:fld>
             <a:endParaRPr lang="de-DE"/>
           </a:p>
@@ -6080,8 +6080,8 @@
         </p:nvSpPr>
         <p:spPr>
           <a:xfrm>
-            <a:off x="404664" y="178407"/>
-            <a:ext cx="6048672" cy="2234458"/>
+            <a:off x="404664" y="238160"/>
+            <a:ext cx="6048672" cy="2677656"/>
           </a:xfrm>
         </p:spPr>
         <p:txBody>
@@ -6133,6 +6133,37 @@
               <a:rPr lang="de-DE" sz="2400" dirty="0" smtClean="0"/>
               <a:t>Variablen</a:t>
             </a:r>
+          </a:p>
+          <a:p>
+            <a:pPr marL="114275" indent="-457200" algn="l">
+              <a:buFontTx/>
+              <a:buChar char="-"/>
+            </a:pPr>
+            <a:r>
+              <a:rPr lang="de-DE" sz="2400" dirty="0" smtClean="0"/>
+              <a:t>Samples „</a:t>
+            </a:r>
+            <a:r>
+              <a:rPr lang="de-DE" sz="2400" dirty="0" err="1" smtClean="0"/>
+              <a:t>loop</a:t>
+            </a:r>
+            <a:r>
+              <a:rPr lang="de-DE" sz="2400" smtClean="0"/>
+              <a:t>_“ </a:t>
+            </a:r>
+            <a:r>
+              <a:rPr lang="de-DE" sz="2400" dirty="0" smtClean="0"/>
+              <a:t>mit </a:t>
+            </a:r>
+            <a:r>
+              <a:rPr lang="de-DE" sz="2400" dirty="0" err="1" smtClean="0"/>
+              <a:t>sample_duration</a:t>
+            </a:r>
+            <a:r>
+              <a:rPr lang="de-DE" sz="2400" dirty="0" smtClean="0"/>
+              <a:t>()</a:t>
+            </a:r>
+            <a:endParaRPr lang="de-DE" sz="2400" dirty="0" smtClean="0"/>
           </a:p>
         </p:txBody>
       </p:sp>
@@ -7811,30 +7842,6 @@
           </a:p>
         </p:txBody>
       </p:sp>
-      <p:pic>
-        <p:nvPicPr>
-          <p:cNvPr id="2" name="Picture 1"/>
-          <p:cNvPicPr>
-            <a:picLocks noChangeAspect="1"/>
-          </p:cNvPicPr>
-          <p:nvPr/>
-        </p:nvPicPr>
-        <p:blipFill>
-          <a:blip r:embed="rId3" cstate="print"/>
-          <a:stretch>
-            <a:fillRect/>
-          </a:stretch>
-        </p:blipFill>
-        <p:spPr>
-          <a:xfrm>
-            <a:off x="332657" y="3064689"/>
-            <a:ext cx="3886200" cy="495300"/>
-          </a:xfrm>
-          <a:prstGeom prst="rect">
-            <a:avLst/>
-          </a:prstGeom>
-        </p:spPr>
-      </p:pic>
       <p:sp>
         <p:nvSpPr>
           <p:cNvPr id="19" name="TextBox 18"/>
@@ -7844,7 +7851,7 @@
         <p:spPr>
           <a:xfrm>
             <a:off x="332657" y="3682100"/>
-            <a:ext cx="3886200" cy="276999"/>
+            <a:ext cx="2831932" cy="276999"/>
           </a:xfrm>
           <a:prstGeom prst="rect">
             <a:avLst/>
@@ -7939,7 +7946,7 @@
           <a:p>
             <a:r>
               <a:rPr lang="de-DE" sz="1200" dirty="0" smtClean="0"/>
-              <a:t>Starten	Stoppen	    Speichern	   Aufnehmen</a:t>
+              <a:t>Starten	Stoppen	  Aufnehmen</a:t>
             </a:r>
             <a:endParaRPr lang="de-DE" sz="1200" dirty="0"/>
           </a:p>
@@ -7954,7 +7961,7 @@
           <p:nvPr/>
         </p:nvPicPr>
         <p:blipFill>
-          <a:blip r:embed="rId4" cstate="print"/>
+          <a:blip r:embed="rId3" cstate="print"/>
           <a:stretch>
             <a:fillRect/>
           </a:stretch>
@@ -8096,7 +8103,7 @@
           <p:nvPr/>
         </p:nvPicPr>
         <p:blipFill>
-          <a:blip r:embed="rId5" cstate="print"/>
+          <a:blip r:embed="rId4" cstate="print"/>
           <a:stretch>
             <a:fillRect/>
           </a:stretch>
@@ -8367,176 +8374,64 @@
           </a:fontRef>
         </p:style>
       </p:cxnSp>
-    </p:spTree>
-    <p:extLst>
-      <p:ext uri="{BB962C8B-B14F-4D97-AF65-F5344CB8AC3E}">
-        <p14:creationId xmlns:p14="http://schemas.microsoft.com/office/powerpoint/2010/main" val="33299266"/>
-      </p:ext>
-    </p:extLst>
-  </p:cSld>
-  <p:clrMapOvr>
-    <a:masterClrMapping/>
-  </p:clrMapOvr>
-  <p:timing>
-    <p:tnLst>
-      <p:par>
-        <p:cTn id="1" dur="indefinite" restart="never" nodeType="tmRoot"/>
-      </p:par>
-    </p:tnLst>
-  </p:timing>
-</p:sld>
-</file>
-
-<file path=ppt/slides/slide18.xml><?xml version="1.0" encoding="utf-8"?>
-<p:sld xmlns:a="http://schemas.openxmlformats.org/drawingml/2006/main" xmlns:r="http://schemas.openxmlformats.org/officeDocument/2006/relationships" xmlns:p="http://schemas.openxmlformats.org/presentationml/2006/main">
-  <p:cSld>
-    <p:spTree>
-      <p:nvGrpSpPr>
-        <p:cNvPr id="1" name=""/>
-        <p:cNvGrpSpPr/>
-        <p:nvPr/>
-      </p:nvGrpSpPr>
-      <p:grpSpPr>
-        <a:xfrm>
-          <a:off x="0" y="0"/>
-          <a:ext cx="0" cy="0"/>
-          <a:chOff x="0" y="0"/>
-          <a:chExt cx="0" cy="0"/>
-        </a:xfrm>
-      </p:grpSpPr>
-      <p:sp>
-        <p:nvSpPr>
-          <p:cNvPr id="8" name="Rectangle 7"/>
-          <p:cNvSpPr/>
+      <p:pic>
+        <p:nvPicPr>
+          <p:cNvPr id="10" name="Picture 9"/>
+          <p:cNvPicPr>
+            <a:picLocks noChangeAspect="1"/>
+          </p:cNvPicPr>
           <p:nvPr/>
-        </p:nvSpPr>
+        </p:nvPicPr>
+        <p:blipFill>
+          <a:blip r:embed="rId5"/>
+          <a:stretch>
+            <a:fillRect/>
+          </a:stretch>
+        </p:blipFill>
         <p:spPr>
           <a:xfrm>
-            <a:off x="36005" y="1003501"/>
-            <a:ext cx="6858000" cy="8532440"/>
+            <a:off x="307089" y="3133868"/>
+            <a:ext cx="2857500" cy="428625"/>
           </a:xfrm>
           <a:prstGeom prst="rect">
             <a:avLst/>
           </a:prstGeom>
-          <a:solidFill>
-            <a:schemeClr val="bg1"/>
-          </a:solidFill>
-          <a:ln>
-            <a:solidFill>
-              <a:schemeClr val="bg1"/>
-            </a:solidFill>
-          </a:ln>
-        </p:spPr>
-        <p:style>
-          <a:lnRef idx="2">
-            <a:schemeClr val="accent1">
-              <a:shade val="50000"/>
-            </a:schemeClr>
-          </a:lnRef>
-          <a:fillRef idx="1">
-            <a:schemeClr val="accent1"/>
-          </a:fillRef>
-          <a:effectRef idx="0">
-            <a:schemeClr val="accent1"/>
-          </a:effectRef>
-          <a:fontRef idx="minor">
-            <a:schemeClr val="lt1"/>
-          </a:fontRef>
-        </p:style>
-        <p:txBody>
-          <a:bodyPr rtlCol="0" anchor="ctr"/>
-          <a:lstStyle/>
-          <a:p>
-            <a:endParaRPr lang="en-US" dirty="0" smtClean="0">
-              <a:solidFill>
-                <a:schemeClr val="tx1"/>
-              </a:solidFill>
-            </a:endParaRPr>
-          </a:p>
-        </p:txBody>
-      </p:sp>
-      <p:sp>
-        <p:nvSpPr>
-          <p:cNvPr id="9" name="TextBox 8"/>
-          <p:cNvSpPr txBox="1"/>
+        </p:spPr>
+      </p:pic>
+      <p:pic>
+        <p:nvPicPr>
+          <p:cNvPr id="12" name="Picture 11"/>
+          <p:cNvPicPr>
+            <a:picLocks noChangeAspect="1"/>
+          </p:cNvPicPr>
           <p:nvPr/>
-        </p:nvSpPr>
+        </p:nvPicPr>
+        <p:blipFill>
+          <a:blip r:embed="rId6"/>
+          <a:stretch>
+            <a:fillRect/>
+          </a:stretch>
+        </p:blipFill>
         <p:spPr>
           <a:xfrm>
-            <a:off x="2448218" y="179512"/>
-            <a:ext cx="1961563" cy="584775"/>
+            <a:off x="3534172" y="3143392"/>
+            <a:ext cx="1895475" cy="409575"/>
           </a:xfrm>
           <a:prstGeom prst="rect">
             <a:avLst/>
           </a:prstGeom>
-          <a:noFill/>
-        </p:spPr>
-        <p:txBody>
-          <a:bodyPr wrap="none" rtlCol="0">
-            <a:spAutoFit/>
-          </a:bodyPr>
-          <a:lstStyle/>
-          <a:p>
-            <a:r>
-              <a:rPr lang="de-DE" sz="3200" dirty="0" smtClean="0">
-                <a:solidFill>
-                  <a:schemeClr val="accent6"/>
-                </a:solidFill>
-              </a:rPr>
-              <a:t>Spickzettel</a:t>
-            </a:r>
-            <a:endParaRPr lang="de-DE" sz="3200" dirty="0">
-              <a:solidFill>
-                <a:schemeClr val="accent6"/>
-              </a:solidFill>
-            </a:endParaRPr>
-          </a:p>
-        </p:txBody>
-      </p:sp>
-      <p:sp>
-        <p:nvSpPr>
-          <p:cNvPr id="17" name="TextBox 16"/>
+        </p:spPr>
+      </p:pic>
+      <p:sp>
+        <p:nvSpPr>
+          <p:cNvPr id="23" name="TextBox 22"/>
           <p:cNvSpPr txBox="1"/>
           <p:nvPr/>
         </p:nvSpPr>
         <p:spPr>
           <a:xfrm>
-            <a:off x="332657" y="803512"/>
-            <a:ext cx="1197892" cy="369332"/>
-          </a:xfrm>
-          <a:prstGeom prst="rect">
-            <a:avLst/>
-          </a:prstGeom>
-          <a:noFill/>
-        </p:spPr>
-        <p:txBody>
-          <a:bodyPr wrap="square" rtlCol="0">
-            <a:spAutoFit/>
-          </a:bodyPr>
-          <a:lstStyle/>
-          <a:p>
-            <a:r>
-              <a:rPr lang="de-DE" b="1" dirty="0" err="1" smtClean="0"/>
-              <a:t>use_synth</a:t>
-            </a:r>
-            <a:r>
-              <a:rPr lang="de-DE" b="1" dirty="0"/>
-              <a:t> </a:t>
-            </a:r>
-            <a:endParaRPr lang="de-DE" b="1" dirty="0" smtClean="0"/>
-          </a:p>
-        </p:txBody>
-      </p:sp>
-      <p:sp>
-        <p:nvSpPr>
-          <p:cNvPr id="5" name="TextBox 4"/>
-          <p:cNvSpPr txBox="1"/>
-          <p:nvPr/>
-        </p:nvSpPr>
-        <p:spPr>
-          <a:xfrm>
-            <a:off x="332657" y="1242789"/>
-            <a:ext cx="6264696" cy="1384995"/>
+            <a:off x="3555094" y="3689777"/>
+            <a:ext cx="1874553" cy="276999"/>
           </a:xfrm>
           <a:prstGeom prst="rect">
             <a:avLst/>
@@ -8630,245 +8525,111 @@
           </a:lstStyle>
           <a:p>
             <a:r>
-              <a:rPr lang="de-DE" sz="1200" dirty="0" err="1"/>
-              <a:t>beep</a:t>
-            </a:r>
-            <a:r>
-              <a:rPr lang="de-DE" sz="1200" dirty="0"/>
-              <a:t>	blade	</a:t>
-            </a:r>
-            <a:r>
-              <a:rPr lang="de-DE" sz="1200" dirty="0" err="1"/>
-              <a:t>bnoise</a:t>
-            </a:r>
-            <a:r>
-              <a:rPr lang="de-DE" sz="1200" dirty="0"/>
-              <a:t>	</a:t>
-            </a:r>
-            <a:r>
-              <a:rPr lang="de-DE" sz="1200" dirty="0" err="1"/>
-              <a:t>cnoise</a:t>
-            </a:r>
-            <a:r>
-              <a:rPr lang="de-DE" sz="1200" dirty="0"/>
-              <a:t>	</a:t>
-            </a:r>
-            <a:r>
-              <a:rPr lang="de-DE" sz="1200" dirty="0" err="1"/>
-              <a:t>dark_ambience</a:t>
-            </a:r>
-            <a:r>
-              <a:rPr lang="de-DE" sz="1200" dirty="0"/>
-              <a:t> </a:t>
-            </a:r>
-          </a:p>
-          <a:p>
-            <a:r>
-              <a:rPr lang="de-DE" sz="1200" dirty="0" err="1"/>
-              <a:t>dpulse</a:t>
-            </a:r>
-            <a:r>
-              <a:rPr lang="de-DE" sz="1200" dirty="0"/>
-              <a:t>	</a:t>
-            </a:r>
-            <a:r>
-              <a:rPr lang="de-DE" sz="1200" dirty="0" err="1"/>
-              <a:t>dsaw</a:t>
-            </a:r>
-            <a:r>
-              <a:rPr lang="de-DE" sz="1200" dirty="0"/>
-              <a:t>	</a:t>
-            </a:r>
-            <a:r>
-              <a:rPr lang="de-DE" sz="1200" dirty="0" err="1"/>
-              <a:t>dull_bell</a:t>
-            </a:r>
-            <a:r>
-              <a:rPr lang="de-DE" sz="1200" dirty="0"/>
-              <a:t>	</a:t>
-            </a:r>
-            <a:r>
-              <a:rPr lang="de-DE" sz="1200" dirty="0" err="1"/>
-              <a:t>fm</a:t>
-            </a:r>
-            <a:r>
-              <a:rPr lang="de-DE" sz="1200" dirty="0"/>
-              <a:t>	</a:t>
-            </a:r>
-            <a:r>
-              <a:rPr lang="de-DE" sz="1200" dirty="0" err="1"/>
-              <a:t>gnoise</a:t>
-            </a:r>
-            <a:r>
-              <a:rPr lang="de-DE" sz="1200" dirty="0"/>
-              <a:t>	</a:t>
-            </a:r>
-            <a:r>
-              <a:rPr lang="de-DE" sz="1200" dirty="0" err="1"/>
-              <a:t>growl</a:t>
+              <a:rPr lang="de-DE" sz="1200" dirty="0" smtClean="0"/>
+              <a:t>  Speichern	Laden</a:t>
             </a:r>
             <a:endParaRPr lang="de-DE" sz="1200" dirty="0"/>
           </a:p>
-          <a:p>
-            <a:r>
-              <a:rPr lang="de-DE" sz="1200" dirty="0" err="1"/>
-              <a:t>hollow</a:t>
-            </a:r>
-            <a:r>
-              <a:rPr lang="de-DE" sz="1200" dirty="0"/>
-              <a:t>	</a:t>
-            </a:r>
-            <a:r>
-              <a:rPr lang="de-DE" sz="1200" dirty="0" err="1"/>
-              <a:t>hoover</a:t>
-            </a:r>
-            <a:r>
-              <a:rPr lang="de-DE" sz="1200" dirty="0"/>
-              <a:t>	</a:t>
-            </a:r>
-          </a:p>
-          <a:p>
-            <a:r>
-              <a:rPr lang="de-DE" sz="1200" dirty="0" err="1"/>
-              <a:t>mod_beep</a:t>
-            </a:r>
-            <a:r>
-              <a:rPr lang="de-DE" sz="1200" dirty="0"/>
-              <a:t>	</a:t>
-            </a:r>
-            <a:r>
-              <a:rPr lang="de-DE" sz="1200" dirty="0" err="1"/>
-              <a:t>mod_dsaw</a:t>
-            </a:r>
-            <a:r>
-              <a:rPr lang="de-DE" sz="1200" dirty="0"/>
-              <a:t>	</a:t>
-            </a:r>
-            <a:r>
-              <a:rPr lang="de-DE" sz="1200" dirty="0" err="1"/>
-              <a:t>mod_fm</a:t>
-            </a:r>
-            <a:r>
-              <a:rPr lang="de-DE" sz="1200" dirty="0"/>
-              <a:t>	</a:t>
-            </a:r>
-          </a:p>
-          <a:p>
-            <a:r>
-              <a:rPr lang="de-DE" sz="1200" dirty="0" err="1"/>
-              <a:t>mod_pulse</a:t>
-            </a:r>
-            <a:r>
-              <a:rPr lang="de-DE" sz="1200" dirty="0"/>
-              <a:t>	</a:t>
-            </a:r>
-            <a:r>
-              <a:rPr lang="de-DE" sz="1200" dirty="0" err="1"/>
-              <a:t>mod_saw</a:t>
-            </a:r>
-            <a:r>
-              <a:rPr lang="de-DE" sz="1200" dirty="0"/>
-              <a:t>		</a:t>
-            </a:r>
-            <a:r>
-              <a:rPr lang="de-DE" sz="1200" dirty="0" err="1"/>
-              <a:t>mod_sine</a:t>
-            </a:r>
-            <a:r>
-              <a:rPr lang="de-DE" sz="1200" dirty="0"/>
-              <a:t>	</a:t>
-            </a:r>
-            <a:r>
-              <a:rPr lang="de-DE" sz="1200" dirty="0" err="1"/>
-              <a:t>mod_tri</a:t>
-            </a:r>
-            <a:endParaRPr lang="de-DE" sz="1200" dirty="0"/>
-          </a:p>
-          <a:p>
-            <a:r>
-              <a:rPr lang="de-DE" sz="1200" dirty="0" err="1"/>
-              <a:t>noise</a:t>
-            </a:r>
-            <a:r>
-              <a:rPr lang="de-DE" sz="1200" dirty="0"/>
-              <a:t>	piano	</a:t>
-            </a:r>
-            <a:r>
-              <a:rPr lang="de-DE" sz="1200" dirty="0" err="1"/>
-              <a:t>pnoise</a:t>
-            </a:r>
-            <a:r>
-              <a:rPr lang="de-DE" sz="1200" dirty="0"/>
-              <a:t>	</a:t>
-            </a:r>
-            <a:r>
-              <a:rPr lang="de-DE" sz="1200" dirty="0" err="1"/>
-              <a:t>pretty_bell</a:t>
-            </a:r>
-            <a:r>
-              <a:rPr lang="de-DE" sz="1200" dirty="0"/>
-              <a:t>	</a:t>
-            </a:r>
-            <a:r>
-              <a:rPr lang="de-DE" sz="1200" dirty="0" err="1"/>
-              <a:t>prophet</a:t>
-            </a:r>
-            <a:r>
-              <a:rPr lang="de-DE" sz="1200" dirty="0"/>
-              <a:t>	pulse</a:t>
-            </a:r>
-          </a:p>
-          <a:p>
-            <a:r>
-              <a:rPr lang="de-DE" sz="1200" dirty="0" err="1"/>
-              <a:t>saw</a:t>
-            </a:r>
-            <a:r>
-              <a:rPr lang="de-DE" sz="1200" dirty="0"/>
-              <a:t>	sine	</a:t>
-            </a:r>
-            <a:r>
-              <a:rPr lang="de-DE" sz="1200" dirty="0" err="1"/>
-              <a:t>square</a:t>
-            </a:r>
-            <a:r>
-              <a:rPr lang="de-DE" sz="1200" dirty="0"/>
-              <a:t>	</a:t>
-            </a:r>
-            <a:r>
-              <a:rPr lang="de-DE" sz="1200" dirty="0" err="1"/>
-              <a:t>subpulse</a:t>
-            </a:r>
-            <a:r>
-              <a:rPr lang="de-DE" sz="1200" dirty="0"/>
-              <a:t>	tb303	</a:t>
-            </a:r>
-            <a:r>
-              <a:rPr lang="de-DE" sz="1200" dirty="0" err="1"/>
-              <a:t>tri</a:t>
-            </a:r>
-            <a:r>
-              <a:rPr lang="de-DE" sz="1200" dirty="0"/>
-              <a:t>	</a:t>
-            </a:r>
-            <a:r>
-              <a:rPr lang="de-DE" sz="1200" dirty="0" err="1" smtClean="0"/>
-              <a:t>zawa</a:t>
-            </a:r>
-            <a:endParaRPr lang="de-DE" sz="1200" dirty="0"/>
-          </a:p>
-        </p:txBody>
-      </p:sp>
-      <p:sp>
-        <p:nvSpPr>
-          <p:cNvPr id="6" name="TextBox 5"/>
+        </p:txBody>
+      </p:sp>
+    </p:spTree>
+    <p:extLst>
+      <p:ext uri="{BB962C8B-B14F-4D97-AF65-F5344CB8AC3E}">
+        <p14:creationId xmlns:p14="http://schemas.microsoft.com/office/powerpoint/2010/main" val="33299266"/>
+      </p:ext>
+    </p:extLst>
+  </p:cSld>
+  <p:clrMapOvr>
+    <a:masterClrMapping/>
+  </p:clrMapOvr>
+  <p:timing>
+    <p:tnLst>
+      <p:par>
+        <p:cTn id="1" dur="indefinite" restart="never" nodeType="tmRoot"/>
+      </p:par>
+    </p:tnLst>
+  </p:timing>
+</p:sld>
+</file>
+
+<file path=ppt/slides/slide18.xml><?xml version="1.0" encoding="utf-8"?>
+<p:sld xmlns:a="http://schemas.openxmlformats.org/drawingml/2006/main" xmlns:r="http://schemas.openxmlformats.org/officeDocument/2006/relationships" xmlns:p="http://schemas.openxmlformats.org/presentationml/2006/main">
+  <p:cSld>
+    <p:spTree>
+      <p:nvGrpSpPr>
+        <p:cNvPr id="1" name=""/>
+        <p:cNvGrpSpPr/>
+        <p:nvPr/>
+      </p:nvGrpSpPr>
+      <p:grpSpPr>
+        <a:xfrm>
+          <a:off x="0" y="0"/>
+          <a:ext cx="0" cy="0"/>
+          <a:chOff x="0" y="0"/>
+          <a:chExt cx="0" cy="0"/>
+        </a:xfrm>
+      </p:grpSpPr>
+      <p:sp>
+        <p:nvSpPr>
+          <p:cNvPr id="8" name="Rectangle 7"/>
+          <p:cNvSpPr/>
+          <p:nvPr/>
+        </p:nvSpPr>
+        <p:spPr>
+          <a:xfrm>
+            <a:off x="36005" y="1003501"/>
+            <a:ext cx="6858000" cy="8532440"/>
+          </a:xfrm>
+          <a:prstGeom prst="rect">
+            <a:avLst/>
+          </a:prstGeom>
+          <a:solidFill>
+            <a:schemeClr val="bg1"/>
+          </a:solidFill>
+          <a:ln>
+            <a:solidFill>
+              <a:schemeClr val="bg1"/>
+            </a:solidFill>
+          </a:ln>
+        </p:spPr>
+        <p:style>
+          <a:lnRef idx="2">
+            <a:schemeClr val="accent1">
+              <a:shade val="50000"/>
+            </a:schemeClr>
+          </a:lnRef>
+          <a:fillRef idx="1">
+            <a:schemeClr val="accent1"/>
+          </a:fillRef>
+          <a:effectRef idx="0">
+            <a:schemeClr val="accent1"/>
+          </a:effectRef>
+          <a:fontRef idx="minor">
+            <a:schemeClr val="lt1"/>
+          </a:fontRef>
+        </p:style>
+        <p:txBody>
+          <a:bodyPr rtlCol="0" anchor="ctr"/>
+          <a:lstStyle/>
+          <a:p>
+            <a:endParaRPr lang="en-US" dirty="0" smtClean="0">
+              <a:solidFill>
+                <a:schemeClr val="tx1"/>
+              </a:solidFill>
+            </a:endParaRPr>
+          </a:p>
+        </p:txBody>
+      </p:sp>
+      <p:sp>
+        <p:nvSpPr>
+          <p:cNvPr id="9" name="TextBox 8"/>
           <p:cNvSpPr txBox="1"/>
           <p:nvPr/>
         </p:nvSpPr>
         <p:spPr>
           <a:xfrm>
-            <a:off x="307089" y="2865802"/>
-            <a:ext cx="1197895" cy="369332"/>
+            <a:off x="2448218" y="179512"/>
+            <a:ext cx="1961563" cy="584775"/>
           </a:xfrm>
           <a:prstGeom prst="rect">
             <a:avLst/>
@@ -8876,28 +8637,71 @@
           <a:noFill/>
         </p:spPr>
         <p:txBody>
+          <a:bodyPr wrap="none" rtlCol="0">
+            <a:spAutoFit/>
+          </a:bodyPr>
+          <a:lstStyle/>
+          <a:p>
+            <a:r>
+              <a:rPr lang="de-DE" sz="3200" dirty="0" smtClean="0">
+                <a:solidFill>
+                  <a:schemeClr val="accent6"/>
+                </a:solidFill>
+              </a:rPr>
+              <a:t>Spickzettel</a:t>
+            </a:r>
+            <a:endParaRPr lang="de-DE" sz="3200" dirty="0">
+              <a:solidFill>
+                <a:schemeClr val="accent6"/>
+              </a:solidFill>
+            </a:endParaRPr>
+          </a:p>
+        </p:txBody>
+      </p:sp>
+      <p:sp>
+        <p:nvSpPr>
+          <p:cNvPr id="17" name="TextBox 16"/>
+          <p:cNvSpPr txBox="1"/>
+          <p:nvPr/>
+        </p:nvSpPr>
+        <p:spPr>
+          <a:xfrm>
+            <a:off x="332657" y="803512"/>
+            <a:ext cx="1197892" cy="369332"/>
+          </a:xfrm>
+          <a:prstGeom prst="rect">
+            <a:avLst/>
+          </a:prstGeom>
+          <a:noFill/>
+        </p:spPr>
+        <p:txBody>
           <a:bodyPr wrap="square" rtlCol="0">
             <a:spAutoFit/>
           </a:bodyPr>
           <a:lstStyle/>
           <a:p>
             <a:r>
-              <a:rPr lang="de-DE" b="1" dirty="0" smtClean="0"/>
-              <a:t>sample</a:t>
-            </a:r>
-          </a:p>
-        </p:txBody>
-      </p:sp>
-      <p:sp>
-        <p:nvSpPr>
-          <p:cNvPr id="7" name="TextBox 6"/>
+              <a:rPr lang="de-DE" b="1" dirty="0" err="1" smtClean="0"/>
+              <a:t>use_synth</a:t>
+            </a:r>
+            <a:r>
+              <a:rPr lang="de-DE" b="1" dirty="0"/>
+              <a:t> </a:t>
+            </a:r>
+            <a:endParaRPr lang="de-DE" b="1" dirty="0" smtClean="0"/>
+          </a:p>
+        </p:txBody>
+      </p:sp>
+      <p:sp>
+        <p:nvSpPr>
+          <p:cNvPr id="5" name="TextBox 4"/>
           <p:cNvSpPr txBox="1"/>
           <p:nvPr/>
         </p:nvSpPr>
         <p:spPr>
           <a:xfrm>
-            <a:off x="2198586" y="7092538"/>
-            <a:ext cx="1387955" cy="1708160"/>
+            <a:off x="332657" y="1242789"/>
+            <a:ext cx="6264696" cy="1384995"/>
           </a:xfrm>
           <a:prstGeom prst="rect">
             <a:avLst/>
@@ -8921,132 +8725,382 @@
           <a:bodyPr wrap="square" rtlCol="0">
             <a:spAutoFit/>
           </a:bodyPr>
-          <a:lstStyle/>
-          <a:p>
-            <a:r>
-              <a:rPr lang="de-DE" sz="1050" dirty="0"/>
-              <a:t>:</a:t>
-            </a:r>
-            <a:r>
-              <a:rPr lang="de-DE" sz="1050" dirty="0" err="1"/>
-              <a:t>ambi_soft_buzz</a:t>
-            </a:r>
-            <a:endParaRPr lang="de-DE" sz="1050" dirty="0"/>
-          </a:p>
-          <a:p>
-            <a:r>
-              <a:rPr lang="de-DE" sz="1050" dirty="0"/>
-              <a:t>:</a:t>
-            </a:r>
-            <a:r>
-              <a:rPr lang="de-DE" sz="1050" dirty="0" err="1"/>
-              <a:t>ambi_swoosh</a:t>
-            </a:r>
-            <a:endParaRPr lang="de-DE" sz="1050" dirty="0"/>
-          </a:p>
-          <a:p>
-            <a:r>
-              <a:rPr lang="de-DE" sz="1050" dirty="0"/>
-              <a:t>:</a:t>
-            </a:r>
-            <a:r>
-              <a:rPr lang="de-DE" sz="1050" dirty="0" err="1"/>
-              <a:t>ambi_drone</a:t>
-            </a:r>
-            <a:endParaRPr lang="de-DE" sz="1050" dirty="0"/>
-          </a:p>
-          <a:p>
-            <a:r>
-              <a:rPr lang="de-DE" sz="1050" dirty="0"/>
-              <a:t>:</a:t>
-            </a:r>
-            <a:r>
-              <a:rPr lang="de-DE" sz="1050" dirty="0" err="1"/>
-              <a:t>ambi_glass_hum</a:t>
-            </a:r>
-            <a:endParaRPr lang="de-DE" sz="1050" dirty="0"/>
-          </a:p>
-          <a:p>
-            <a:r>
-              <a:rPr lang="de-DE" sz="1050" dirty="0"/>
-              <a:t>:</a:t>
-            </a:r>
-            <a:r>
-              <a:rPr lang="de-DE" sz="1050" dirty="0" err="1"/>
-              <a:t>ambi_glass_rub</a:t>
-            </a:r>
-            <a:endParaRPr lang="de-DE" sz="1050" dirty="0"/>
-          </a:p>
-          <a:p>
-            <a:r>
-              <a:rPr lang="de-DE" sz="1050" dirty="0"/>
-              <a:t>:</a:t>
-            </a:r>
-            <a:r>
-              <a:rPr lang="de-DE" sz="1050" dirty="0" err="1"/>
-              <a:t>ambi_haunted_hum</a:t>
-            </a:r>
-            <a:endParaRPr lang="de-DE" sz="1050" dirty="0"/>
-          </a:p>
-          <a:p>
-            <a:r>
-              <a:rPr lang="de-DE" sz="1050" dirty="0"/>
-              <a:t>:</a:t>
-            </a:r>
-            <a:r>
-              <a:rPr lang="de-DE" sz="1050" dirty="0" err="1"/>
-              <a:t>ambi_piano</a:t>
-            </a:r>
-            <a:endParaRPr lang="de-DE" sz="1050" dirty="0"/>
-          </a:p>
-          <a:p>
-            <a:r>
-              <a:rPr lang="de-DE" sz="1050" dirty="0"/>
-              <a:t>:</a:t>
-            </a:r>
-            <a:r>
-              <a:rPr lang="de-DE" sz="1050" dirty="0" err="1"/>
-              <a:t>ambi_lunar_land</a:t>
-            </a:r>
-            <a:endParaRPr lang="de-DE" sz="1050" dirty="0"/>
-          </a:p>
-          <a:p>
-            <a:r>
-              <a:rPr lang="de-DE" sz="1050" dirty="0"/>
-              <a:t>:</a:t>
-            </a:r>
-            <a:r>
-              <a:rPr lang="de-DE" sz="1050" dirty="0" err="1"/>
-              <a:t>ambi_dark_woosh</a:t>
-            </a:r>
-            <a:endParaRPr lang="de-DE" sz="1050" dirty="0"/>
-          </a:p>
-          <a:p>
-            <a:r>
-              <a:rPr lang="de-DE" sz="1050" dirty="0"/>
-              <a:t>:</a:t>
-            </a:r>
-            <a:r>
-              <a:rPr lang="de-DE" sz="1050" dirty="0" err="1"/>
-              <a:t>ambi_choir</a:t>
-            </a:r>
-            <a:r>
-              <a:rPr lang="de-DE" sz="1050" dirty="0"/>
+          <a:lstStyle>
+            <a:defPPr>
+              <a:defRPr lang="de-DE"/>
+            </a:defPPr>
+            <a:lvl1pPr>
+              <a:defRPr sz="1050">
+                <a:solidFill>
+                  <a:schemeClr val="dk1"/>
+                </a:solidFill>
+              </a:defRPr>
+            </a:lvl1pPr>
+            <a:lvl2pPr>
+              <a:defRPr>
+                <a:solidFill>
+                  <a:schemeClr val="dk1"/>
+                </a:solidFill>
+              </a:defRPr>
+            </a:lvl2pPr>
+            <a:lvl3pPr>
+              <a:defRPr>
+                <a:solidFill>
+                  <a:schemeClr val="dk1"/>
+                </a:solidFill>
+              </a:defRPr>
+            </a:lvl3pPr>
+            <a:lvl4pPr>
+              <a:defRPr>
+                <a:solidFill>
+                  <a:schemeClr val="dk1"/>
+                </a:solidFill>
+              </a:defRPr>
+            </a:lvl4pPr>
+            <a:lvl5pPr>
+              <a:defRPr>
+                <a:solidFill>
+                  <a:schemeClr val="dk1"/>
+                </a:solidFill>
+              </a:defRPr>
+            </a:lvl5pPr>
+            <a:lvl6pPr>
+              <a:defRPr>
+                <a:solidFill>
+                  <a:schemeClr val="dk1"/>
+                </a:solidFill>
+              </a:defRPr>
+            </a:lvl6pPr>
+            <a:lvl7pPr>
+              <a:defRPr>
+                <a:solidFill>
+                  <a:schemeClr val="dk1"/>
+                </a:solidFill>
+              </a:defRPr>
+            </a:lvl7pPr>
+            <a:lvl8pPr>
+              <a:defRPr>
+                <a:solidFill>
+                  <a:schemeClr val="dk1"/>
+                </a:solidFill>
+              </a:defRPr>
+            </a:lvl8pPr>
+            <a:lvl9pPr>
+              <a:defRPr>
+                <a:solidFill>
+                  <a:schemeClr val="dk1"/>
+                </a:solidFill>
+              </a:defRPr>
+            </a:lvl9pPr>
+          </a:lstStyle>
+          <a:p>
+            <a:r>
+              <a:rPr lang="de-DE" sz="1200" dirty="0" err="1"/>
+              <a:t>beep</a:t>
+            </a:r>
+            <a:r>
+              <a:rPr lang="de-DE" sz="1200" dirty="0"/>
+              <a:t>	blade	</a:t>
+            </a:r>
+            <a:r>
+              <a:rPr lang="de-DE" sz="1200" dirty="0" err="1"/>
+              <a:t>bnoise</a:t>
+            </a:r>
+            <a:r>
+              <a:rPr lang="de-DE" sz="1200" dirty="0"/>
+              <a:t>	</a:t>
+            </a:r>
+            <a:r>
+              <a:rPr lang="de-DE" sz="1200" dirty="0" err="1"/>
+              <a:t>cnoise</a:t>
+            </a:r>
+            <a:r>
+              <a:rPr lang="de-DE" sz="1200" dirty="0"/>
+              <a:t>	</a:t>
+            </a:r>
+            <a:r>
+              <a:rPr lang="de-DE" sz="1200" dirty="0" err="1"/>
+              <a:t>dark_ambience</a:t>
+            </a:r>
+            <a:r>
+              <a:rPr lang="de-DE" sz="1200" dirty="0"/>
               <a:t> </a:t>
             </a:r>
           </a:p>
-        </p:txBody>
-      </p:sp>
-      <p:sp>
-        <p:nvSpPr>
-          <p:cNvPr id="10" name="TextBox 9"/>
+          <a:p>
+            <a:r>
+              <a:rPr lang="de-DE" sz="1200" dirty="0" err="1"/>
+              <a:t>dpulse</a:t>
+            </a:r>
+            <a:r>
+              <a:rPr lang="de-DE" sz="1200" dirty="0"/>
+              <a:t>	</a:t>
+            </a:r>
+            <a:r>
+              <a:rPr lang="de-DE" sz="1200" dirty="0" err="1"/>
+              <a:t>dsaw</a:t>
+            </a:r>
+            <a:r>
+              <a:rPr lang="de-DE" sz="1200" dirty="0"/>
+              <a:t>	</a:t>
+            </a:r>
+            <a:r>
+              <a:rPr lang="de-DE" sz="1200" dirty="0" err="1"/>
+              <a:t>dull_bell</a:t>
+            </a:r>
+            <a:r>
+              <a:rPr lang="de-DE" sz="1200" dirty="0"/>
+              <a:t>	</a:t>
+            </a:r>
+            <a:r>
+              <a:rPr lang="de-DE" sz="1200" dirty="0" err="1"/>
+              <a:t>fm</a:t>
+            </a:r>
+            <a:r>
+              <a:rPr lang="de-DE" sz="1200" dirty="0"/>
+              <a:t>	</a:t>
+            </a:r>
+            <a:r>
+              <a:rPr lang="de-DE" sz="1200" dirty="0" err="1"/>
+              <a:t>gnoise</a:t>
+            </a:r>
+            <a:r>
+              <a:rPr lang="de-DE" sz="1200" dirty="0"/>
+              <a:t>	</a:t>
+            </a:r>
+            <a:r>
+              <a:rPr lang="de-DE" sz="1200" dirty="0" err="1"/>
+              <a:t>growl</a:t>
+            </a:r>
+            <a:endParaRPr lang="de-DE" sz="1200" dirty="0"/>
+          </a:p>
+          <a:p>
+            <a:r>
+              <a:rPr lang="de-DE" sz="1200" dirty="0" err="1"/>
+              <a:t>hollow</a:t>
+            </a:r>
+            <a:r>
+              <a:rPr lang="de-DE" sz="1200" dirty="0"/>
+              <a:t>	</a:t>
+            </a:r>
+            <a:r>
+              <a:rPr lang="de-DE" sz="1200" dirty="0" err="1"/>
+              <a:t>hoover</a:t>
+            </a:r>
+            <a:r>
+              <a:rPr lang="de-DE" sz="1200" dirty="0"/>
+              <a:t>	</a:t>
+            </a:r>
+          </a:p>
+          <a:p>
+            <a:r>
+              <a:rPr lang="de-DE" sz="1200" dirty="0" err="1"/>
+              <a:t>mod_beep</a:t>
+            </a:r>
+            <a:r>
+              <a:rPr lang="de-DE" sz="1200" dirty="0"/>
+              <a:t>	</a:t>
+            </a:r>
+            <a:r>
+              <a:rPr lang="de-DE" sz="1200" dirty="0" err="1"/>
+              <a:t>mod_dsaw</a:t>
+            </a:r>
+            <a:r>
+              <a:rPr lang="de-DE" sz="1200" dirty="0"/>
+              <a:t>	</a:t>
+            </a:r>
+            <a:r>
+              <a:rPr lang="de-DE" sz="1200" dirty="0" err="1"/>
+              <a:t>mod_fm</a:t>
+            </a:r>
+            <a:r>
+              <a:rPr lang="de-DE" sz="1200" dirty="0"/>
+              <a:t>	</a:t>
+            </a:r>
+            <a:r>
+              <a:rPr lang="de-DE" sz="1200" dirty="0" err="1" smtClean="0"/>
+              <a:t>chiplead</a:t>
+            </a:r>
+            <a:r>
+              <a:rPr lang="de-DE" sz="1200" dirty="0" smtClean="0"/>
+              <a:t>	</a:t>
+            </a:r>
+            <a:r>
+              <a:rPr lang="de-DE" sz="1200" dirty="0" err="1" smtClean="0"/>
+              <a:t>chipbass</a:t>
+            </a:r>
+            <a:r>
+              <a:rPr lang="de-DE" sz="1200" dirty="0" smtClean="0"/>
+              <a:t>	</a:t>
+            </a:r>
+            <a:r>
+              <a:rPr lang="de-DE" sz="1200" dirty="0" err="1" smtClean="0"/>
+              <a:t>chipnoise</a:t>
+            </a:r>
+            <a:endParaRPr lang="de-DE" sz="1200" dirty="0"/>
+          </a:p>
+          <a:p>
+            <a:r>
+              <a:rPr lang="de-DE" sz="1200" dirty="0" err="1"/>
+              <a:t>mod_pulse</a:t>
+            </a:r>
+            <a:r>
+              <a:rPr lang="de-DE" sz="1200" dirty="0"/>
+              <a:t>	</a:t>
+            </a:r>
+            <a:r>
+              <a:rPr lang="de-DE" sz="1200" dirty="0" err="1"/>
+              <a:t>mod_saw</a:t>
+            </a:r>
+            <a:r>
+              <a:rPr lang="de-DE" sz="1200" dirty="0"/>
+              <a:t>		</a:t>
+            </a:r>
+            <a:r>
+              <a:rPr lang="de-DE" sz="1200" dirty="0" err="1"/>
+              <a:t>mod_sine</a:t>
+            </a:r>
+            <a:r>
+              <a:rPr lang="de-DE" sz="1200" dirty="0"/>
+              <a:t>	</a:t>
+            </a:r>
+            <a:r>
+              <a:rPr lang="de-DE" sz="1200" dirty="0" err="1" smtClean="0"/>
+              <a:t>mod_tri</a:t>
+            </a:r>
+            <a:r>
+              <a:rPr lang="de-DE" sz="1200" dirty="0" smtClean="0"/>
+              <a:t>	pule</a:t>
+            </a:r>
+            <a:endParaRPr lang="de-DE" sz="1200" dirty="0"/>
+          </a:p>
+          <a:p>
+            <a:r>
+              <a:rPr lang="de-DE" sz="1200" dirty="0" err="1"/>
+              <a:t>noise</a:t>
+            </a:r>
+            <a:r>
+              <a:rPr lang="de-DE" sz="1200" dirty="0"/>
+              <a:t>	piano	</a:t>
+            </a:r>
+            <a:r>
+              <a:rPr lang="de-DE" sz="1200" dirty="0" err="1"/>
+              <a:t>pnoise</a:t>
+            </a:r>
+            <a:r>
+              <a:rPr lang="de-DE" sz="1200" dirty="0"/>
+              <a:t>	</a:t>
+            </a:r>
+            <a:r>
+              <a:rPr lang="de-DE" sz="1200" dirty="0" err="1"/>
+              <a:t>pretty_bell</a:t>
+            </a:r>
+            <a:r>
+              <a:rPr lang="de-DE" sz="1200" dirty="0"/>
+              <a:t>	</a:t>
+            </a:r>
+            <a:r>
+              <a:rPr lang="de-DE" sz="1200" dirty="0" err="1"/>
+              <a:t>prophet</a:t>
+            </a:r>
+            <a:r>
+              <a:rPr lang="de-DE" sz="1200" dirty="0"/>
+              <a:t>	</a:t>
+            </a:r>
+            <a:r>
+              <a:rPr lang="de-DE" sz="1200" dirty="0" err="1" smtClean="0"/>
+              <a:t>dtri</a:t>
+            </a:r>
+            <a:r>
+              <a:rPr lang="de-DE" sz="1200" dirty="0" smtClean="0"/>
+              <a:t>	</a:t>
+            </a:r>
+            <a:r>
+              <a:rPr lang="de-DE" sz="1200" dirty="0" err="1" smtClean="0"/>
+              <a:t>pluck</a:t>
+            </a:r>
+            <a:endParaRPr lang="de-DE" sz="1200" dirty="0"/>
+          </a:p>
+          <a:p>
+            <a:r>
+              <a:rPr lang="de-DE" sz="1200" dirty="0" err="1"/>
+              <a:t>saw</a:t>
+            </a:r>
+            <a:r>
+              <a:rPr lang="de-DE" sz="1200" dirty="0"/>
+              <a:t>	sine	</a:t>
+            </a:r>
+            <a:r>
+              <a:rPr lang="de-DE" sz="1200" dirty="0" err="1"/>
+              <a:t>square</a:t>
+            </a:r>
+            <a:r>
+              <a:rPr lang="de-DE" sz="1200" dirty="0"/>
+              <a:t>	</a:t>
+            </a:r>
+            <a:r>
+              <a:rPr lang="de-DE" sz="1200" dirty="0" err="1"/>
+              <a:t>subpulse</a:t>
+            </a:r>
+            <a:r>
+              <a:rPr lang="de-DE" sz="1200" dirty="0"/>
+              <a:t>	tb303	</a:t>
+            </a:r>
+            <a:r>
+              <a:rPr lang="de-DE" sz="1200" dirty="0" err="1"/>
+              <a:t>tri</a:t>
+            </a:r>
+            <a:r>
+              <a:rPr lang="de-DE" sz="1200" dirty="0"/>
+              <a:t>	</a:t>
+            </a:r>
+            <a:r>
+              <a:rPr lang="de-DE" sz="1200" dirty="0" err="1" smtClean="0"/>
+              <a:t>zawa</a:t>
+            </a:r>
+            <a:endParaRPr lang="de-DE" sz="1200" dirty="0"/>
+          </a:p>
+        </p:txBody>
+      </p:sp>
+      <p:sp>
+        <p:nvSpPr>
+          <p:cNvPr id="6" name="TextBox 5"/>
           <p:cNvSpPr txBox="1"/>
           <p:nvPr/>
         </p:nvSpPr>
         <p:spPr>
           <a:xfrm>
-            <a:off x="3761429" y="3343254"/>
-            <a:ext cx="2016225" cy="1708160"/>
+            <a:off x="307089" y="2865802"/>
+            <a:ext cx="1197895" cy="369332"/>
+          </a:xfrm>
+          <a:prstGeom prst="rect">
+            <a:avLst/>
+          </a:prstGeom>
+          <a:noFill/>
+        </p:spPr>
+        <p:txBody>
+          <a:bodyPr wrap="square" rtlCol="0">
+            <a:spAutoFit/>
+          </a:bodyPr>
+          <a:lstStyle/>
+          <a:p>
+            <a:r>
+              <a:rPr lang="de-DE" b="1" dirty="0" smtClean="0"/>
+              <a:t>sample</a:t>
+            </a:r>
+          </a:p>
+        </p:txBody>
+      </p:sp>
+      <p:sp>
+        <p:nvSpPr>
+          <p:cNvPr id="7" name="TextBox 6"/>
+          <p:cNvSpPr txBox="1"/>
+          <p:nvPr/>
+        </p:nvSpPr>
+        <p:spPr>
+          <a:xfrm>
+            <a:off x="2198586" y="7092538"/>
+            <a:ext cx="1387955" cy="1708160"/>
           </a:xfrm>
           <a:prstGeom prst="rect">
             <a:avLst/>
@@ -9188,14 +9242,14 @@
       </p:sp>
       <p:sp>
         <p:nvSpPr>
-          <p:cNvPr id="11" name="TextBox 10"/>
+          <p:cNvPr id="10" name="TextBox 9"/>
           <p:cNvSpPr txBox="1"/>
           <p:nvPr/>
         </p:nvSpPr>
         <p:spPr>
           <a:xfrm>
-            <a:off x="2198586" y="3363535"/>
-            <a:ext cx="1163884" cy="2031325"/>
+            <a:off x="3761429" y="3343254"/>
+            <a:ext cx="2016225" cy="1708160"/>
           </a:xfrm>
           <a:prstGeom prst="rect">
             <a:avLst/>
@@ -9227,7 +9281,7 @@
             </a:r>
             <a:r>
               <a:rPr lang="de-DE" sz="1050" dirty="0" err="1"/>
-              <a:t>bd_ada</a:t>
+              <a:t>ambi_soft_buzz</a:t>
             </a:r>
             <a:endParaRPr lang="de-DE" sz="1050" dirty="0"/>
           </a:p>
@@ -9238,15 +9292,9 @@
             </a:r>
             <a:r>
               <a:rPr lang="de-DE" sz="1050" dirty="0" err="1"/>
-              <a:t>bd_pure</a:t>
+              <a:t>ambi_swoosh</a:t>
             </a:r>
             <a:endParaRPr lang="de-DE" sz="1050" dirty="0"/>
-          </a:p>
-          <a:p>
-            <a:r>
-              <a:rPr lang="de-DE" sz="1050" dirty="0"/>
-              <a:t>:bd_808</a:t>
-            </a:r>
           </a:p>
           <a:p>
             <a:r>
@@ -9255,7 +9303,7 @@
             </a:r>
             <a:r>
               <a:rPr lang="de-DE" sz="1050" dirty="0" err="1"/>
-              <a:t>bd_zum</a:t>
+              <a:t>ambi_drone</a:t>
             </a:r>
             <a:endParaRPr lang="de-DE" sz="1050" dirty="0"/>
           </a:p>
@@ -9266,7 +9314,7 @@
             </a:r>
             <a:r>
               <a:rPr lang="de-DE" sz="1050" dirty="0" err="1"/>
-              <a:t>bd_gas</a:t>
+              <a:t>ambi_glass_hum</a:t>
             </a:r>
             <a:endParaRPr lang="de-DE" sz="1050" dirty="0"/>
           </a:p>
@@ -9277,7 +9325,7 @@
             </a:r>
             <a:r>
               <a:rPr lang="de-DE" sz="1050" dirty="0" err="1"/>
-              <a:t>bd_sone</a:t>
+              <a:t>ambi_glass_rub</a:t>
             </a:r>
             <a:endParaRPr lang="de-DE" sz="1050" dirty="0"/>
           </a:p>
@@ -9288,7 +9336,7 @@
             </a:r>
             <a:r>
               <a:rPr lang="de-DE" sz="1050" dirty="0" err="1"/>
-              <a:t>bd_haus</a:t>
+              <a:t>ambi_haunted_hum</a:t>
             </a:r>
             <a:endParaRPr lang="de-DE" sz="1050" dirty="0"/>
           </a:p>
@@ -9299,7 +9347,7 @@
             </a:r>
             <a:r>
               <a:rPr lang="de-DE" sz="1050" dirty="0" err="1"/>
-              <a:t>bd_zome</a:t>
+              <a:t>ambi_piano</a:t>
             </a:r>
             <a:endParaRPr lang="de-DE" sz="1050" dirty="0"/>
           </a:p>
@@ -9310,7 +9358,7 @@
             </a:r>
             <a:r>
               <a:rPr lang="de-DE" sz="1050" dirty="0" err="1"/>
-              <a:t>bd_boom</a:t>
+              <a:t>ambi_lunar_land</a:t>
             </a:r>
             <a:endParaRPr lang="de-DE" sz="1050" dirty="0"/>
           </a:p>
@@ -9321,7 +9369,7 @@
             </a:r>
             <a:r>
               <a:rPr lang="de-DE" sz="1050" dirty="0" err="1"/>
-              <a:t>bd_klub</a:t>
+              <a:t>ambi_dark_woosh</a:t>
             </a:r>
             <a:endParaRPr lang="de-DE" sz="1050" dirty="0"/>
           </a:p>
@@ -9332,18 +9380,7 @@
             </a:r>
             <a:r>
               <a:rPr lang="de-DE" sz="1050" dirty="0" err="1"/>
-              <a:t>bd_fat</a:t>
-            </a:r>
-            <a:endParaRPr lang="de-DE" sz="1050" dirty="0"/>
-          </a:p>
-          <a:p>
-            <a:r>
-              <a:rPr lang="de-DE" sz="1050" dirty="0"/>
-              <a:t>:</a:t>
-            </a:r>
-            <a:r>
-              <a:rPr lang="de-DE" sz="1050" dirty="0" err="1"/>
-              <a:t>bd_tek</a:t>
+              <a:t>ambi_choir</a:t>
             </a:r>
             <a:r>
               <a:rPr lang="de-DE" sz="1050" dirty="0"/>
@@ -9354,14 +9391,14 @@
       </p:sp>
       <p:sp>
         <p:nvSpPr>
-          <p:cNvPr id="12" name="TextBox 11"/>
+          <p:cNvPr id="11" name="TextBox 10"/>
           <p:cNvSpPr txBox="1"/>
           <p:nvPr/>
         </p:nvSpPr>
         <p:spPr>
           <a:xfrm>
-            <a:off x="2205117" y="5563327"/>
-            <a:ext cx="1354374" cy="1384995"/>
+            <a:off x="2198586" y="3363535"/>
+            <a:ext cx="1163884" cy="2031325"/>
           </a:xfrm>
           <a:prstGeom prst="rect">
             <a:avLst/>
@@ -9388,108 +9425,146 @@
           <a:lstStyle/>
           <a:p>
             <a:r>
-              <a:rPr lang="en-US" sz="1050" dirty="0" smtClean="0"/>
+              <a:rPr lang="de-DE" sz="1050" dirty="0"/>
               <a:t>:</a:t>
             </a:r>
             <a:r>
-              <a:rPr lang="en-US" sz="1050" dirty="0" err="1"/>
-              <a:t>bass_hit_c</a:t>
-            </a:r>
-            <a:endParaRPr lang="en-US" sz="1050" dirty="0"/>
-          </a:p>
-          <a:p>
-            <a:r>
-              <a:rPr lang="en-US" sz="1050" dirty="0"/>
+              <a:rPr lang="de-DE" sz="1050" dirty="0" err="1"/>
+              <a:t>bd_ada</a:t>
+            </a:r>
+            <a:endParaRPr lang="de-DE" sz="1050" dirty="0"/>
+          </a:p>
+          <a:p>
+            <a:r>
+              <a:rPr lang="de-DE" sz="1050" dirty="0"/>
               <a:t>:</a:t>
             </a:r>
             <a:r>
-              <a:rPr lang="en-US" sz="1050" dirty="0" err="1"/>
-              <a:t>bass_hard_c</a:t>
-            </a:r>
-            <a:endParaRPr lang="en-US" sz="1050" dirty="0"/>
-          </a:p>
-          <a:p>
-            <a:r>
-              <a:rPr lang="en-US" sz="1050" dirty="0"/>
+              <a:rPr lang="de-DE" sz="1050" dirty="0" err="1"/>
+              <a:t>bd_pure</a:t>
+            </a:r>
+            <a:endParaRPr lang="de-DE" sz="1050" dirty="0"/>
+          </a:p>
+          <a:p>
+            <a:r>
+              <a:rPr lang="de-DE" sz="1050" dirty="0"/>
+              <a:t>:bd_808</a:t>
+            </a:r>
+          </a:p>
+          <a:p>
+            <a:r>
+              <a:rPr lang="de-DE" sz="1050" dirty="0"/>
               <a:t>:</a:t>
             </a:r>
             <a:r>
-              <a:rPr lang="en-US" sz="1050" dirty="0" err="1"/>
-              <a:t>bass_thick_c</a:t>
-            </a:r>
-            <a:endParaRPr lang="en-US" sz="1050" dirty="0"/>
-          </a:p>
-          <a:p>
-            <a:r>
-              <a:rPr lang="en-US" sz="1050" dirty="0"/>
+              <a:rPr lang="de-DE" sz="1050" dirty="0" err="1"/>
+              <a:t>bd_zum</a:t>
+            </a:r>
+            <a:endParaRPr lang="de-DE" sz="1050" dirty="0"/>
+          </a:p>
+          <a:p>
+            <a:r>
+              <a:rPr lang="de-DE" sz="1050" dirty="0"/>
               <a:t>:</a:t>
             </a:r>
             <a:r>
-              <a:rPr lang="en-US" sz="1050" dirty="0" err="1"/>
-              <a:t>bass_drop_c</a:t>
-            </a:r>
-            <a:endParaRPr lang="en-US" sz="1050" dirty="0"/>
-          </a:p>
-          <a:p>
-            <a:r>
-              <a:rPr lang="en-US" sz="1050" dirty="0"/>
+              <a:rPr lang="de-DE" sz="1050" dirty="0" err="1"/>
+              <a:t>bd_gas</a:t>
+            </a:r>
+            <a:endParaRPr lang="de-DE" sz="1050" dirty="0"/>
+          </a:p>
+          <a:p>
+            <a:r>
+              <a:rPr lang="de-DE" sz="1050" dirty="0"/>
               <a:t>:</a:t>
             </a:r>
             <a:r>
-              <a:rPr lang="en-US" sz="1050" dirty="0" err="1"/>
-              <a:t>bass_woodsy_c</a:t>
-            </a:r>
-            <a:endParaRPr lang="en-US" sz="1050" dirty="0"/>
-          </a:p>
-          <a:p>
-            <a:r>
-              <a:rPr lang="en-US" sz="1050" dirty="0"/>
+              <a:rPr lang="de-DE" sz="1050" dirty="0" err="1"/>
+              <a:t>bd_sone</a:t>
+            </a:r>
+            <a:endParaRPr lang="de-DE" sz="1050" dirty="0"/>
+          </a:p>
+          <a:p>
+            <a:r>
+              <a:rPr lang="de-DE" sz="1050" dirty="0"/>
               <a:t>:</a:t>
             </a:r>
             <a:r>
-              <a:rPr lang="en-US" sz="1050" dirty="0" err="1"/>
-              <a:t>bass_voxy_c</a:t>
-            </a:r>
-            <a:endParaRPr lang="en-US" sz="1050" dirty="0"/>
-          </a:p>
-          <a:p>
-            <a:r>
-              <a:rPr lang="en-US" sz="1050" dirty="0"/>
+              <a:rPr lang="de-DE" sz="1050" dirty="0" err="1"/>
+              <a:t>bd_haus</a:t>
+            </a:r>
+            <a:endParaRPr lang="de-DE" sz="1050" dirty="0"/>
+          </a:p>
+          <a:p>
+            <a:r>
+              <a:rPr lang="de-DE" sz="1050" dirty="0"/>
               <a:t>:</a:t>
             </a:r>
             <a:r>
-              <a:rPr lang="en-US" sz="1050" dirty="0" err="1"/>
-              <a:t>bass_voxy_hit_c</a:t>
-            </a:r>
-            <a:endParaRPr lang="en-US" sz="1050" dirty="0"/>
-          </a:p>
-          <a:p>
-            <a:r>
-              <a:rPr lang="en-US" sz="1050" dirty="0"/>
+              <a:rPr lang="de-DE" sz="1050" dirty="0" err="1"/>
+              <a:t>bd_zome</a:t>
+            </a:r>
+            <a:endParaRPr lang="de-DE" sz="1050" dirty="0"/>
+          </a:p>
+          <a:p>
+            <a:r>
+              <a:rPr lang="de-DE" sz="1050" dirty="0"/>
               <a:t>:</a:t>
             </a:r>
             <a:r>
-              <a:rPr lang="en-US" sz="1050" dirty="0" err="1"/>
-              <a:t>bass_dnb_f</a:t>
-            </a:r>
-            <a:r>
-              <a:rPr lang="en-US" sz="1050" dirty="0"/>
+              <a:rPr lang="de-DE" sz="1050" dirty="0" err="1"/>
+              <a:t>bd_boom</a:t>
+            </a:r>
+            <a:endParaRPr lang="de-DE" sz="1050" dirty="0"/>
+          </a:p>
+          <a:p>
+            <a:r>
+              <a:rPr lang="de-DE" sz="1050" dirty="0"/>
+              <a:t>:</a:t>
+            </a:r>
+            <a:r>
+              <a:rPr lang="de-DE" sz="1050" dirty="0" err="1"/>
+              <a:t>bd_klub</a:t>
+            </a:r>
+            <a:endParaRPr lang="de-DE" sz="1050" dirty="0"/>
+          </a:p>
+          <a:p>
+            <a:r>
+              <a:rPr lang="de-DE" sz="1050" dirty="0"/>
+              <a:t>:</a:t>
+            </a:r>
+            <a:r>
+              <a:rPr lang="de-DE" sz="1050" dirty="0" err="1"/>
+              <a:t>bd_fat</a:t>
+            </a:r>
+            <a:endParaRPr lang="de-DE" sz="1050" dirty="0"/>
+          </a:p>
+          <a:p>
+            <a:r>
+              <a:rPr lang="de-DE" sz="1050" dirty="0"/>
+              <a:t>:</a:t>
+            </a:r>
+            <a:r>
+              <a:rPr lang="de-DE" sz="1050" dirty="0" err="1"/>
+              <a:t>bd_tek</a:t>
+            </a:r>
+            <a:r>
+              <a:rPr lang="de-DE" sz="1050" dirty="0"/>
               <a:t> </a:t>
             </a:r>
-            <a:endParaRPr lang="de-DE" sz="1050" dirty="0"/>
-          </a:p>
-        </p:txBody>
-      </p:sp>
-      <p:sp>
-        <p:nvSpPr>
-          <p:cNvPr id="13" name="TextBox 12"/>
+          </a:p>
+        </p:txBody>
+      </p:sp>
+      <p:sp>
+        <p:nvSpPr>
+          <p:cNvPr id="12" name="TextBox 11"/>
           <p:cNvSpPr txBox="1"/>
           <p:nvPr/>
         </p:nvSpPr>
         <p:spPr>
           <a:xfrm>
-            <a:off x="3767760" y="5544171"/>
-            <a:ext cx="1479419" cy="3485570"/>
+            <a:off x="2205117" y="5563327"/>
+            <a:ext cx="1354374" cy="1384995"/>
           </a:xfrm>
           <a:prstGeom prst="rect">
             <a:avLst/>
@@ -9516,12 +9591,23 @@
           <a:lstStyle/>
           <a:p>
             <a:r>
+              <a:rPr lang="en-US" sz="1050" dirty="0" smtClean="0"/>
+              <a:t>:</a:t>
+            </a:r>
+            <a:r>
+              <a:rPr lang="en-US" sz="1050" dirty="0" err="1"/>
+              <a:t>bass_hit_c</a:t>
+            </a:r>
+            <a:endParaRPr lang="en-US" sz="1050" dirty="0"/>
+          </a:p>
+          <a:p>
+            <a:r>
               <a:rPr lang="en-US" sz="1050" dirty="0"/>
               <a:t>:</a:t>
             </a:r>
             <a:r>
               <a:rPr lang="en-US" sz="1050" dirty="0" err="1"/>
-              <a:t>drum_heavy_kick</a:t>
+              <a:t>bass_hard_c</a:t>
             </a:r>
             <a:endParaRPr lang="en-US" sz="1050" dirty="0"/>
           </a:p>
@@ -9532,7 +9618,7 @@
             </a:r>
             <a:r>
               <a:rPr lang="en-US" sz="1050" dirty="0" err="1"/>
-              <a:t>drum_tom_mid_soft</a:t>
+              <a:t>bass_thick_c</a:t>
             </a:r>
             <a:endParaRPr lang="en-US" sz="1050" dirty="0"/>
           </a:p>
@@ -9543,7 +9629,7 @@
             </a:r>
             <a:r>
               <a:rPr lang="en-US" sz="1050" dirty="0" err="1"/>
-              <a:t>drum_tom_mid_hard</a:t>
+              <a:t>bass_drop_c</a:t>
             </a:r>
             <a:endParaRPr lang="en-US" sz="1050" dirty="0"/>
           </a:p>
@@ -9554,7 +9640,7 @@
             </a:r>
             <a:r>
               <a:rPr lang="en-US" sz="1050" dirty="0" err="1"/>
-              <a:t>drum_tom_lo_soft</a:t>
+              <a:t>bass_woodsy_c</a:t>
             </a:r>
             <a:endParaRPr lang="en-US" sz="1050" dirty="0"/>
           </a:p>
@@ -9565,7 +9651,7 @@
             </a:r>
             <a:r>
               <a:rPr lang="en-US" sz="1050" dirty="0" err="1"/>
-              <a:t>drum_tom_lo_hard</a:t>
+              <a:t>bass_voxy_c</a:t>
             </a:r>
             <a:endParaRPr lang="en-US" sz="1050" dirty="0"/>
           </a:p>
@@ -9576,7 +9662,7 @@
             </a:r>
             <a:r>
               <a:rPr lang="en-US" sz="1050" dirty="0" err="1"/>
-              <a:t>drum_tom_hi_soft</a:t>
+              <a:t>bass_voxy_hit_c</a:t>
             </a:r>
             <a:endParaRPr lang="en-US" sz="1050" dirty="0"/>
           </a:p>
@@ -9587,182 +9673,26 @@
             </a:r>
             <a:r>
               <a:rPr lang="en-US" sz="1050" dirty="0" err="1"/>
-              <a:t>drum_tom_hi_hard</a:t>
-            </a:r>
-            <a:endParaRPr lang="en-US" sz="1050" dirty="0"/>
-          </a:p>
-          <a:p>
-            <a:r>
-              <a:rPr lang="en-US" sz="1050" dirty="0"/>
-              <a:t>:</a:t>
-            </a:r>
-            <a:r>
-              <a:rPr lang="en-US" sz="1050" dirty="0" err="1"/>
-              <a:t>drum_splash_soft</a:t>
-            </a:r>
-            <a:endParaRPr lang="en-US" sz="1050" dirty="0"/>
-          </a:p>
-          <a:p>
-            <a:r>
-              <a:rPr lang="en-US" sz="1050" dirty="0"/>
-              <a:t>:</a:t>
-            </a:r>
-            <a:r>
-              <a:rPr lang="en-US" sz="1050" dirty="0" err="1"/>
-              <a:t>drum_splash_hard</a:t>
-            </a:r>
-            <a:endParaRPr lang="en-US" sz="1050" dirty="0"/>
-          </a:p>
-          <a:p>
-            <a:r>
-              <a:rPr lang="en-US" sz="1050" dirty="0"/>
-              <a:t>:</a:t>
-            </a:r>
-            <a:r>
-              <a:rPr lang="en-US" sz="1050" dirty="0" err="1"/>
-              <a:t>drum_snare_soft</a:t>
-            </a:r>
-            <a:endParaRPr lang="en-US" sz="1050" dirty="0"/>
-          </a:p>
-          <a:p>
-            <a:r>
-              <a:rPr lang="en-US" sz="1050" dirty="0"/>
-              <a:t>:</a:t>
-            </a:r>
-            <a:r>
-              <a:rPr lang="en-US" sz="1050" dirty="0" err="1"/>
-              <a:t>drum_snare_hard</a:t>
-            </a:r>
-            <a:endParaRPr lang="en-US" sz="1050" dirty="0"/>
-          </a:p>
-          <a:p>
-            <a:r>
-              <a:rPr lang="en-US" sz="1050" dirty="0"/>
-              <a:t>:</a:t>
-            </a:r>
-            <a:r>
-              <a:rPr lang="en-US" sz="1050" dirty="0" err="1"/>
-              <a:t>drum_cymbal_soft</a:t>
-            </a:r>
-            <a:endParaRPr lang="en-US" sz="1050" dirty="0"/>
-          </a:p>
-          <a:p>
-            <a:r>
-              <a:rPr lang="en-US" sz="1050" dirty="0"/>
-              <a:t>:</a:t>
-            </a:r>
-            <a:r>
-              <a:rPr lang="en-US" sz="1050" dirty="0" err="1"/>
-              <a:t>drum_cymbal_hard</a:t>
-            </a:r>
-            <a:endParaRPr lang="en-US" sz="1050" dirty="0"/>
-          </a:p>
-          <a:p>
-            <a:r>
-              <a:rPr lang="en-US" sz="1050" dirty="0"/>
-              <a:t>:</a:t>
-            </a:r>
-            <a:r>
-              <a:rPr lang="en-US" sz="1050" dirty="0" err="1"/>
-              <a:t>drum_cymbal_open</a:t>
-            </a:r>
-            <a:endParaRPr lang="en-US" sz="1050" dirty="0"/>
-          </a:p>
-          <a:p>
-            <a:r>
-              <a:rPr lang="en-US" sz="1050" dirty="0"/>
-              <a:t>:</a:t>
-            </a:r>
-            <a:r>
-              <a:rPr lang="en-US" sz="1050" dirty="0" err="1"/>
-              <a:t>drum_cymbal_closed</a:t>
-            </a:r>
-            <a:endParaRPr lang="en-US" sz="1050" dirty="0"/>
-          </a:p>
-          <a:p>
-            <a:r>
-              <a:rPr lang="en-US" sz="1050" dirty="0"/>
-              <a:t>:</a:t>
-            </a:r>
-            <a:r>
-              <a:rPr lang="en-US" sz="1050" dirty="0" err="1"/>
-              <a:t>drum_cymbal_pedal</a:t>
-            </a:r>
-            <a:endParaRPr lang="en-US" sz="1050" dirty="0"/>
-          </a:p>
-          <a:p>
-            <a:r>
-              <a:rPr lang="en-US" sz="1050" dirty="0"/>
-              <a:t>:</a:t>
-            </a:r>
-            <a:r>
-              <a:rPr lang="en-US" sz="1050" dirty="0" err="1"/>
-              <a:t>drum_bass_soft</a:t>
-            </a:r>
-            <a:endParaRPr lang="en-US" sz="1050" dirty="0"/>
-          </a:p>
-          <a:p>
-            <a:r>
-              <a:rPr lang="en-US" sz="1050" dirty="0"/>
-              <a:t>:</a:t>
-            </a:r>
-            <a:r>
-              <a:rPr lang="en-US" sz="1050" dirty="0" err="1"/>
-              <a:t>drum_bass_hard</a:t>
+              <a:t>bass_dnb_f</a:t>
             </a:r>
             <a:r>
               <a:rPr lang="en-US" sz="1050" dirty="0"/>
               <a:t> </a:t>
             </a:r>
-          </a:p>
-          <a:p>
-            <a:r>
-              <a:rPr lang="en-US" sz="1050" dirty="0"/>
-              <a:t>:</a:t>
-            </a:r>
-            <a:r>
-              <a:rPr lang="en-US" sz="1050" dirty="0" err="1"/>
-              <a:t>sn_dub</a:t>
-            </a:r>
-            <a:endParaRPr lang="en-US" sz="1050" dirty="0"/>
-          </a:p>
-          <a:p>
-            <a:r>
-              <a:rPr lang="en-US" sz="1050" dirty="0"/>
-              <a:t>:</a:t>
-            </a:r>
-            <a:r>
-              <a:rPr lang="en-US" sz="1050" dirty="0" err="1"/>
-              <a:t>sn_dolf</a:t>
-            </a:r>
-            <a:endParaRPr lang="en-US" sz="1050" dirty="0"/>
-          </a:p>
-          <a:p>
-            <a:r>
-              <a:rPr lang="en-US" sz="1050" dirty="0"/>
-              <a:t>:</a:t>
-            </a:r>
-            <a:r>
-              <a:rPr lang="en-US" sz="1050" dirty="0" err="1"/>
-              <a:t>sn_zome</a:t>
-            </a:r>
-            <a:r>
-              <a:rPr lang="en-US" sz="1050" dirty="0"/>
-              <a:t> </a:t>
-            </a:r>
-          </a:p>
-        </p:txBody>
-      </p:sp>
-      <p:sp>
-        <p:nvSpPr>
-          <p:cNvPr id="4" name="Rectangle 3"/>
-          <p:cNvSpPr/>
+            <a:endParaRPr lang="de-DE" sz="1050" dirty="0"/>
+          </a:p>
+        </p:txBody>
+      </p:sp>
+      <p:sp>
+        <p:nvSpPr>
+          <p:cNvPr id="13" name="TextBox 12"/>
+          <p:cNvSpPr txBox="1"/>
           <p:nvPr/>
         </p:nvSpPr>
         <p:spPr>
           <a:xfrm>
-            <a:off x="307089" y="3363535"/>
-            <a:ext cx="1681751" cy="4131900"/>
+            <a:off x="3767760" y="5544171"/>
+            <a:ext cx="1479419" cy="3485570"/>
           </a:xfrm>
           <a:prstGeom prst="rect">
             <a:avLst/>
@@ -9789,274 +9719,238 @@
           <a:lstStyle/>
           <a:p>
             <a:r>
-              <a:rPr lang="de-DE" sz="1050" dirty="0"/>
+              <a:rPr lang="en-US" sz="1050" dirty="0"/>
               <a:t>:</a:t>
             </a:r>
             <a:r>
-              <a:rPr lang="de-DE" sz="1050" dirty="0" err="1"/>
-              <a:t>elec_triangle</a:t>
-            </a:r>
-            <a:endParaRPr lang="de-DE" sz="1050" dirty="0"/>
-          </a:p>
-          <a:p>
-            <a:r>
-              <a:rPr lang="de-DE" sz="1050" dirty="0"/>
+              <a:rPr lang="en-US" sz="1050" dirty="0" err="1"/>
+              <a:t>drum_heavy_kick</a:t>
+            </a:r>
+            <a:endParaRPr lang="en-US" sz="1050" dirty="0"/>
+          </a:p>
+          <a:p>
+            <a:r>
+              <a:rPr lang="en-US" sz="1050" dirty="0"/>
               <a:t>:</a:t>
             </a:r>
             <a:r>
-              <a:rPr lang="de-DE" sz="1050" dirty="0" err="1"/>
-              <a:t>elec_snare</a:t>
-            </a:r>
-            <a:endParaRPr lang="de-DE" sz="1050" dirty="0"/>
-          </a:p>
-          <a:p>
-            <a:r>
-              <a:rPr lang="de-DE" sz="1050" dirty="0"/>
+              <a:rPr lang="en-US" sz="1050" dirty="0" err="1"/>
+              <a:t>drum_tom_mid_soft</a:t>
+            </a:r>
+            <a:endParaRPr lang="en-US" sz="1050" dirty="0"/>
+          </a:p>
+          <a:p>
+            <a:r>
+              <a:rPr lang="en-US" sz="1050" dirty="0"/>
               <a:t>:</a:t>
             </a:r>
             <a:r>
-              <a:rPr lang="de-DE" sz="1050" dirty="0" err="1"/>
-              <a:t>elec_lo_snare</a:t>
-            </a:r>
-            <a:endParaRPr lang="de-DE" sz="1050" dirty="0"/>
-          </a:p>
-          <a:p>
-            <a:r>
-              <a:rPr lang="de-DE" sz="1050" dirty="0"/>
+              <a:rPr lang="en-US" sz="1050" dirty="0" err="1"/>
+              <a:t>drum_tom_mid_hard</a:t>
+            </a:r>
+            <a:endParaRPr lang="en-US" sz="1050" dirty="0"/>
+          </a:p>
+          <a:p>
+            <a:r>
+              <a:rPr lang="en-US" sz="1050" dirty="0"/>
               <a:t>:</a:t>
             </a:r>
             <a:r>
-              <a:rPr lang="de-DE" sz="1050" dirty="0" err="1"/>
-              <a:t>elec_hi_snare</a:t>
-            </a:r>
-            <a:endParaRPr lang="de-DE" sz="1050" dirty="0"/>
-          </a:p>
-          <a:p>
-            <a:r>
-              <a:rPr lang="de-DE" sz="1050" dirty="0"/>
+              <a:rPr lang="en-US" sz="1050" dirty="0" err="1"/>
+              <a:t>drum_tom_lo_soft</a:t>
+            </a:r>
+            <a:endParaRPr lang="en-US" sz="1050" dirty="0"/>
+          </a:p>
+          <a:p>
+            <a:r>
+              <a:rPr lang="en-US" sz="1050" dirty="0"/>
               <a:t>:</a:t>
             </a:r>
             <a:r>
-              <a:rPr lang="de-DE" sz="1050" dirty="0" err="1"/>
-              <a:t>elec_mid_snare</a:t>
-            </a:r>
-            <a:endParaRPr lang="de-DE" sz="1050" dirty="0"/>
-          </a:p>
-          <a:p>
-            <a:r>
-              <a:rPr lang="de-DE" sz="1050" dirty="0"/>
+              <a:rPr lang="en-US" sz="1050" dirty="0" err="1"/>
+              <a:t>drum_tom_lo_hard</a:t>
+            </a:r>
+            <a:endParaRPr lang="en-US" sz="1050" dirty="0"/>
+          </a:p>
+          <a:p>
+            <a:r>
+              <a:rPr lang="en-US" sz="1050" dirty="0"/>
               <a:t>:</a:t>
             </a:r>
             <a:r>
-              <a:rPr lang="de-DE" sz="1050" dirty="0" err="1"/>
-              <a:t>elec_cymbal</a:t>
-            </a:r>
-            <a:endParaRPr lang="de-DE" sz="1050" dirty="0"/>
-          </a:p>
-          <a:p>
-            <a:r>
-              <a:rPr lang="de-DE" sz="1050" dirty="0"/>
+              <a:rPr lang="en-US" sz="1050" dirty="0" err="1"/>
+              <a:t>drum_tom_hi_soft</a:t>
+            </a:r>
+            <a:endParaRPr lang="en-US" sz="1050" dirty="0"/>
+          </a:p>
+          <a:p>
+            <a:r>
+              <a:rPr lang="en-US" sz="1050" dirty="0"/>
               <a:t>:</a:t>
             </a:r>
             <a:r>
-              <a:rPr lang="de-DE" sz="1050" dirty="0" err="1"/>
-              <a:t>elec_soft_kick</a:t>
-            </a:r>
-            <a:endParaRPr lang="de-DE" sz="1050" dirty="0"/>
-          </a:p>
-          <a:p>
-            <a:r>
-              <a:rPr lang="de-DE" sz="1050" dirty="0"/>
+              <a:rPr lang="en-US" sz="1050" dirty="0" err="1"/>
+              <a:t>drum_tom_hi_hard</a:t>
+            </a:r>
+            <a:endParaRPr lang="en-US" sz="1050" dirty="0"/>
+          </a:p>
+          <a:p>
+            <a:r>
+              <a:rPr lang="en-US" sz="1050" dirty="0"/>
               <a:t>:</a:t>
             </a:r>
             <a:r>
-              <a:rPr lang="de-DE" sz="1050" dirty="0" err="1"/>
-              <a:t>elec_filt_snare</a:t>
-            </a:r>
-            <a:endParaRPr lang="de-DE" sz="1050" dirty="0"/>
-          </a:p>
-          <a:p>
-            <a:r>
-              <a:rPr lang="de-DE" sz="1050" dirty="0"/>
+              <a:rPr lang="en-US" sz="1050" dirty="0" err="1"/>
+              <a:t>drum_splash_soft</a:t>
+            </a:r>
+            <a:endParaRPr lang="en-US" sz="1050" dirty="0"/>
+          </a:p>
+          <a:p>
+            <a:r>
+              <a:rPr lang="en-US" sz="1050" dirty="0"/>
               <a:t>:</a:t>
             </a:r>
             <a:r>
-              <a:rPr lang="de-DE" sz="1050" dirty="0" err="1"/>
-              <a:t>elec_fuzz_tom</a:t>
-            </a:r>
-            <a:endParaRPr lang="de-DE" sz="1050" dirty="0"/>
-          </a:p>
-          <a:p>
-            <a:r>
-              <a:rPr lang="de-DE" sz="1050" dirty="0"/>
+              <a:rPr lang="en-US" sz="1050" dirty="0" err="1"/>
+              <a:t>drum_splash_hard</a:t>
+            </a:r>
+            <a:endParaRPr lang="en-US" sz="1050" dirty="0"/>
+          </a:p>
+          <a:p>
+            <a:r>
+              <a:rPr lang="en-US" sz="1050" dirty="0"/>
               <a:t>:</a:t>
             </a:r>
             <a:r>
-              <a:rPr lang="de-DE" sz="1050" dirty="0" err="1"/>
-              <a:t>elec_chime</a:t>
-            </a:r>
-            <a:endParaRPr lang="de-DE" sz="1050" dirty="0"/>
-          </a:p>
-          <a:p>
-            <a:r>
-              <a:rPr lang="de-DE" sz="1050" dirty="0"/>
+              <a:rPr lang="en-US" sz="1050" dirty="0" err="1"/>
+              <a:t>drum_snare_soft</a:t>
+            </a:r>
+            <a:endParaRPr lang="en-US" sz="1050" dirty="0"/>
+          </a:p>
+          <a:p>
+            <a:r>
+              <a:rPr lang="en-US" sz="1050" dirty="0"/>
               <a:t>:</a:t>
             </a:r>
             <a:r>
-              <a:rPr lang="de-DE" sz="1050" dirty="0" err="1"/>
-              <a:t>elec_bong</a:t>
-            </a:r>
-            <a:endParaRPr lang="de-DE" sz="1050" dirty="0"/>
-          </a:p>
-          <a:p>
-            <a:r>
-              <a:rPr lang="de-DE" sz="1050" dirty="0"/>
+              <a:rPr lang="en-US" sz="1050" dirty="0" err="1"/>
+              <a:t>drum_snare_hard</a:t>
+            </a:r>
+            <a:endParaRPr lang="en-US" sz="1050" dirty="0"/>
+          </a:p>
+          <a:p>
+            <a:r>
+              <a:rPr lang="en-US" sz="1050" dirty="0"/>
               <a:t>:</a:t>
             </a:r>
             <a:r>
-              <a:rPr lang="de-DE" sz="1050" dirty="0" err="1"/>
-              <a:t>elec_twang</a:t>
-            </a:r>
-            <a:endParaRPr lang="de-DE" sz="1050" dirty="0"/>
-          </a:p>
-          <a:p>
-            <a:r>
-              <a:rPr lang="de-DE" sz="1050" dirty="0"/>
+              <a:rPr lang="en-US" sz="1050" dirty="0" err="1"/>
+              <a:t>drum_cymbal_soft</a:t>
+            </a:r>
+            <a:endParaRPr lang="en-US" sz="1050" dirty="0"/>
+          </a:p>
+          <a:p>
+            <a:r>
+              <a:rPr lang="en-US" sz="1050" dirty="0"/>
               <a:t>:</a:t>
             </a:r>
             <a:r>
-              <a:rPr lang="de-DE" sz="1050" dirty="0" err="1"/>
-              <a:t>elec_wood</a:t>
-            </a:r>
-            <a:endParaRPr lang="de-DE" sz="1050" dirty="0"/>
-          </a:p>
-          <a:p>
-            <a:r>
-              <a:rPr lang="de-DE" sz="1050" dirty="0"/>
+              <a:rPr lang="en-US" sz="1050" dirty="0" err="1"/>
+              <a:t>drum_cymbal_hard</a:t>
+            </a:r>
+            <a:endParaRPr lang="en-US" sz="1050" dirty="0"/>
+          </a:p>
+          <a:p>
+            <a:r>
+              <a:rPr lang="en-US" sz="1050" dirty="0"/>
               <a:t>:</a:t>
             </a:r>
             <a:r>
-              <a:rPr lang="de-DE" sz="1050" dirty="0" err="1"/>
-              <a:t>elec_pop</a:t>
-            </a:r>
-            <a:endParaRPr lang="de-DE" sz="1050" dirty="0"/>
-          </a:p>
-          <a:p>
-            <a:r>
-              <a:rPr lang="de-DE" sz="1050" dirty="0"/>
+              <a:rPr lang="en-US" sz="1050" dirty="0" err="1"/>
+              <a:t>drum_cymbal_open</a:t>
+            </a:r>
+            <a:endParaRPr lang="en-US" sz="1050" dirty="0"/>
+          </a:p>
+          <a:p>
+            <a:r>
+              <a:rPr lang="en-US" sz="1050" dirty="0"/>
               <a:t>:</a:t>
             </a:r>
             <a:r>
-              <a:rPr lang="de-DE" sz="1050" dirty="0" err="1"/>
-              <a:t>elec_beep</a:t>
-            </a:r>
-            <a:endParaRPr lang="de-DE" sz="1050" dirty="0"/>
-          </a:p>
-          <a:p>
-            <a:r>
-              <a:rPr lang="de-DE" sz="1050" dirty="0"/>
+              <a:rPr lang="en-US" sz="1050" dirty="0" err="1"/>
+              <a:t>drum_cymbal_closed</a:t>
+            </a:r>
+            <a:endParaRPr lang="en-US" sz="1050" dirty="0"/>
+          </a:p>
+          <a:p>
+            <a:r>
+              <a:rPr lang="en-US" sz="1050" dirty="0"/>
               <a:t>:</a:t>
             </a:r>
             <a:r>
-              <a:rPr lang="de-DE" sz="1050" dirty="0" err="1"/>
-              <a:t>elec_blip</a:t>
-            </a:r>
-            <a:endParaRPr lang="de-DE" sz="1050" dirty="0"/>
-          </a:p>
-          <a:p>
-            <a:r>
-              <a:rPr lang="de-DE" sz="1050" dirty="0"/>
-              <a:t>:elec_blip2</a:t>
-            </a:r>
-          </a:p>
-          <a:p>
-            <a:r>
-              <a:rPr lang="de-DE" sz="1050" dirty="0"/>
+              <a:rPr lang="en-US" sz="1050" dirty="0" err="1"/>
+              <a:t>drum_cymbal_pedal</a:t>
+            </a:r>
+            <a:endParaRPr lang="en-US" sz="1050" dirty="0"/>
+          </a:p>
+          <a:p>
+            <a:r>
+              <a:rPr lang="en-US" sz="1050" dirty="0"/>
               <a:t>:</a:t>
             </a:r>
             <a:r>
-              <a:rPr lang="de-DE" sz="1050" dirty="0" err="1"/>
-              <a:t>elec_ping</a:t>
-            </a:r>
-            <a:endParaRPr lang="de-DE" sz="1050" dirty="0"/>
-          </a:p>
-          <a:p>
-            <a:r>
-              <a:rPr lang="de-DE" sz="1050" dirty="0"/>
+              <a:rPr lang="en-US" sz="1050" dirty="0" err="1"/>
+              <a:t>drum_bass_soft</a:t>
+            </a:r>
+            <a:endParaRPr lang="en-US" sz="1050" dirty="0"/>
+          </a:p>
+          <a:p>
+            <a:r>
+              <a:rPr lang="en-US" sz="1050" dirty="0"/>
               <a:t>:</a:t>
             </a:r>
             <a:r>
-              <a:rPr lang="de-DE" sz="1050" dirty="0" err="1"/>
-              <a:t>elec_bell</a:t>
-            </a:r>
-            <a:endParaRPr lang="de-DE" sz="1050" dirty="0"/>
-          </a:p>
-          <a:p>
-            <a:r>
-              <a:rPr lang="de-DE" sz="1050" dirty="0"/>
+              <a:rPr lang="en-US" sz="1050" dirty="0" err="1"/>
+              <a:t>drum_bass_hard</a:t>
+            </a:r>
+            <a:r>
+              <a:rPr lang="en-US" sz="1050" dirty="0"/>
+              <a:t> </a:t>
+            </a:r>
+          </a:p>
+          <a:p>
+            <a:r>
+              <a:rPr lang="en-US" sz="1050" dirty="0"/>
               <a:t>:</a:t>
             </a:r>
             <a:r>
-              <a:rPr lang="de-DE" sz="1050" dirty="0" err="1"/>
-              <a:t>elec_flip</a:t>
-            </a:r>
-            <a:endParaRPr lang="de-DE" sz="1050" dirty="0"/>
-          </a:p>
-          <a:p>
-            <a:r>
-              <a:rPr lang="de-DE" sz="1050" dirty="0"/>
+              <a:rPr lang="en-US" sz="1050" dirty="0" err="1"/>
+              <a:t>sn_dub</a:t>
+            </a:r>
+            <a:endParaRPr lang="en-US" sz="1050" dirty="0"/>
+          </a:p>
+          <a:p>
+            <a:r>
+              <a:rPr lang="en-US" sz="1050" dirty="0"/>
               <a:t>:</a:t>
             </a:r>
             <a:r>
-              <a:rPr lang="de-DE" sz="1050" dirty="0" err="1"/>
-              <a:t>elec_tick</a:t>
-            </a:r>
-            <a:endParaRPr lang="de-DE" sz="1050" dirty="0"/>
-          </a:p>
-          <a:p>
-            <a:r>
-              <a:rPr lang="de-DE" sz="1050" dirty="0"/>
+              <a:rPr lang="en-US" sz="1050" dirty="0" err="1"/>
+              <a:t>sn_dolf</a:t>
+            </a:r>
+            <a:endParaRPr lang="en-US" sz="1050" dirty="0"/>
+          </a:p>
+          <a:p>
+            <a:r>
+              <a:rPr lang="en-US" sz="1050" dirty="0"/>
               <a:t>:</a:t>
             </a:r>
             <a:r>
-              <a:rPr lang="de-DE" sz="1050" dirty="0" err="1"/>
-              <a:t>elec_hollow_kick</a:t>
-            </a:r>
-            <a:endParaRPr lang="de-DE" sz="1050" dirty="0"/>
-          </a:p>
-          <a:p>
-            <a:r>
-              <a:rPr lang="de-DE" sz="1050" dirty="0"/>
-              <a:t>:</a:t>
-            </a:r>
-            <a:r>
-              <a:rPr lang="de-DE" sz="1050" dirty="0" err="1"/>
-              <a:t>elec_twip</a:t>
-            </a:r>
-            <a:endParaRPr lang="de-DE" sz="1050" dirty="0"/>
-          </a:p>
-          <a:p>
-            <a:r>
-              <a:rPr lang="de-DE" sz="1050" dirty="0"/>
-              <a:t>:</a:t>
-            </a:r>
-            <a:r>
-              <a:rPr lang="de-DE" sz="1050" dirty="0" err="1"/>
-              <a:t>elec_plip</a:t>
-            </a:r>
-            <a:endParaRPr lang="de-DE" sz="1050" dirty="0"/>
-          </a:p>
-          <a:p>
-            <a:r>
-              <a:rPr lang="de-DE" sz="1050" dirty="0"/>
-              <a:t>:</a:t>
-            </a:r>
-            <a:r>
-              <a:rPr lang="de-DE" sz="1050" dirty="0" err="1"/>
-              <a:t>elec_blup</a:t>
-            </a:r>
-            <a:r>
-              <a:rPr lang="de-DE" sz="1050" dirty="0"/>
+              <a:rPr lang="en-US" sz="1050" dirty="0" err="1"/>
+              <a:t>sn_zome</a:t>
+            </a:r>
+            <a:r>
+              <a:rPr lang="en-US" sz="1050" dirty="0"/>
               <a:t> </a:t>
             </a:r>
           </a:p>
@@ -10064,14 +9958,14 @@
       </p:sp>
       <p:sp>
         <p:nvSpPr>
-          <p:cNvPr id="15" name="TextBox 14"/>
-          <p:cNvSpPr txBox="1"/>
+          <p:cNvPr id="4" name="Rectangle 3"/>
+          <p:cNvSpPr/>
           <p:nvPr/>
         </p:nvSpPr>
         <p:spPr>
           <a:xfrm>
-            <a:off x="307089" y="7604631"/>
-            <a:ext cx="1681751" cy="738664"/>
+            <a:off x="307089" y="3363535"/>
+            <a:ext cx="1681751" cy="4131900"/>
           </a:xfrm>
           <a:prstGeom prst="rect">
             <a:avLst/>
@@ -10103,52 +9997,283 @@
             </a:r>
             <a:r>
               <a:rPr lang="de-DE" sz="1050" dirty="0" err="1"/>
-              <a:t>misc_burp</a:t>
+              <a:t>elec_triangle</a:t>
+            </a:r>
+            <a:endParaRPr lang="de-DE" sz="1050" dirty="0"/>
+          </a:p>
+          <a:p>
+            <a:r>
+              <a:rPr lang="de-DE" sz="1050" dirty="0"/>
+              <a:t>:</a:t>
+            </a:r>
+            <a:r>
+              <a:rPr lang="de-DE" sz="1050" dirty="0" err="1"/>
+              <a:t>elec_snare</a:t>
+            </a:r>
+            <a:endParaRPr lang="de-DE" sz="1050" dirty="0"/>
+          </a:p>
+          <a:p>
+            <a:r>
+              <a:rPr lang="de-DE" sz="1050" dirty="0"/>
+              <a:t>:</a:t>
+            </a:r>
+            <a:r>
+              <a:rPr lang="de-DE" sz="1050" dirty="0" err="1"/>
+              <a:t>elec_lo_snare</a:t>
+            </a:r>
+            <a:endParaRPr lang="de-DE" sz="1050" dirty="0"/>
+          </a:p>
+          <a:p>
+            <a:r>
+              <a:rPr lang="de-DE" sz="1050" dirty="0"/>
+              <a:t>:</a:t>
+            </a:r>
+            <a:r>
+              <a:rPr lang="de-DE" sz="1050" dirty="0" err="1"/>
+              <a:t>elec_hi_snare</a:t>
+            </a:r>
+            <a:endParaRPr lang="de-DE" sz="1050" dirty="0"/>
+          </a:p>
+          <a:p>
+            <a:r>
+              <a:rPr lang="de-DE" sz="1050" dirty="0"/>
+              <a:t>:</a:t>
+            </a:r>
+            <a:r>
+              <a:rPr lang="de-DE" sz="1050" dirty="0" err="1"/>
+              <a:t>elec_mid_snare</a:t>
+            </a:r>
+            <a:endParaRPr lang="de-DE" sz="1050" dirty="0"/>
+          </a:p>
+          <a:p>
+            <a:r>
+              <a:rPr lang="de-DE" sz="1050" dirty="0"/>
+              <a:t>:</a:t>
+            </a:r>
+            <a:r>
+              <a:rPr lang="de-DE" sz="1050" dirty="0" err="1"/>
+              <a:t>elec_cymbal</a:t>
+            </a:r>
+            <a:endParaRPr lang="de-DE" sz="1050" dirty="0"/>
+          </a:p>
+          <a:p>
+            <a:r>
+              <a:rPr lang="de-DE" sz="1050" dirty="0"/>
+              <a:t>:</a:t>
+            </a:r>
+            <a:r>
+              <a:rPr lang="de-DE" sz="1050" dirty="0" err="1"/>
+              <a:t>elec_soft_kick</a:t>
+            </a:r>
+            <a:endParaRPr lang="de-DE" sz="1050" dirty="0"/>
+          </a:p>
+          <a:p>
+            <a:r>
+              <a:rPr lang="de-DE" sz="1050" dirty="0"/>
+              <a:t>:</a:t>
+            </a:r>
+            <a:r>
+              <a:rPr lang="de-DE" sz="1050" dirty="0" err="1"/>
+              <a:t>elec_filt_snare</a:t>
+            </a:r>
+            <a:endParaRPr lang="de-DE" sz="1050" dirty="0"/>
+          </a:p>
+          <a:p>
+            <a:r>
+              <a:rPr lang="de-DE" sz="1050" dirty="0"/>
+              <a:t>:</a:t>
+            </a:r>
+            <a:r>
+              <a:rPr lang="de-DE" sz="1050" dirty="0" err="1"/>
+              <a:t>elec_fuzz_tom</a:t>
+            </a:r>
+            <a:endParaRPr lang="de-DE" sz="1050" dirty="0"/>
+          </a:p>
+          <a:p>
+            <a:r>
+              <a:rPr lang="de-DE" sz="1050" dirty="0"/>
+              <a:t>:</a:t>
+            </a:r>
+            <a:r>
+              <a:rPr lang="de-DE" sz="1050" dirty="0" err="1"/>
+              <a:t>elec_chime</a:t>
+            </a:r>
+            <a:endParaRPr lang="de-DE" sz="1050" dirty="0"/>
+          </a:p>
+          <a:p>
+            <a:r>
+              <a:rPr lang="de-DE" sz="1050" dirty="0"/>
+              <a:t>:</a:t>
+            </a:r>
+            <a:r>
+              <a:rPr lang="de-DE" sz="1050" dirty="0" err="1"/>
+              <a:t>elec_bong</a:t>
+            </a:r>
+            <a:endParaRPr lang="de-DE" sz="1050" dirty="0"/>
+          </a:p>
+          <a:p>
+            <a:r>
+              <a:rPr lang="de-DE" sz="1050" dirty="0"/>
+              <a:t>:</a:t>
+            </a:r>
+            <a:r>
+              <a:rPr lang="de-DE" sz="1050" dirty="0" err="1"/>
+              <a:t>elec_twang</a:t>
+            </a:r>
+            <a:endParaRPr lang="de-DE" sz="1050" dirty="0"/>
+          </a:p>
+          <a:p>
+            <a:r>
+              <a:rPr lang="de-DE" sz="1050" dirty="0"/>
+              <a:t>:</a:t>
+            </a:r>
+            <a:r>
+              <a:rPr lang="de-DE" sz="1050" dirty="0" err="1"/>
+              <a:t>elec_wood</a:t>
+            </a:r>
+            <a:endParaRPr lang="de-DE" sz="1050" dirty="0"/>
+          </a:p>
+          <a:p>
+            <a:r>
+              <a:rPr lang="de-DE" sz="1050" dirty="0"/>
+              <a:t>:</a:t>
+            </a:r>
+            <a:r>
+              <a:rPr lang="de-DE" sz="1050" dirty="0" err="1"/>
+              <a:t>elec_pop</a:t>
+            </a:r>
+            <a:endParaRPr lang="de-DE" sz="1050" dirty="0"/>
+          </a:p>
+          <a:p>
+            <a:r>
+              <a:rPr lang="de-DE" sz="1050" dirty="0"/>
+              <a:t>:</a:t>
+            </a:r>
+            <a:r>
+              <a:rPr lang="de-DE" sz="1050" dirty="0" err="1"/>
+              <a:t>elec_beep</a:t>
+            </a:r>
+            <a:endParaRPr lang="de-DE" sz="1050" dirty="0"/>
+          </a:p>
+          <a:p>
+            <a:r>
+              <a:rPr lang="de-DE" sz="1050" dirty="0"/>
+              <a:t>:</a:t>
+            </a:r>
+            <a:r>
+              <a:rPr lang="de-DE" sz="1050" dirty="0" err="1"/>
+              <a:t>elec_blip</a:t>
+            </a:r>
+            <a:endParaRPr lang="de-DE" sz="1050" dirty="0"/>
+          </a:p>
+          <a:p>
+            <a:r>
+              <a:rPr lang="de-DE" sz="1050" dirty="0"/>
+              <a:t>:elec_blip2</a:t>
+            </a:r>
+          </a:p>
+          <a:p>
+            <a:r>
+              <a:rPr lang="de-DE" sz="1050" dirty="0"/>
+              <a:t>:</a:t>
+            </a:r>
+            <a:r>
+              <a:rPr lang="de-DE" sz="1050" dirty="0" err="1"/>
+              <a:t>elec_ping</a:t>
+            </a:r>
+            <a:endParaRPr lang="de-DE" sz="1050" dirty="0"/>
+          </a:p>
+          <a:p>
+            <a:r>
+              <a:rPr lang="de-DE" sz="1050" dirty="0"/>
+              <a:t>:</a:t>
+            </a:r>
+            <a:r>
+              <a:rPr lang="de-DE" sz="1050" dirty="0" err="1"/>
+              <a:t>elec_bell</a:t>
+            </a:r>
+            <a:endParaRPr lang="de-DE" sz="1050" dirty="0"/>
+          </a:p>
+          <a:p>
+            <a:r>
+              <a:rPr lang="de-DE" sz="1050" dirty="0"/>
+              <a:t>:</a:t>
+            </a:r>
+            <a:r>
+              <a:rPr lang="de-DE" sz="1050" dirty="0" err="1"/>
+              <a:t>elec_flip</a:t>
+            </a:r>
+            <a:endParaRPr lang="de-DE" sz="1050" dirty="0"/>
+          </a:p>
+          <a:p>
+            <a:r>
+              <a:rPr lang="de-DE" sz="1050" dirty="0"/>
+              <a:t>:</a:t>
+            </a:r>
+            <a:r>
+              <a:rPr lang="de-DE" sz="1050" dirty="0" err="1"/>
+              <a:t>elec_tick</a:t>
+            </a:r>
+            <a:endParaRPr lang="de-DE" sz="1050" dirty="0"/>
+          </a:p>
+          <a:p>
+            <a:r>
+              <a:rPr lang="de-DE" sz="1050" dirty="0"/>
+              <a:t>:</a:t>
+            </a:r>
+            <a:r>
+              <a:rPr lang="de-DE" sz="1050" dirty="0" err="1"/>
+              <a:t>elec_hollow_kick</a:t>
+            </a:r>
+            <a:endParaRPr lang="de-DE" sz="1050" dirty="0"/>
+          </a:p>
+          <a:p>
+            <a:r>
+              <a:rPr lang="de-DE" sz="1050" dirty="0"/>
+              <a:t>:</a:t>
+            </a:r>
+            <a:r>
+              <a:rPr lang="de-DE" sz="1050" dirty="0" err="1"/>
+              <a:t>elec_twip</a:t>
+            </a:r>
+            <a:endParaRPr lang="de-DE" sz="1050" dirty="0"/>
+          </a:p>
+          <a:p>
+            <a:r>
+              <a:rPr lang="de-DE" sz="1050" dirty="0"/>
+              <a:t>:</a:t>
+            </a:r>
+            <a:r>
+              <a:rPr lang="de-DE" sz="1050" dirty="0" err="1"/>
+              <a:t>elec_plip</a:t>
+            </a:r>
+            <a:endParaRPr lang="de-DE" sz="1050" dirty="0"/>
+          </a:p>
+          <a:p>
+            <a:r>
+              <a:rPr lang="de-DE" sz="1050" dirty="0"/>
+              <a:t>:</a:t>
+            </a:r>
+            <a:r>
+              <a:rPr lang="de-DE" sz="1050" dirty="0" err="1"/>
+              <a:t>elec_blup</a:t>
             </a:r>
             <a:r>
               <a:rPr lang="de-DE" sz="1050" dirty="0"/>
               <a:t> </a:t>
             </a:r>
           </a:p>
-          <a:p>
-            <a:r>
-              <a:rPr lang="de-DE" sz="1050" dirty="0"/>
-              <a:t>:</a:t>
-            </a:r>
-            <a:r>
-              <a:rPr lang="de-DE" sz="1050" dirty="0" err="1"/>
-              <a:t>perc_bell</a:t>
-            </a:r>
-            <a:endParaRPr lang="de-DE" sz="1050" dirty="0"/>
-          </a:p>
-          <a:p>
-            <a:r>
-              <a:rPr lang="de-DE" sz="1050" dirty="0"/>
-              <a:t>:</a:t>
-            </a:r>
-            <a:r>
-              <a:rPr lang="de-DE" sz="1050" dirty="0" err="1"/>
-              <a:t>perc_snap</a:t>
-            </a:r>
-            <a:endParaRPr lang="de-DE" sz="1050" dirty="0"/>
-          </a:p>
-          <a:p>
-            <a:r>
-              <a:rPr lang="de-DE" sz="1050" dirty="0"/>
-              <a:t>:perc_snap2 </a:t>
-            </a:r>
-          </a:p>
-        </p:txBody>
-      </p:sp>
-      <p:sp>
-        <p:nvSpPr>
-          <p:cNvPr id="16" name="TextBox 15"/>
+        </p:txBody>
+      </p:sp>
+      <p:sp>
+        <p:nvSpPr>
+          <p:cNvPr id="15" name="TextBox 14"/>
           <p:cNvSpPr txBox="1"/>
           <p:nvPr/>
         </p:nvSpPr>
         <p:spPr>
           <a:xfrm>
-            <a:off x="307089" y="8441848"/>
+            <a:off x="307089" y="7604631"/>
             <a:ext cx="1681751" cy="738664"/>
           </a:xfrm>
           <a:prstGeom prst="rect">
@@ -10181,6 +10306,84 @@
             </a:r>
             <a:r>
               <a:rPr lang="de-DE" sz="1050" dirty="0" err="1"/>
+              <a:t>misc_burp</a:t>
+            </a:r>
+            <a:r>
+              <a:rPr lang="de-DE" sz="1050" dirty="0"/>
+              <a:t> </a:t>
+            </a:r>
+          </a:p>
+          <a:p>
+            <a:r>
+              <a:rPr lang="de-DE" sz="1050" dirty="0"/>
+              <a:t>:</a:t>
+            </a:r>
+            <a:r>
+              <a:rPr lang="de-DE" sz="1050" dirty="0" err="1"/>
+              <a:t>perc_bell</a:t>
+            </a:r>
+            <a:endParaRPr lang="de-DE" sz="1050" dirty="0"/>
+          </a:p>
+          <a:p>
+            <a:r>
+              <a:rPr lang="de-DE" sz="1050" dirty="0"/>
+              <a:t>:</a:t>
+            </a:r>
+            <a:r>
+              <a:rPr lang="de-DE" sz="1050" dirty="0" err="1"/>
+              <a:t>perc_snap</a:t>
+            </a:r>
+            <a:endParaRPr lang="de-DE" sz="1050" dirty="0"/>
+          </a:p>
+          <a:p>
+            <a:r>
+              <a:rPr lang="de-DE" sz="1050" dirty="0"/>
+              <a:t>:perc_snap2 </a:t>
+            </a:r>
+          </a:p>
+        </p:txBody>
+      </p:sp>
+      <p:sp>
+        <p:nvSpPr>
+          <p:cNvPr id="16" name="TextBox 15"/>
+          <p:cNvSpPr txBox="1"/>
+          <p:nvPr/>
+        </p:nvSpPr>
+        <p:spPr>
+          <a:xfrm>
+            <a:off x="307089" y="8441848"/>
+            <a:ext cx="1681751" cy="738664"/>
+          </a:xfrm>
+          <a:prstGeom prst="rect">
+            <a:avLst/>
+          </a:prstGeom>
+        </p:spPr>
+        <p:style>
+          <a:lnRef idx="1">
+            <a:schemeClr val="accent6"/>
+          </a:lnRef>
+          <a:fillRef idx="2">
+            <a:schemeClr val="accent6"/>
+          </a:fillRef>
+          <a:effectRef idx="1">
+            <a:schemeClr val="accent6"/>
+          </a:effectRef>
+          <a:fontRef idx="minor">
+            <a:schemeClr val="dk1"/>
+          </a:fontRef>
+        </p:style>
+        <p:txBody>
+          <a:bodyPr wrap="square" rtlCol="0">
+            <a:spAutoFit/>
+          </a:bodyPr>
+          <a:lstStyle/>
+          <a:p>
+            <a:r>
+              <a:rPr lang="de-DE" sz="1050" dirty="0"/>
+              <a:t>:</a:t>
+            </a:r>
+            <a:r>
+              <a:rPr lang="de-DE" sz="1050" dirty="0" err="1"/>
               <a:t>guit_harmonics</a:t>
             </a:r>
             <a:endParaRPr lang="de-DE" sz="1050" dirty="0"/>
@@ -10223,7 +10426,7 @@
         </p:nvSpPr>
         <p:spPr>
           <a:xfrm>
-            <a:off x="5365461" y="6059906"/>
+            <a:off x="5398552" y="5563327"/>
             <a:ext cx="1198801" cy="1223412"/>
           </a:xfrm>
           <a:prstGeom prst="rect">
@@ -10341,6 +10544,90 @@
           </a:prstGeom>
         </p:spPr>
       </p:pic>
+      <p:sp>
+        <p:nvSpPr>
+          <p:cNvPr id="19" name="TextBox 18"/>
+          <p:cNvSpPr txBox="1"/>
+          <p:nvPr/>
+        </p:nvSpPr>
+        <p:spPr>
+          <a:xfrm>
+            <a:off x="5418962" y="7036798"/>
+            <a:ext cx="1198801" cy="1384995"/>
+          </a:xfrm>
+          <a:prstGeom prst="rect">
+            <a:avLst/>
+          </a:prstGeom>
+        </p:spPr>
+        <p:style>
+          <a:lnRef idx="1">
+            <a:schemeClr val="accent6"/>
+          </a:lnRef>
+          <a:fillRef idx="2">
+            <a:schemeClr val="accent6"/>
+          </a:fillRef>
+          <a:effectRef idx="1">
+            <a:schemeClr val="accent6"/>
+          </a:effectRef>
+          <a:fontRef idx="minor">
+            <a:schemeClr val="dk1"/>
+          </a:fontRef>
+        </p:style>
+        <p:txBody>
+          <a:bodyPr wrap="square" rtlCol="0">
+            <a:spAutoFit/>
+          </a:bodyPr>
+          <a:lstStyle/>
+          <a:p>
+            <a:r>
+              <a:rPr lang="nl-NL" sz="1050" dirty="0"/>
+              <a:t>:drum_cowbell</a:t>
+            </a:r>
+          </a:p>
+          <a:p>
+            <a:r>
+              <a:rPr lang="nl-NL" sz="1050" dirty="0"/>
+              <a:t>:drum_roll</a:t>
+            </a:r>
+          </a:p>
+          <a:p>
+            <a:r>
+              <a:rPr lang="nl-NL" sz="1050" dirty="0"/>
+              <a:t>:misc_cros</a:t>
+            </a:r>
+          </a:p>
+          <a:p>
+            <a:r>
+              <a:rPr lang="nl-NL" sz="1050" dirty="0"/>
+              <a:t>:misc_cineboom</a:t>
+            </a:r>
+          </a:p>
+          <a:p>
+            <a:r>
+              <a:rPr lang="nl-NL" sz="1050" dirty="0"/>
+              <a:t>:perc_swash</a:t>
+            </a:r>
+          </a:p>
+          <a:p>
+            <a:r>
+              <a:rPr lang="nl-NL" sz="1050" dirty="0"/>
+              <a:t>:perc_till</a:t>
+            </a:r>
+          </a:p>
+          <a:p>
+            <a:r>
+              <a:rPr lang="nl-NL" sz="1050" dirty="0"/>
+              <a:t>:loop_safari</a:t>
+            </a:r>
+          </a:p>
+          <a:p>
+            <a:r>
+              <a:rPr lang="nl-NL" sz="1050" dirty="0"/>
+              <a:t>:loop_tabla</a:t>
+            </a:r>
+          </a:p>
+        </p:txBody>
+      </p:sp>
     </p:spTree>
     <p:extLst>
       <p:ext uri="{BB962C8B-B14F-4D97-AF65-F5344CB8AC3E}">
@@ -10816,15 +11103,7 @@
           <a:p>
             <a:r>
               <a:rPr lang="de-DE" dirty="0" smtClean="0"/>
-              <a:t>	:a4	</a:t>
-            </a:r>
-            <a:r>
-              <a:rPr lang="de-DE" dirty="0" smtClean="0"/>
-              <a:t>:b4</a:t>
-            </a:r>
-            <a:r>
-              <a:rPr lang="de-DE" dirty="0" smtClean="0"/>
-              <a:t>	 :major7	:minor</a:t>
+              <a:t>	:a4	:b4	 :major7	:minor</a:t>
             </a:r>
           </a:p>
           <a:p>
@@ -11802,7 +12081,19 @@
             </a:r>
             <a:r>
               <a:rPr lang="de-DE" dirty="0" smtClean="0"/>
-              <a:t>blade	:tb303</a:t>
+              <a:t>blade	:tb303		:</a:t>
+            </a:r>
+            <a:r>
+              <a:rPr lang="de-DE" dirty="0" err="1" smtClean="0"/>
+              <a:t>pluck</a:t>
+            </a:r>
+            <a:r>
+              <a:rPr lang="de-DE" dirty="0" smtClean="0"/>
+              <a:t>		:</a:t>
+            </a:r>
+            <a:r>
+              <a:rPr lang="de-DE" dirty="0" err="1" smtClean="0"/>
+              <a:t>dtri</a:t>
             </a:r>
             <a:endParaRPr lang="de-DE" dirty="0"/>
           </a:p>

</xml_diff>